<commit_message>
Doc: Status report Semana 05
</commit_message>
<xml_diff>
--- a/Documentação/EngenhariaDeSoftware/Engenharia de Sofware - Exercicio em Grupo v1.pptx
+++ b/Documentação/EngenhariaDeSoftware/Engenharia de Sofware - Exercicio em Grupo v1.pptx
@@ -655,7 +655,7 @@
             <a:fld id="{C3CD65D1-5C11-455D-9F9A-0E035F00A0DA}" type="datetimeFigureOut">
               <a:rPr lang="pt-BR" smtClean="0"/>
               <a:pPr/>
-              <a:t>21/09/2021</a:t>
+              <a:t>22/09/2021</a:t>
             </a:fld>
             <a:endParaRPr lang="pt-BR"/>
           </a:p>
@@ -722,7 +722,7 @@
             <a:fld id="{CA8E3B7C-E4AE-4E9E-8479-7C668141D483}" type="slidenum">
               <a:rPr lang="pt-BR" smtClean="0"/>
               <a:pPr/>
-              <a:t>‹nº›</a:t>
+              <a:t>‹#›</a:t>
             </a:fld>
             <a:endParaRPr lang="pt-BR"/>
           </a:p>
@@ -823,7 +823,7 @@
             <a:fld id="{A05DA3EF-18EA-43DE-B1BB-402A3C558822}" type="datetimeFigureOut">
               <a:rPr lang="pt-BR" smtClean="0"/>
               <a:pPr/>
-              <a:t>21/09/2021</a:t>
+              <a:t>22/09/2021</a:t>
             </a:fld>
             <a:endParaRPr lang="pt-BR"/>
           </a:p>
@@ -984,7 +984,7 @@
             <a:fld id="{75B3645A-D0AE-4F6E-A17E-E0036A9041AF}" type="slidenum">
               <a:rPr lang="pt-BR" smtClean="0"/>
               <a:pPr/>
-              <a:t>‹nº›</a:t>
+              <a:t>‹#›</a:t>
             </a:fld>
             <a:endParaRPr lang="pt-BR"/>
           </a:p>
@@ -4158,7 +4158,7 @@
               <a:pPr>
                 <a:defRPr/>
               </a:pPr>
-              <a:t>‹nº›</a:t>
+              <a:t>‹#›</a:t>
             </a:fld>
             <a:endParaRPr lang="pt-BR" sz="880" dirty="0"/>
           </a:p>
@@ -21371,7 +21371,7 @@
               <a:pPr>
                 <a:defRPr/>
               </a:pPr>
-              <a:t>‹nº›</a:t>
+              <a:t>‹#›</a:t>
             </a:fld>
             <a:endParaRPr lang="pt-BR" sz="880" dirty="0"/>
           </a:p>
@@ -23612,18 +23612,1556 @@
             <p:ph type="body" sz="quarter" idx="13"/>
           </p:nvPr>
         </p:nvSpPr>
-        <p:spPr/>
+        <p:spPr>
+          <a:xfrm>
+            <a:off x="3153666" y="235399"/>
+            <a:ext cx="3391204" cy="511298"/>
+          </a:xfrm>
+        </p:spPr>
         <p:txBody>
           <a:bodyPr/>
           <a:lstStyle/>
           <a:p>
             <a:r>
-              <a:rPr lang="pt-BR" dirty="0"/>
+              <a:rPr lang="pt-BR" sz="3200" dirty="0"/>
               <a:t>Desenho da arquitetura</a:t>
             </a:r>
           </a:p>
         </p:txBody>
       </p:sp>
+      <p:grpSp>
+        <p:nvGrpSpPr>
+          <p:cNvPr id="7" name="Group 6">
+            <a:extLst>
+              <a:ext uri="{FF2B5EF4-FFF2-40B4-BE49-F238E27FC236}">
+                <a16:creationId xmlns:a16="http://schemas.microsoft.com/office/drawing/2014/main" id="{0646A321-80EF-485B-8F41-FA38949E9BD0}"/>
+              </a:ext>
+            </a:extLst>
+          </p:cNvPr>
+          <p:cNvGrpSpPr/>
+          <p:nvPr/>
+        </p:nvGrpSpPr>
+        <p:grpSpPr>
+          <a:xfrm>
+            <a:off x="5810239" y="1116722"/>
+            <a:ext cx="2222668" cy="1724042"/>
+            <a:chOff x="8741678" y="1501253"/>
+            <a:chExt cx="2566458" cy="2016224"/>
+          </a:xfrm>
+        </p:grpSpPr>
+        <p:sp>
+          <p:nvSpPr>
+            <p:cNvPr id="8" name="Retângulo 17">
+              <a:extLst>
+                <a:ext uri="{FF2B5EF4-FFF2-40B4-BE49-F238E27FC236}">
+                  <a16:creationId xmlns:a16="http://schemas.microsoft.com/office/drawing/2014/main" id="{DE5A781B-0540-4C0D-8CBA-649E90A6C0D4}"/>
+                </a:ext>
+              </a:extLst>
+            </p:cNvPr>
+            <p:cNvSpPr/>
+            <p:nvPr/>
+          </p:nvSpPr>
+          <p:spPr>
+            <a:xfrm>
+              <a:off x="8843373" y="1501253"/>
+              <a:ext cx="2376264" cy="2016224"/>
+            </a:xfrm>
+            <a:prstGeom prst="rect">
+              <a:avLst/>
+            </a:prstGeom>
+            <a:ln/>
+          </p:spPr>
+          <p:style>
+            <a:lnRef idx="2">
+              <a:schemeClr val="accent5">
+                <a:shade val="50000"/>
+              </a:schemeClr>
+            </a:lnRef>
+            <a:fillRef idx="1">
+              <a:schemeClr val="accent5"/>
+            </a:fillRef>
+            <a:effectRef idx="0">
+              <a:schemeClr val="accent5"/>
+            </a:effectRef>
+            <a:fontRef idx="minor">
+              <a:schemeClr val="lt1"/>
+            </a:fontRef>
+          </p:style>
+          <p:txBody>
+            <a:bodyPr rtlCol="0" anchor="ctr"/>
+            <a:lstStyle/>
+            <a:p>
+              <a:pPr algn="ctr"/>
+              <a:endParaRPr lang="pt-BR" sz="1400" dirty="0">
+                <a:solidFill>
+                  <a:prstClr val="white"/>
+                </a:solidFill>
+                <a:latin typeface="Calibri"/>
+              </a:endParaRPr>
+            </a:p>
+          </p:txBody>
+        </p:sp>
+        <p:sp>
+          <p:nvSpPr>
+            <p:cNvPr id="9" name="Retângulo 20">
+              <a:extLst>
+                <a:ext uri="{FF2B5EF4-FFF2-40B4-BE49-F238E27FC236}">
+                  <a16:creationId xmlns:a16="http://schemas.microsoft.com/office/drawing/2014/main" id="{00D906F0-F91F-4E7E-AE03-0C13D41EFFA5}"/>
+                </a:ext>
+              </a:extLst>
+            </p:cNvPr>
+            <p:cNvSpPr/>
+            <p:nvPr/>
+          </p:nvSpPr>
+          <p:spPr>
+            <a:xfrm>
+              <a:off x="8741678" y="1583055"/>
+              <a:ext cx="2566458" cy="611893"/>
+            </a:xfrm>
+            <a:prstGeom prst="rect">
+              <a:avLst/>
+            </a:prstGeom>
+          </p:spPr>
+          <p:txBody>
+            <a:bodyPr wrap="square">
+              <a:spAutoFit/>
+            </a:bodyPr>
+            <a:lstStyle/>
+            <a:p>
+              <a:pPr lvl="0" algn="ctr">
+                <a:defRPr/>
+              </a:pPr>
+              <a:r>
+                <a:rPr lang="pt-BR" sz="1600" b="1" dirty="0">
+                  <a:solidFill>
+                    <a:prstClr val="white"/>
+                  </a:solidFill>
+                </a:rPr>
+                <a:t>Web Application </a:t>
+              </a:r>
+            </a:p>
+            <a:p>
+              <a:pPr lvl="0" algn="ctr">
+                <a:defRPr/>
+              </a:pPr>
+              <a:r>
+                <a:rPr lang="pt-BR" sz="1200" dirty="0">
+                  <a:solidFill>
+                    <a:prstClr val="white"/>
+                  </a:solidFill>
+                </a:rPr>
+                <a:t>[Container: Spring Boot]</a:t>
+              </a:r>
+            </a:p>
+          </p:txBody>
+        </p:sp>
+        <p:sp>
+          <p:nvSpPr>
+            <p:cNvPr id="10" name="Retângulo 20">
+              <a:extLst>
+                <a:ext uri="{FF2B5EF4-FFF2-40B4-BE49-F238E27FC236}">
+                  <a16:creationId xmlns:a16="http://schemas.microsoft.com/office/drawing/2014/main" id="{CF4B0FA5-BF87-4398-862F-4085630EA278}"/>
+                </a:ext>
+              </a:extLst>
+            </p:cNvPr>
+            <p:cNvSpPr/>
+            <p:nvPr/>
+          </p:nvSpPr>
+          <p:spPr>
+            <a:xfrm>
+              <a:off x="8924638" y="2439785"/>
+              <a:ext cx="2307052" cy="539906"/>
+            </a:xfrm>
+            <a:prstGeom prst="rect">
+              <a:avLst/>
+            </a:prstGeom>
+          </p:spPr>
+          <p:txBody>
+            <a:bodyPr wrap="square">
+              <a:spAutoFit/>
+            </a:bodyPr>
+            <a:lstStyle/>
+            <a:p>
+              <a:pPr lvl="0" algn="ctr">
+                <a:defRPr/>
+              </a:pPr>
+              <a:r>
+                <a:rPr lang="pt-BR" sz="1200" dirty="0">
+                  <a:solidFill>
+                    <a:prstClr val="white"/>
+                  </a:solidFill>
+                </a:rPr>
+                <a:t>Aplicação de exportação de dados para csv</a:t>
+              </a:r>
+              <a:endParaRPr lang="pt-BR" sz="1050" dirty="0">
+                <a:solidFill>
+                  <a:prstClr val="white"/>
+                </a:solidFill>
+              </a:endParaRPr>
+            </a:p>
+          </p:txBody>
+        </p:sp>
+      </p:grpSp>
+      <p:sp>
+        <p:nvSpPr>
+          <p:cNvPr id="11" name="Retângulo 20">
+            <a:extLst>
+              <a:ext uri="{FF2B5EF4-FFF2-40B4-BE49-F238E27FC236}">
+                <a16:creationId xmlns:a16="http://schemas.microsoft.com/office/drawing/2014/main" id="{AF3F0847-15C5-44AF-801A-E2B601017697}"/>
+              </a:ext>
+            </a:extLst>
+          </p:cNvPr>
+          <p:cNvSpPr/>
+          <p:nvPr/>
+        </p:nvSpPr>
+        <p:spPr>
+          <a:xfrm>
+            <a:off x="1878857" y="2032604"/>
+            <a:ext cx="1983070" cy="523220"/>
+          </a:xfrm>
+          <a:prstGeom prst="rect">
+            <a:avLst/>
+          </a:prstGeom>
+        </p:spPr>
+        <p:txBody>
+          <a:bodyPr wrap="square">
+            <a:spAutoFit/>
+          </a:bodyPr>
+          <a:lstStyle/>
+          <a:p>
+            <a:pPr lvl="0" algn="ctr">
+              <a:defRPr/>
+            </a:pPr>
+            <a:r>
+              <a:rPr lang="pt-BR" sz="1600" b="1" dirty="0">
+                <a:solidFill>
+                  <a:prstClr val="white"/>
+                </a:solidFill>
+              </a:rPr>
+              <a:t>Database</a:t>
+            </a:r>
+          </a:p>
+          <a:p>
+            <a:pPr lvl="0" algn="ctr">
+              <a:defRPr/>
+            </a:pPr>
+            <a:r>
+              <a:rPr lang="pt-BR" sz="1200" dirty="0">
+                <a:solidFill>
+                  <a:prstClr val="white"/>
+                </a:solidFill>
+              </a:rPr>
+              <a:t>[Container: SQL Server]</a:t>
+            </a:r>
+          </a:p>
+        </p:txBody>
+      </p:sp>
+      <p:grpSp>
+        <p:nvGrpSpPr>
+          <p:cNvPr id="13" name="Group 12">
+            <a:extLst>
+              <a:ext uri="{FF2B5EF4-FFF2-40B4-BE49-F238E27FC236}">
+                <a16:creationId xmlns:a16="http://schemas.microsoft.com/office/drawing/2014/main" id="{17D3C65D-DE31-4AF8-8441-4D47EFB3751D}"/>
+              </a:ext>
+            </a:extLst>
+          </p:cNvPr>
+          <p:cNvGrpSpPr/>
+          <p:nvPr/>
+        </p:nvGrpSpPr>
+        <p:grpSpPr>
+          <a:xfrm>
+            <a:off x="7821605" y="5723109"/>
+            <a:ext cx="2691508" cy="1362948"/>
+            <a:chOff x="8741678" y="1583056"/>
+            <a:chExt cx="2566458" cy="1821669"/>
+          </a:xfrm>
+        </p:grpSpPr>
+        <p:sp>
+          <p:nvSpPr>
+            <p:cNvPr id="14" name="Retângulo 17">
+              <a:extLst>
+                <a:ext uri="{FF2B5EF4-FFF2-40B4-BE49-F238E27FC236}">
+                  <a16:creationId xmlns:a16="http://schemas.microsoft.com/office/drawing/2014/main" id="{7F6B4504-2893-4A7D-81CB-3B218362D2FC}"/>
+                </a:ext>
+              </a:extLst>
+            </p:cNvPr>
+            <p:cNvSpPr/>
+            <p:nvPr/>
+          </p:nvSpPr>
+          <p:spPr>
+            <a:xfrm>
+              <a:off x="8931873" y="1659108"/>
+              <a:ext cx="2299818" cy="1745617"/>
+            </a:xfrm>
+            <a:prstGeom prst="rect">
+              <a:avLst/>
+            </a:prstGeom>
+            <a:ln/>
+          </p:spPr>
+          <p:style>
+            <a:lnRef idx="2">
+              <a:schemeClr val="accent5">
+                <a:shade val="50000"/>
+              </a:schemeClr>
+            </a:lnRef>
+            <a:fillRef idx="1">
+              <a:schemeClr val="accent5"/>
+            </a:fillRef>
+            <a:effectRef idx="0">
+              <a:schemeClr val="accent5"/>
+            </a:effectRef>
+            <a:fontRef idx="minor">
+              <a:schemeClr val="lt1"/>
+            </a:fontRef>
+          </p:style>
+          <p:txBody>
+            <a:bodyPr rtlCol="0" anchor="ctr"/>
+            <a:lstStyle/>
+            <a:p>
+              <a:pPr algn="ctr"/>
+              <a:endParaRPr lang="pt-BR" sz="1400" dirty="0">
+                <a:solidFill>
+                  <a:prstClr val="white"/>
+                </a:solidFill>
+                <a:latin typeface="Calibri"/>
+              </a:endParaRPr>
+            </a:p>
+            <a:p>
+              <a:pPr algn="ctr"/>
+              <a:endParaRPr lang="pt-BR" sz="1400" dirty="0">
+                <a:solidFill>
+                  <a:prstClr val="white"/>
+                </a:solidFill>
+                <a:latin typeface="Calibri"/>
+              </a:endParaRPr>
+            </a:p>
+            <a:p>
+              <a:pPr algn="ctr"/>
+              <a:r>
+                <a:rPr lang="pt-BR" sz="1400" dirty="0">
+                  <a:solidFill>
+                    <a:prstClr val="white"/>
+                  </a:solidFill>
+                  <a:latin typeface="Calibri"/>
+                </a:rPr>
+                <a:t>Exibição e impressão de</a:t>
+              </a:r>
+            </a:p>
+            <a:p>
+              <a:pPr algn="ctr"/>
+              <a:r>
+                <a:rPr lang="pt-BR" sz="1400" dirty="0">
+                  <a:solidFill>
+                    <a:prstClr val="white"/>
+                  </a:solidFill>
+                  <a:latin typeface="Calibri"/>
+                </a:rPr>
+                <a:t>relatorio</a:t>
+              </a:r>
+            </a:p>
+          </p:txBody>
+        </p:sp>
+        <p:sp>
+          <p:nvSpPr>
+            <p:cNvPr id="15" name="Retângulo 20">
+              <a:extLst>
+                <a:ext uri="{FF2B5EF4-FFF2-40B4-BE49-F238E27FC236}">
+                  <a16:creationId xmlns:a16="http://schemas.microsoft.com/office/drawing/2014/main" id="{4527D8F8-7558-45B8-9D16-8CC4AC4E9924}"/>
+                </a:ext>
+              </a:extLst>
+            </p:cNvPr>
+            <p:cNvSpPr/>
+            <p:nvPr/>
+          </p:nvSpPr>
+          <p:spPr>
+            <a:xfrm>
+              <a:off x="8741678" y="1583056"/>
+              <a:ext cx="2566458" cy="699318"/>
+            </a:xfrm>
+            <a:prstGeom prst="rect">
+              <a:avLst/>
+            </a:prstGeom>
+          </p:spPr>
+          <p:txBody>
+            <a:bodyPr wrap="square">
+              <a:spAutoFit/>
+            </a:bodyPr>
+            <a:lstStyle/>
+            <a:p>
+              <a:pPr lvl="0" algn="ctr">
+                <a:defRPr/>
+              </a:pPr>
+              <a:r>
+                <a:rPr lang="pt-BR" sz="1600" b="1" dirty="0">
+                  <a:solidFill>
+                    <a:prstClr val="white"/>
+                  </a:solidFill>
+                </a:rPr>
+                <a:t>ClientSide web</a:t>
+              </a:r>
+            </a:p>
+            <a:p>
+              <a:pPr lvl="0" algn="ctr">
+                <a:defRPr/>
+              </a:pPr>
+              <a:r>
+                <a:rPr lang="pt-BR" sz="1200" dirty="0">
+                  <a:solidFill>
+                    <a:prstClr val="white"/>
+                  </a:solidFill>
+                </a:rPr>
+                <a:t>[Container: JavaScript ]</a:t>
+              </a:r>
+            </a:p>
+          </p:txBody>
+        </p:sp>
+        <p:sp>
+          <p:nvSpPr>
+            <p:cNvPr id="16" name="Retângulo 20">
+              <a:extLst>
+                <a:ext uri="{FF2B5EF4-FFF2-40B4-BE49-F238E27FC236}">
+                  <a16:creationId xmlns:a16="http://schemas.microsoft.com/office/drawing/2014/main" id="{3E250266-E8CD-4FB9-BCEE-9A2701965FB9}"/>
+                </a:ext>
+              </a:extLst>
+            </p:cNvPr>
+            <p:cNvSpPr/>
+            <p:nvPr/>
+          </p:nvSpPr>
+          <p:spPr>
+            <a:xfrm>
+              <a:off x="8924638" y="2439786"/>
+              <a:ext cx="2307052" cy="339375"/>
+            </a:xfrm>
+            <a:prstGeom prst="rect">
+              <a:avLst/>
+            </a:prstGeom>
+          </p:spPr>
+          <p:txBody>
+            <a:bodyPr wrap="square">
+              <a:spAutoFit/>
+            </a:bodyPr>
+            <a:lstStyle/>
+            <a:p>
+              <a:pPr lvl="0" algn="ctr">
+                <a:defRPr/>
+              </a:pPr>
+              <a:endParaRPr lang="pt-BR" sz="1050" dirty="0">
+                <a:solidFill>
+                  <a:prstClr val="white"/>
+                </a:solidFill>
+              </a:endParaRPr>
+            </a:p>
+          </p:txBody>
+        </p:sp>
+      </p:grpSp>
+      <p:cxnSp>
+        <p:nvCxnSpPr>
+          <p:cNvPr id="20" name="Conector de Seta Reta 107">
+            <a:extLst>
+              <a:ext uri="{FF2B5EF4-FFF2-40B4-BE49-F238E27FC236}">
+                <a16:creationId xmlns:a16="http://schemas.microsoft.com/office/drawing/2014/main" id="{11FA67AD-5EC8-4963-A4D0-8C7E1B43C9CD}"/>
+              </a:ext>
+            </a:extLst>
+          </p:cNvPr>
+          <p:cNvCxnSpPr>
+            <a:cxnSpLocks/>
+            <a:stCxn id="8" idx="1"/>
+          </p:cNvCxnSpPr>
+          <p:nvPr/>
+        </p:nvCxnSpPr>
+        <p:spPr>
+          <a:xfrm flipH="1">
+            <a:off x="3310851" y="1978743"/>
+            <a:ext cx="2587460" cy="16431"/>
+          </a:xfrm>
+          <a:prstGeom prst="straightConnector1">
+            <a:avLst/>
+          </a:prstGeom>
+          <a:ln w="19050">
+            <a:solidFill>
+              <a:schemeClr val="accent5">
+                <a:lumMod val="75000"/>
+              </a:schemeClr>
+            </a:solidFill>
+            <a:prstDash val="sysDash"/>
+            <a:headEnd type="none" w="lg" len="lg"/>
+            <a:tailEnd type="triangle" w="lg" len="lg"/>
+          </a:ln>
+        </p:spPr>
+        <p:style>
+          <a:lnRef idx="1">
+            <a:schemeClr val="accent1"/>
+          </a:lnRef>
+          <a:fillRef idx="0">
+            <a:schemeClr val="accent1"/>
+          </a:fillRef>
+          <a:effectRef idx="0">
+            <a:schemeClr val="accent1"/>
+          </a:effectRef>
+          <a:fontRef idx="minor">
+            <a:schemeClr val="tx1"/>
+          </a:fontRef>
+        </p:style>
+      </p:cxnSp>
+      <p:grpSp>
+        <p:nvGrpSpPr>
+          <p:cNvPr id="23" name="Group 22">
+            <a:extLst>
+              <a:ext uri="{FF2B5EF4-FFF2-40B4-BE49-F238E27FC236}">
+                <a16:creationId xmlns:a16="http://schemas.microsoft.com/office/drawing/2014/main" id="{20804ABF-935A-416C-BB92-18669CDAE6AB}"/>
+              </a:ext>
+            </a:extLst>
+          </p:cNvPr>
+          <p:cNvGrpSpPr/>
+          <p:nvPr/>
+        </p:nvGrpSpPr>
+        <p:grpSpPr>
+          <a:xfrm>
+            <a:off x="1561724" y="5832157"/>
+            <a:ext cx="2596344" cy="1619148"/>
+            <a:chOff x="4755662" y="1781271"/>
+            <a:chExt cx="4257938" cy="2374099"/>
+          </a:xfrm>
+        </p:grpSpPr>
+        <p:sp>
+          <p:nvSpPr>
+            <p:cNvPr id="24" name="Retângulo 17">
+              <a:extLst>
+                <a:ext uri="{FF2B5EF4-FFF2-40B4-BE49-F238E27FC236}">
+                  <a16:creationId xmlns:a16="http://schemas.microsoft.com/office/drawing/2014/main" id="{74314502-ABDF-4187-8AC9-249EB93731AB}"/>
+                </a:ext>
+              </a:extLst>
+            </p:cNvPr>
+            <p:cNvSpPr/>
+            <p:nvPr/>
+          </p:nvSpPr>
+          <p:spPr>
+            <a:xfrm>
+              <a:off x="4755662" y="1875188"/>
+              <a:ext cx="4257938" cy="2280182"/>
+            </a:xfrm>
+            <a:prstGeom prst="rect">
+              <a:avLst/>
+            </a:prstGeom>
+            <a:ln/>
+          </p:spPr>
+          <p:style>
+            <a:lnRef idx="2">
+              <a:schemeClr val="accent5">
+                <a:shade val="50000"/>
+              </a:schemeClr>
+            </a:lnRef>
+            <a:fillRef idx="1">
+              <a:schemeClr val="accent5"/>
+            </a:fillRef>
+            <a:effectRef idx="0">
+              <a:schemeClr val="accent5"/>
+            </a:effectRef>
+            <a:fontRef idx="minor">
+              <a:schemeClr val="lt1"/>
+            </a:fontRef>
+          </p:style>
+          <p:txBody>
+            <a:bodyPr rtlCol="0" anchor="ctr"/>
+            <a:lstStyle/>
+            <a:p>
+              <a:pPr algn="ctr"/>
+              <a:endParaRPr lang="pt-BR" sz="1200" dirty="0">
+                <a:solidFill>
+                  <a:prstClr val="white"/>
+                </a:solidFill>
+                <a:latin typeface="Calibri"/>
+              </a:endParaRPr>
+            </a:p>
+            <a:p>
+              <a:pPr algn="ctr"/>
+              <a:r>
+                <a:rPr lang="pt-BR" sz="1200" dirty="0">
+                  <a:solidFill>
+                    <a:prstClr val="white"/>
+                  </a:solidFill>
+                  <a:latin typeface="Calibri"/>
+                </a:rPr>
+                <a:t>Aplicação que envia dados das máquinas e  do caixa para o banco</a:t>
+              </a:r>
+            </a:p>
+          </p:txBody>
+        </p:sp>
+        <p:sp>
+          <p:nvSpPr>
+            <p:cNvPr id="25" name="Retângulo 20">
+              <a:extLst>
+                <a:ext uri="{FF2B5EF4-FFF2-40B4-BE49-F238E27FC236}">
+                  <a16:creationId xmlns:a16="http://schemas.microsoft.com/office/drawing/2014/main" id="{51220C5F-6D0A-4433-81BF-3D9125576F22}"/>
+                </a:ext>
+              </a:extLst>
+            </p:cNvPr>
+            <p:cNvSpPr/>
+            <p:nvPr/>
+          </p:nvSpPr>
+          <p:spPr>
+            <a:xfrm>
+              <a:off x="4825026" y="1781271"/>
+              <a:ext cx="3868588" cy="1227614"/>
+            </a:xfrm>
+            <a:prstGeom prst="rect">
+              <a:avLst/>
+            </a:prstGeom>
+          </p:spPr>
+          <p:txBody>
+            <a:bodyPr wrap="square">
+              <a:spAutoFit/>
+            </a:bodyPr>
+            <a:lstStyle/>
+            <a:p>
+              <a:pPr lvl="0" algn="ctr">
+                <a:defRPr/>
+              </a:pPr>
+              <a:r>
+                <a:rPr lang="pt-BR" sz="1400" b="1" dirty="0">
+                  <a:solidFill>
+                    <a:prstClr val="white"/>
+                  </a:solidFill>
+                </a:rPr>
+                <a:t>DesktopClient</a:t>
+              </a:r>
+            </a:p>
+            <a:p>
+              <a:pPr lvl="0" algn="ctr">
+                <a:defRPr/>
+              </a:pPr>
+              <a:r>
+                <a:rPr lang="pt-BR" sz="1100" dirty="0">
+                  <a:solidFill>
+                    <a:prstClr val="white"/>
+                  </a:solidFill>
+                </a:rPr>
+                <a:t>[Container: JPA]</a:t>
+              </a:r>
+            </a:p>
+            <a:p>
+              <a:pPr lvl="0" algn="ctr">
+                <a:defRPr/>
+              </a:pPr>
+              <a:endParaRPr lang="pt-BR" sz="1100" dirty="0">
+                <a:solidFill>
+                  <a:prstClr val="white"/>
+                </a:solidFill>
+              </a:endParaRPr>
+            </a:p>
+          </p:txBody>
+        </p:sp>
+      </p:grpSp>
+      <p:cxnSp>
+        <p:nvCxnSpPr>
+          <p:cNvPr id="27" name="Conector de Seta Reta 107">
+            <a:extLst>
+              <a:ext uri="{FF2B5EF4-FFF2-40B4-BE49-F238E27FC236}">
+                <a16:creationId xmlns:a16="http://schemas.microsoft.com/office/drawing/2014/main" id="{CF690BC5-8619-48BC-86E8-CB01AD495EF4}"/>
+              </a:ext>
+            </a:extLst>
+          </p:cNvPr>
+          <p:cNvCxnSpPr>
+            <a:cxnSpLocks/>
+            <a:stCxn id="104" idx="0"/>
+          </p:cNvCxnSpPr>
+          <p:nvPr/>
+        </p:nvCxnSpPr>
+        <p:spPr>
+          <a:xfrm flipH="1" flipV="1">
+            <a:off x="2781939" y="2972453"/>
+            <a:ext cx="16698" cy="620204"/>
+          </a:xfrm>
+          <a:prstGeom prst="straightConnector1">
+            <a:avLst/>
+          </a:prstGeom>
+          <a:ln w="19050">
+            <a:solidFill>
+              <a:schemeClr val="accent5">
+                <a:lumMod val="75000"/>
+              </a:schemeClr>
+            </a:solidFill>
+            <a:prstDash val="sysDash"/>
+            <a:headEnd type="none" w="lg" len="lg"/>
+            <a:tailEnd type="triangle" w="lg" len="lg"/>
+          </a:ln>
+        </p:spPr>
+        <p:style>
+          <a:lnRef idx="1">
+            <a:schemeClr val="accent1"/>
+          </a:lnRef>
+          <a:fillRef idx="0">
+            <a:schemeClr val="accent1"/>
+          </a:fillRef>
+          <a:effectRef idx="0">
+            <a:schemeClr val="accent1"/>
+          </a:effectRef>
+          <a:fontRef idx="minor">
+            <a:schemeClr val="tx1"/>
+          </a:fontRef>
+        </p:style>
+      </p:cxnSp>
+      <p:grpSp>
+        <p:nvGrpSpPr>
+          <p:cNvPr id="37" name="Group 36">
+            <a:extLst>
+              <a:ext uri="{FF2B5EF4-FFF2-40B4-BE49-F238E27FC236}">
+                <a16:creationId xmlns:a16="http://schemas.microsoft.com/office/drawing/2014/main" id="{E0C9C0A6-6B42-436A-A23B-98D5E09863A0}"/>
+              </a:ext>
+            </a:extLst>
+          </p:cNvPr>
+          <p:cNvGrpSpPr/>
+          <p:nvPr/>
+        </p:nvGrpSpPr>
+        <p:grpSpPr>
+          <a:xfrm>
+            <a:off x="4605325" y="5887285"/>
+            <a:ext cx="2032042" cy="1355310"/>
+            <a:chOff x="8741678" y="1583056"/>
+            <a:chExt cx="2566458" cy="2092276"/>
+          </a:xfrm>
+        </p:grpSpPr>
+        <p:sp>
+          <p:nvSpPr>
+            <p:cNvPr id="38" name="Retângulo 17">
+              <a:extLst>
+                <a:ext uri="{FF2B5EF4-FFF2-40B4-BE49-F238E27FC236}">
+                  <a16:creationId xmlns:a16="http://schemas.microsoft.com/office/drawing/2014/main" id="{79859D20-FFD4-4BF1-A341-BDB3442E43F3}"/>
+                </a:ext>
+              </a:extLst>
+            </p:cNvPr>
+            <p:cNvSpPr/>
+            <p:nvPr/>
+          </p:nvSpPr>
+          <p:spPr>
+            <a:xfrm>
+              <a:off x="8931871" y="1659108"/>
+              <a:ext cx="2376264" cy="2016224"/>
+            </a:xfrm>
+            <a:prstGeom prst="rect">
+              <a:avLst/>
+            </a:prstGeom>
+            <a:ln/>
+          </p:spPr>
+          <p:style>
+            <a:lnRef idx="2">
+              <a:schemeClr val="accent5">
+                <a:shade val="50000"/>
+              </a:schemeClr>
+            </a:lnRef>
+            <a:fillRef idx="1">
+              <a:schemeClr val="accent5"/>
+            </a:fillRef>
+            <a:effectRef idx="0">
+              <a:schemeClr val="accent5"/>
+            </a:effectRef>
+            <a:fontRef idx="minor">
+              <a:schemeClr val="lt1"/>
+            </a:fontRef>
+          </p:style>
+          <p:txBody>
+            <a:bodyPr rtlCol="0" anchor="ctr"/>
+            <a:lstStyle/>
+            <a:p>
+              <a:pPr algn="ctr"/>
+              <a:endParaRPr lang="pt-BR" sz="1400" dirty="0">
+                <a:solidFill>
+                  <a:prstClr val="white"/>
+                </a:solidFill>
+                <a:latin typeface="Calibri"/>
+              </a:endParaRPr>
+            </a:p>
+            <a:p>
+              <a:pPr algn="ctr"/>
+              <a:r>
+                <a:rPr lang="pt-BR" sz="1400" dirty="0">
+                  <a:solidFill>
+                    <a:prstClr val="white"/>
+                  </a:solidFill>
+                  <a:latin typeface="Calibri"/>
+                </a:rPr>
+                <a:t>Exibição de relatorio</a:t>
+              </a:r>
+            </a:p>
+          </p:txBody>
+        </p:sp>
+        <p:sp>
+          <p:nvSpPr>
+            <p:cNvPr id="39" name="Retângulo 20">
+              <a:extLst>
+                <a:ext uri="{FF2B5EF4-FFF2-40B4-BE49-F238E27FC236}">
+                  <a16:creationId xmlns:a16="http://schemas.microsoft.com/office/drawing/2014/main" id="{29AE57D3-5AB3-4DDD-91AA-F8FE99F98CDD}"/>
+                </a:ext>
+              </a:extLst>
+            </p:cNvPr>
+            <p:cNvSpPr/>
+            <p:nvPr/>
+          </p:nvSpPr>
+          <p:spPr>
+            <a:xfrm>
+              <a:off x="8741678" y="1583056"/>
+              <a:ext cx="2566458" cy="807727"/>
+            </a:xfrm>
+            <a:prstGeom prst="rect">
+              <a:avLst/>
+            </a:prstGeom>
+          </p:spPr>
+          <p:txBody>
+            <a:bodyPr wrap="square">
+              <a:spAutoFit/>
+            </a:bodyPr>
+            <a:lstStyle/>
+            <a:p>
+              <a:pPr lvl="0" algn="ctr">
+                <a:defRPr/>
+              </a:pPr>
+              <a:r>
+                <a:rPr lang="pt-BR" sz="1600" b="1" dirty="0">
+                  <a:solidFill>
+                    <a:prstClr val="white"/>
+                  </a:solidFill>
+                </a:rPr>
+                <a:t>Mobile App</a:t>
+              </a:r>
+            </a:p>
+            <a:p>
+              <a:pPr lvl="0" algn="ctr">
+                <a:defRPr/>
+              </a:pPr>
+              <a:r>
+                <a:rPr lang="pt-BR" sz="1200" dirty="0">
+                  <a:solidFill>
+                    <a:prstClr val="white"/>
+                  </a:solidFill>
+                </a:rPr>
+                <a:t>[Container: Kotlin]</a:t>
+              </a:r>
+            </a:p>
+          </p:txBody>
+        </p:sp>
+        <p:sp>
+          <p:nvSpPr>
+            <p:cNvPr id="40" name="Retângulo 20">
+              <a:extLst>
+                <a:ext uri="{FF2B5EF4-FFF2-40B4-BE49-F238E27FC236}">
+                  <a16:creationId xmlns:a16="http://schemas.microsoft.com/office/drawing/2014/main" id="{605122BF-592E-4130-B8A3-0C0E38A1C590}"/>
+                </a:ext>
+              </a:extLst>
+            </p:cNvPr>
+            <p:cNvSpPr/>
+            <p:nvPr/>
+          </p:nvSpPr>
+          <p:spPr>
+            <a:xfrm>
+              <a:off x="8924638" y="2439787"/>
+              <a:ext cx="2307052" cy="391986"/>
+            </a:xfrm>
+            <a:prstGeom prst="rect">
+              <a:avLst/>
+            </a:prstGeom>
+          </p:spPr>
+          <p:txBody>
+            <a:bodyPr wrap="square">
+              <a:spAutoFit/>
+            </a:bodyPr>
+            <a:lstStyle/>
+            <a:p>
+              <a:pPr lvl="0" algn="ctr">
+                <a:defRPr/>
+              </a:pPr>
+              <a:endParaRPr lang="pt-BR" sz="1050" dirty="0">
+                <a:solidFill>
+                  <a:prstClr val="white"/>
+                </a:solidFill>
+              </a:endParaRPr>
+            </a:p>
+          </p:txBody>
+        </p:sp>
+      </p:grpSp>
+      <p:grpSp>
+        <p:nvGrpSpPr>
+          <p:cNvPr id="55" name="Agrupar 11">
+            <a:extLst>
+              <a:ext uri="{FF2B5EF4-FFF2-40B4-BE49-F238E27FC236}">
+                <a16:creationId xmlns:a16="http://schemas.microsoft.com/office/drawing/2014/main" id="{4A81563F-FD72-4335-A966-00671EEF9BA6}"/>
+              </a:ext>
+            </a:extLst>
+          </p:cNvPr>
+          <p:cNvGrpSpPr/>
+          <p:nvPr/>
+        </p:nvGrpSpPr>
+        <p:grpSpPr>
+          <a:xfrm>
+            <a:off x="5575819" y="3298805"/>
+            <a:ext cx="2691508" cy="2185474"/>
+            <a:chOff x="85840" y="1548384"/>
+            <a:chExt cx="2638466" cy="2016223"/>
+          </a:xfrm>
+        </p:grpSpPr>
+        <p:sp>
+          <p:nvSpPr>
+            <p:cNvPr id="56" name="Retângulo 29">
+              <a:extLst>
+                <a:ext uri="{FF2B5EF4-FFF2-40B4-BE49-F238E27FC236}">
+                  <a16:creationId xmlns:a16="http://schemas.microsoft.com/office/drawing/2014/main" id="{80630F33-FC00-47F8-B599-25833565EC6A}"/>
+                </a:ext>
+              </a:extLst>
+            </p:cNvPr>
+            <p:cNvSpPr/>
+            <p:nvPr/>
+          </p:nvSpPr>
+          <p:spPr>
+            <a:xfrm>
+              <a:off x="239729" y="1548384"/>
+              <a:ext cx="2377291" cy="2016223"/>
+            </a:xfrm>
+            <a:prstGeom prst="rect">
+              <a:avLst/>
+            </a:prstGeom>
+            <a:solidFill>
+              <a:schemeClr val="bg1">
+                <a:lumMod val="85000"/>
+              </a:schemeClr>
+            </a:solidFill>
+            <a:ln>
+              <a:solidFill>
+                <a:srgbClr val="253746"/>
+              </a:solidFill>
+              <a:prstDash val="dash"/>
+            </a:ln>
+          </p:spPr>
+          <p:style>
+            <a:lnRef idx="2">
+              <a:schemeClr val="accent1">
+                <a:shade val="50000"/>
+              </a:schemeClr>
+            </a:lnRef>
+            <a:fillRef idx="1">
+              <a:schemeClr val="accent1"/>
+            </a:fillRef>
+            <a:effectRef idx="0">
+              <a:schemeClr val="accent1"/>
+            </a:effectRef>
+            <a:fontRef idx="minor">
+              <a:schemeClr val="lt1"/>
+            </a:fontRef>
+          </p:style>
+          <p:txBody>
+            <a:bodyPr rtlCol="0" anchor="ctr"/>
+            <a:lstStyle/>
+            <a:p>
+              <a:pPr algn="ctr"/>
+              <a:endParaRPr lang="pt-BR" sz="1400" dirty="0">
+                <a:solidFill>
+                  <a:prstClr val="white"/>
+                </a:solidFill>
+                <a:latin typeface="Calibri"/>
+              </a:endParaRPr>
+            </a:p>
+          </p:txBody>
+        </p:sp>
+        <p:sp>
+          <p:nvSpPr>
+            <p:cNvPr id="57" name="Retângulo 20">
+              <a:extLst>
+                <a:ext uri="{FF2B5EF4-FFF2-40B4-BE49-F238E27FC236}">
+                  <a16:creationId xmlns:a16="http://schemas.microsoft.com/office/drawing/2014/main" id="{13E87E20-64A3-4C42-8E2A-1A381175F0AF}"/>
+                </a:ext>
+              </a:extLst>
+            </p:cNvPr>
+            <p:cNvSpPr/>
+            <p:nvPr/>
+          </p:nvSpPr>
+          <p:spPr>
+            <a:xfrm>
+              <a:off x="85840" y="1686174"/>
+              <a:ext cx="2566458" cy="482700"/>
+            </a:xfrm>
+            <a:prstGeom prst="rect">
+              <a:avLst/>
+            </a:prstGeom>
+          </p:spPr>
+          <p:txBody>
+            <a:bodyPr wrap="square">
+              <a:spAutoFit/>
+            </a:bodyPr>
+            <a:lstStyle/>
+            <a:p>
+              <a:pPr lvl="0" algn="ctr">
+                <a:defRPr/>
+              </a:pPr>
+              <a:r>
+                <a:rPr lang="pt-BR" sz="1600" b="1" dirty="0"/>
+                <a:t>MFA Application</a:t>
+              </a:r>
+            </a:p>
+            <a:p>
+              <a:pPr lvl="0" algn="ctr">
+                <a:defRPr/>
+              </a:pPr>
+              <a:r>
+                <a:rPr lang="pt-BR" sz="1200" dirty="0"/>
+                <a:t>[Container: SecurID]</a:t>
+              </a:r>
+            </a:p>
+          </p:txBody>
+        </p:sp>
+        <p:sp>
+          <p:nvSpPr>
+            <p:cNvPr id="58" name="Retângulo 20">
+              <a:extLst>
+                <a:ext uri="{FF2B5EF4-FFF2-40B4-BE49-F238E27FC236}">
+                  <a16:creationId xmlns:a16="http://schemas.microsoft.com/office/drawing/2014/main" id="{B4B8AB54-8E24-4F0C-AF50-9BB2FA8BC070}"/>
+                </a:ext>
+              </a:extLst>
+            </p:cNvPr>
+            <p:cNvSpPr/>
+            <p:nvPr/>
+          </p:nvSpPr>
+          <p:spPr>
+            <a:xfrm>
+              <a:off x="157848" y="2542903"/>
+              <a:ext cx="2566458" cy="255547"/>
+            </a:xfrm>
+            <a:prstGeom prst="rect">
+              <a:avLst/>
+            </a:prstGeom>
+          </p:spPr>
+          <p:txBody>
+            <a:bodyPr wrap="square">
+              <a:spAutoFit/>
+            </a:bodyPr>
+            <a:lstStyle/>
+            <a:p>
+              <a:pPr lvl="0" algn="ctr">
+                <a:defRPr/>
+              </a:pPr>
+              <a:r>
+                <a:rPr lang="pt-BR" sz="1200" dirty="0"/>
+                <a:t>Autenticação de usuario </a:t>
+              </a:r>
+              <a:endParaRPr lang="pt-BR" sz="1050" dirty="0"/>
+            </a:p>
+          </p:txBody>
+        </p:sp>
+      </p:grpSp>
+      <p:sp>
+        <p:nvSpPr>
+          <p:cNvPr id="81" name="Fluxograma: Disco Magnético 5">
+            <a:extLst>
+              <a:ext uri="{FF2B5EF4-FFF2-40B4-BE49-F238E27FC236}">
+                <a16:creationId xmlns:a16="http://schemas.microsoft.com/office/drawing/2014/main" id="{61BE9E55-B573-4199-8FB8-126EA7BBCAC2}"/>
+              </a:ext>
+            </a:extLst>
+          </p:cNvPr>
+          <p:cNvSpPr/>
+          <p:nvPr/>
+        </p:nvSpPr>
+        <p:spPr>
+          <a:xfrm>
+            <a:off x="1724770" y="955307"/>
+            <a:ext cx="1890292" cy="2107162"/>
+          </a:xfrm>
+          <a:prstGeom prst="flowChartMagneticDisk">
+            <a:avLst/>
+          </a:prstGeom>
+          <a:solidFill>
+            <a:schemeClr val="bg1">
+              <a:lumMod val="50000"/>
+            </a:schemeClr>
+          </a:solidFill>
+          <a:ln>
+            <a:solidFill>
+              <a:srgbClr val="253746"/>
+            </a:solidFill>
+          </a:ln>
+        </p:spPr>
+        <p:style>
+          <a:lnRef idx="2">
+            <a:schemeClr val="accent1">
+              <a:shade val="50000"/>
+            </a:schemeClr>
+          </a:lnRef>
+          <a:fillRef idx="1">
+            <a:schemeClr val="accent1"/>
+          </a:fillRef>
+          <a:effectRef idx="0">
+            <a:schemeClr val="accent1"/>
+          </a:effectRef>
+          <a:fontRef idx="minor">
+            <a:schemeClr val="lt1"/>
+          </a:fontRef>
+        </p:style>
+        <p:txBody>
+          <a:bodyPr rtlCol="0" anchor="ctr"/>
+          <a:lstStyle/>
+          <a:p>
+            <a:pPr algn="ctr"/>
+            <a:endParaRPr lang="pt-BR" sz="1400" dirty="0">
+              <a:solidFill>
+                <a:prstClr val="white"/>
+              </a:solidFill>
+              <a:latin typeface="Calibri"/>
+            </a:endParaRPr>
+          </a:p>
+        </p:txBody>
+      </p:sp>
+      <p:sp>
+        <p:nvSpPr>
+          <p:cNvPr id="82" name="Retângulo 20">
+            <a:extLst>
+              <a:ext uri="{FF2B5EF4-FFF2-40B4-BE49-F238E27FC236}">
+                <a16:creationId xmlns:a16="http://schemas.microsoft.com/office/drawing/2014/main" id="{65AE5428-52D5-4525-A1BF-92AC40AB339C}"/>
+              </a:ext>
+            </a:extLst>
+          </p:cNvPr>
+          <p:cNvSpPr/>
+          <p:nvPr/>
+        </p:nvSpPr>
+        <p:spPr>
+          <a:xfrm>
+            <a:off x="1559576" y="1567922"/>
+            <a:ext cx="2220680" cy="523220"/>
+          </a:xfrm>
+          <a:prstGeom prst="rect">
+            <a:avLst/>
+          </a:prstGeom>
+        </p:spPr>
+        <p:txBody>
+          <a:bodyPr wrap="square">
+            <a:spAutoFit/>
+          </a:bodyPr>
+          <a:lstStyle/>
+          <a:p>
+            <a:pPr lvl="0" algn="ctr">
+              <a:defRPr/>
+            </a:pPr>
+            <a:r>
+              <a:rPr lang="pt-BR" sz="1600" b="1" dirty="0">
+                <a:solidFill>
+                  <a:prstClr val="white"/>
+                </a:solidFill>
+              </a:rPr>
+              <a:t>Database</a:t>
+            </a:r>
+          </a:p>
+          <a:p>
+            <a:pPr lvl="0" algn="ctr">
+              <a:defRPr/>
+            </a:pPr>
+            <a:r>
+              <a:rPr lang="pt-BR" sz="1200" dirty="0">
+                <a:solidFill>
+                  <a:prstClr val="white"/>
+                </a:solidFill>
+              </a:rPr>
+              <a:t>[Container: SQL Server]</a:t>
+            </a:r>
+          </a:p>
+        </p:txBody>
+      </p:sp>
+      <p:sp>
+        <p:nvSpPr>
+          <p:cNvPr id="83" name="Retângulo 20">
+            <a:extLst>
+              <a:ext uri="{FF2B5EF4-FFF2-40B4-BE49-F238E27FC236}">
+                <a16:creationId xmlns:a16="http://schemas.microsoft.com/office/drawing/2014/main" id="{108FBBEF-6E64-49DF-89B3-C7F7C73FB728}"/>
+              </a:ext>
+            </a:extLst>
+          </p:cNvPr>
+          <p:cNvSpPr/>
+          <p:nvPr/>
+        </p:nvSpPr>
+        <p:spPr>
+          <a:xfrm>
+            <a:off x="1878857" y="1902089"/>
+            <a:ext cx="1579989" cy="646331"/>
+          </a:xfrm>
+          <a:prstGeom prst="rect">
+            <a:avLst/>
+          </a:prstGeom>
+        </p:spPr>
+        <p:txBody>
+          <a:bodyPr wrap="square">
+            <a:spAutoFit/>
+          </a:bodyPr>
+          <a:lstStyle/>
+          <a:p>
+            <a:pPr lvl="0" algn="ctr">
+              <a:defRPr/>
+            </a:pPr>
+            <a:endParaRPr lang="pt-BR" sz="1200" dirty="0">
+              <a:solidFill>
+                <a:prstClr val="white"/>
+              </a:solidFill>
+            </a:endParaRPr>
+          </a:p>
+          <a:p>
+            <a:pPr lvl="0" algn="ctr">
+              <a:defRPr/>
+            </a:pPr>
+            <a:r>
+              <a:rPr lang="pt-BR" sz="1200" dirty="0">
+                <a:solidFill>
+                  <a:prstClr val="white"/>
+                </a:solidFill>
+              </a:rPr>
+              <a:t>Armazena os dados das máquinas.</a:t>
+            </a:r>
+            <a:endParaRPr lang="pt-BR" sz="1050" dirty="0">
+              <a:solidFill>
+                <a:prstClr val="white"/>
+              </a:solidFill>
+            </a:endParaRPr>
+          </a:p>
+        </p:txBody>
+      </p:sp>
+      <p:cxnSp>
+        <p:nvCxnSpPr>
+          <p:cNvPr id="92" name="Conector de Seta Reta 107">
+            <a:extLst>
+              <a:ext uri="{FF2B5EF4-FFF2-40B4-BE49-F238E27FC236}">
+                <a16:creationId xmlns:a16="http://schemas.microsoft.com/office/drawing/2014/main" id="{A0C56A28-639D-43F4-A126-D49387944AC3}"/>
+              </a:ext>
+            </a:extLst>
+          </p:cNvPr>
+          <p:cNvCxnSpPr>
+            <a:cxnSpLocks/>
+            <a:stCxn id="56" idx="0"/>
+            <a:endCxn id="8" idx="2"/>
+          </p:cNvCxnSpPr>
+          <p:nvPr/>
+        </p:nvCxnSpPr>
+        <p:spPr>
+          <a:xfrm flipH="1" flipV="1">
+            <a:off x="6927287" y="2840764"/>
+            <a:ext cx="18057" cy="458041"/>
+          </a:xfrm>
+          <a:prstGeom prst="straightConnector1">
+            <a:avLst/>
+          </a:prstGeom>
+          <a:ln w="19050">
+            <a:solidFill>
+              <a:schemeClr val="accent5">
+                <a:lumMod val="75000"/>
+              </a:schemeClr>
+            </a:solidFill>
+            <a:prstDash val="sysDash"/>
+            <a:headEnd type="none" w="lg" len="lg"/>
+            <a:tailEnd type="triangle" w="lg" len="lg"/>
+          </a:ln>
+        </p:spPr>
+        <p:style>
+          <a:lnRef idx="1">
+            <a:schemeClr val="accent1"/>
+          </a:lnRef>
+          <a:fillRef idx="0">
+            <a:schemeClr val="accent1"/>
+          </a:fillRef>
+          <a:effectRef idx="0">
+            <a:schemeClr val="accent1"/>
+          </a:effectRef>
+          <a:fontRef idx="minor">
+            <a:schemeClr val="tx1"/>
+          </a:fontRef>
+        </p:style>
+      </p:cxnSp>
+      <p:cxnSp>
+        <p:nvCxnSpPr>
+          <p:cNvPr id="97" name="Conector de Seta Reta 107">
+            <a:extLst>
+              <a:ext uri="{FF2B5EF4-FFF2-40B4-BE49-F238E27FC236}">
+                <a16:creationId xmlns:a16="http://schemas.microsoft.com/office/drawing/2014/main" id="{A61D196A-475F-4343-9A12-B727DB3DAB4F}"/>
+              </a:ext>
+            </a:extLst>
+          </p:cNvPr>
+          <p:cNvCxnSpPr>
+            <a:cxnSpLocks/>
+            <a:stCxn id="39" idx="0"/>
+          </p:cNvCxnSpPr>
+          <p:nvPr/>
+        </p:nvCxnSpPr>
+        <p:spPr>
+          <a:xfrm flipV="1">
+            <a:off x="5621346" y="5520863"/>
+            <a:ext cx="147534" cy="366422"/>
+          </a:xfrm>
+          <a:prstGeom prst="straightConnector1">
+            <a:avLst/>
+          </a:prstGeom>
+          <a:ln w="19050">
+            <a:solidFill>
+              <a:schemeClr val="accent5">
+                <a:lumMod val="75000"/>
+              </a:schemeClr>
+            </a:solidFill>
+            <a:prstDash val="sysDash"/>
+            <a:headEnd type="none" w="lg" len="lg"/>
+            <a:tailEnd type="triangle" w="lg" len="lg"/>
+          </a:ln>
+        </p:spPr>
+        <p:style>
+          <a:lnRef idx="1">
+            <a:schemeClr val="accent1"/>
+          </a:lnRef>
+          <a:fillRef idx="0">
+            <a:schemeClr val="accent1"/>
+          </a:fillRef>
+          <a:effectRef idx="0">
+            <a:schemeClr val="accent1"/>
+          </a:effectRef>
+          <a:fontRef idx="minor">
+            <a:schemeClr val="tx1"/>
+          </a:fontRef>
+        </p:style>
+      </p:cxnSp>
+      <p:cxnSp>
+        <p:nvCxnSpPr>
+          <p:cNvPr id="98" name="Conector de Seta Reta 107">
+            <a:extLst>
+              <a:ext uri="{FF2B5EF4-FFF2-40B4-BE49-F238E27FC236}">
+                <a16:creationId xmlns:a16="http://schemas.microsoft.com/office/drawing/2014/main" id="{61148779-3708-4B79-BA5C-EB8679A5279E}"/>
+              </a:ext>
+            </a:extLst>
+          </p:cNvPr>
+          <p:cNvCxnSpPr>
+            <a:cxnSpLocks/>
+            <a:stCxn id="15" idx="0"/>
+          </p:cNvCxnSpPr>
+          <p:nvPr/>
+        </p:nvCxnSpPr>
+        <p:spPr>
+          <a:xfrm flipH="1" flipV="1">
+            <a:off x="8157885" y="5479701"/>
+            <a:ext cx="1009474" cy="243408"/>
+          </a:xfrm>
+          <a:prstGeom prst="straightConnector1">
+            <a:avLst/>
+          </a:prstGeom>
+          <a:ln w="19050">
+            <a:solidFill>
+              <a:schemeClr val="accent5">
+                <a:lumMod val="75000"/>
+              </a:schemeClr>
+            </a:solidFill>
+            <a:prstDash val="sysDash"/>
+            <a:headEnd type="none" w="lg" len="lg"/>
+            <a:tailEnd type="triangle" w="lg" len="lg"/>
+          </a:ln>
+        </p:spPr>
+        <p:style>
+          <a:lnRef idx="1">
+            <a:schemeClr val="accent1"/>
+          </a:lnRef>
+          <a:fillRef idx="0">
+            <a:schemeClr val="accent1"/>
+          </a:fillRef>
+          <a:effectRef idx="0">
+            <a:schemeClr val="accent1"/>
+          </a:effectRef>
+          <a:fontRef idx="minor">
+            <a:schemeClr val="tx1"/>
+          </a:fontRef>
+        </p:style>
+      </p:cxnSp>
+      <p:grpSp>
+        <p:nvGrpSpPr>
+          <p:cNvPr id="102" name="Group 101">
+            <a:extLst>
+              <a:ext uri="{FF2B5EF4-FFF2-40B4-BE49-F238E27FC236}">
+                <a16:creationId xmlns:a16="http://schemas.microsoft.com/office/drawing/2014/main" id="{1619B22E-BAE2-4D8C-B7F6-99AED5A0DA86}"/>
+              </a:ext>
+            </a:extLst>
+          </p:cNvPr>
+          <p:cNvGrpSpPr/>
+          <p:nvPr/>
+        </p:nvGrpSpPr>
+        <p:grpSpPr>
+          <a:xfrm>
+            <a:off x="1574703" y="3592657"/>
+            <a:ext cx="2414472" cy="1825058"/>
+            <a:chOff x="4755662" y="1781271"/>
+            <a:chExt cx="5014828" cy="2355721"/>
+          </a:xfrm>
+        </p:grpSpPr>
+        <p:sp>
+          <p:nvSpPr>
+            <p:cNvPr id="103" name="Retângulo 17">
+              <a:extLst>
+                <a:ext uri="{FF2B5EF4-FFF2-40B4-BE49-F238E27FC236}">
+                  <a16:creationId xmlns:a16="http://schemas.microsoft.com/office/drawing/2014/main" id="{DE5369CF-77FC-4CD0-924B-014401339DDF}"/>
+                </a:ext>
+              </a:extLst>
+            </p:cNvPr>
+            <p:cNvSpPr/>
+            <p:nvPr/>
+          </p:nvSpPr>
+          <p:spPr>
+            <a:xfrm>
+              <a:off x="4755662" y="1875189"/>
+              <a:ext cx="5014828" cy="2261803"/>
+            </a:xfrm>
+            <a:prstGeom prst="rect">
+              <a:avLst/>
+            </a:prstGeom>
+            <a:ln/>
+          </p:spPr>
+          <p:style>
+            <a:lnRef idx="2">
+              <a:schemeClr val="accent5">
+                <a:shade val="50000"/>
+              </a:schemeClr>
+            </a:lnRef>
+            <a:fillRef idx="1">
+              <a:schemeClr val="accent5"/>
+            </a:fillRef>
+            <a:effectRef idx="0">
+              <a:schemeClr val="accent5"/>
+            </a:effectRef>
+            <a:fontRef idx="minor">
+              <a:schemeClr val="lt1"/>
+            </a:fontRef>
+          </p:style>
+          <p:txBody>
+            <a:bodyPr rtlCol="0" anchor="ctr"/>
+            <a:lstStyle/>
+            <a:p>
+              <a:pPr algn="ctr"/>
+              <a:endParaRPr lang="pt-BR" sz="1400" dirty="0">
+                <a:solidFill>
+                  <a:prstClr val="white"/>
+                </a:solidFill>
+                <a:latin typeface="Calibri"/>
+              </a:endParaRPr>
+            </a:p>
+            <a:p>
+              <a:pPr algn="ctr"/>
+              <a:r>
+                <a:rPr lang="pt-BR" sz="1400" dirty="0">
+                  <a:solidFill>
+                    <a:prstClr val="white"/>
+                  </a:solidFill>
+                  <a:latin typeface="Calibri"/>
+                </a:rPr>
+                <a:t>Aplicação que controla o numero de requisições e envia para o banco</a:t>
+              </a:r>
+            </a:p>
+          </p:txBody>
+        </p:sp>
+        <p:sp>
+          <p:nvSpPr>
+            <p:cNvPr id="104" name="Retângulo 20">
+              <a:extLst>
+                <a:ext uri="{FF2B5EF4-FFF2-40B4-BE49-F238E27FC236}">
+                  <a16:creationId xmlns:a16="http://schemas.microsoft.com/office/drawing/2014/main" id="{DE97A06A-A774-4EEC-B2EA-0796595F692E}"/>
+                </a:ext>
+              </a:extLst>
+            </p:cNvPr>
+            <p:cNvSpPr/>
+            <p:nvPr/>
+          </p:nvSpPr>
+          <p:spPr>
+            <a:xfrm>
+              <a:off x="4825025" y="1781271"/>
+              <a:ext cx="4945463" cy="913714"/>
+            </a:xfrm>
+            <a:prstGeom prst="rect">
+              <a:avLst/>
+            </a:prstGeom>
+          </p:spPr>
+          <p:txBody>
+            <a:bodyPr wrap="square">
+              <a:spAutoFit/>
+            </a:bodyPr>
+            <a:lstStyle/>
+            <a:p>
+              <a:pPr lvl="0" algn="ctr">
+                <a:defRPr/>
+              </a:pPr>
+              <a:r>
+                <a:rPr lang="pt-BR" sz="1600" b="1" dirty="0">
+                  <a:solidFill>
+                    <a:prstClr val="white"/>
+                  </a:solidFill>
+                </a:rPr>
+                <a:t>WebApplication</a:t>
+              </a:r>
+            </a:p>
+            <a:p>
+              <a:pPr lvl="0" algn="ctr">
+                <a:defRPr/>
+              </a:pPr>
+              <a:r>
+                <a:rPr lang="pt-BR" sz="1200" dirty="0">
+                  <a:solidFill>
+                    <a:prstClr val="white"/>
+                  </a:solidFill>
+                </a:rPr>
+                <a:t>[Container: SpringBoot]</a:t>
+              </a:r>
+            </a:p>
+            <a:p>
+              <a:pPr lvl="0" algn="ctr">
+                <a:defRPr/>
+              </a:pPr>
+              <a:endParaRPr lang="pt-BR" sz="1200" dirty="0">
+                <a:solidFill>
+                  <a:prstClr val="white"/>
+                </a:solidFill>
+              </a:endParaRPr>
+            </a:p>
+          </p:txBody>
+        </p:sp>
+      </p:grpSp>
+      <p:cxnSp>
+        <p:nvCxnSpPr>
+          <p:cNvPr id="111" name="Conector de Seta Reta 107">
+            <a:extLst>
+              <a:ext uri="{FF2B5EF4-FFF2-40B4-BE49-F238E27FC236}">
+                <a16:creationId xmlns:a16="http://schemas.microsoft.com/office/drawing/2014/main" id="{CC30A1EC-92CA-4DE8-9C35-E45C9852BA5E}"/>
+              </a:ext>
+            </a:extLst>
+          </p:cNvPr>
+          <p:cNvCxnSpPr>
+            <a:cxnSpLocks/>
+            <a:endCxn id="103" idx="2"/>
+          </p:cNvCxnSpPr>
+          <p:nvPr/>
+        </p:nvCxnSpPr>
+        <p:spPr>
+          <a:xfrm flipV="1">
+            <a:off x="2781939" y="5417715"/>
+            <a:ext cx="0" cy="520285"/>
+          </a:xfrm>
+          <a:prstGeom prst="straightConnector1">
+            <a:avLst/>
+          </a:prstGeom>
+          <a:ln w="19050">
+            <a:solidFill>
+              <a:schemeClr val="accent5">
+                <a:lumMod val="75000"/>
+              </a:schemeClr>
+            </a:solidFill>
+            <a:prstDash val="sysDash"/>
+            <a:headEnd type="none" w="lg" len="lg"/>
+            <a:tailEnd type="triangle" w="lg" len="lg"/>
+          </a:ln>
+        </p:spPr>
+        <p:style>
+          <a:lnRef idx="1">
+            <a:schemeClr val="accent1"/>
+          </a:lnRef>
+          <a:fillRef idx="0">
+            <a:schemeClr val="accent1"/>
+          </a:fillRef>
+          <a:effectRef idx="0">
+            <a:schemeClr val="accent1"/>
+          </a:effectRef>
+          <a:fontRef idx="minor">
+            <a:schemeClr val="tx1"/>
+          </a:fontRef>
+        </p:style>
+      </p:cxnSp>
     </p:spTree>
     <p:extLst>
       <p:ext uri="{BB962C8B-B14F-4D97-AF65-F5344CB8AC3E}">
@@ -23634,6 +25172,606 @@
   <p:clrMapOvr>
     <a:masterClrMapping/>
   </p:clrMapOvr>
+  <p:timing>
+    <p:tnLst>
+      <p:par>
+        <p:cTn id="1" dur="indefinite" restart="never" nodeType="tmRoot">
+          <p:childTnLst>
+            <p:seq concurrent="1" nextAc="seek">
+              <p:cTn id="2" dur="indefinite" nodeType="mainSeq">
+                <p:childTnLst>
+                  <p:par>
+                    <p:cTn id="3" fill="hold">
+                      <p:stCondLst>
+                        <p:cond delay="indefinite"/>
+                      </p:stCondLst>
+                      <p:childTnLst>
+                        <p:par>
+                          <p:cTn id="4" fill="hold">
+                            <p:stCondLst>
+                              <p:cond delay="0"/>
+                            </p:stCondLst>
+                            <p:childTnLst>
+                              <p:par>
+                                <p:cTn id="5" presetID="1" presetClass="entr" presetSubtype="0" fill="hold" nodeType="clickEffect">
+                                  <p:stCondLst>
+                                    <p:cond delay="0"/>
+                                  </p:stCondLst>
+                                  <p:childTnLst>
+                                    <p:set>
+                                      <p:cBhvr>
+                                        <p:cTn id="6" dur="1" fill="hold">
+                                          <p:stCondLst>
+                                            <p:cond delay="0"/>
+                                          </p:stCondLst>
+                                        </p:cTn>
+                                        <p:tgtEl>
+                                          <p:spTgt spid="7"/>
+                                        </p:tgtEl>
+                                        <p:attrNameLst>
+                                          <p:attrName>style.visibility</p:attrName>
+                                        </p:attrNameLst>
+                                      </p:cBhvr>
+                                      <p:to>
+                                        <p:strVal val="visible"/>
+                                      </p:to>
+                                    </p:set>
+                                  </p:childTnLst>
+                                </p:cTn>
+                              </p:par>
+                            </p:childTnLst>
+                          </p:cTn>
+                        </p:par>
+                      </p:childTnLst>
+                    </p:cTn>
+                  </p:par>
+                  <p:par>
+                    <p:cTn id="7" fill="hold">
+                      <p:stCondLst>
+                        <p:cond delay="indefinite"/>
+                      </p:stCondLst>
+                      <p:childTnLst>
+                        <p:par>
+                          <p:cTn id="8" fill="hold">
+                            <p:stCondLst>
+                              <p:cond delay="0"/>
+                            </p:stCondLst>
+                            <p:childTnLst>
+                              <p:par>
+                                <p:cTn id="9" presetID="1" presetClass="entr" presetSubtype="0" fill="hold" nodeType="clickEffect">
+                                  <p:stCondLst>
+                                    <p:cond delay="0"/>
+                                  </p:stCondLst>
+                                  <p:childTnLst>
+                                    <p:set>
+                                      <p:cBhvr>
+                                        <p:cTn id="10" dur="1" fill="hold">
+                                          <p:stCondLst>
+                                            <p:cond delay="0"/>
+                                          </p:stCondLst>
+                                        </p:cTn>
+                                        <p:tgtEl>
+                                          <p:spTgt spid="13"/>
+                                        </p:tgtEl>
+                                        <p:attrNameLst>
+                                          <p:attrName>style.visibility</p:attrName>
+                                        </p:attrNameLst>
+                                      </p:cBhvr>
+                                      <p:to>
+                                        <p:strVal val="visible"/>
+                                      </p:to>
+                                    </p:set>
+                                  </p:childTnLst>
+                                </p:cTn>
+                              </p:par>
+                            </p:childTnLst>
+                          </p:cTn>
+                        </p:par>
+                      </p:childTnLst>
+                    </p:cTn>
+                  </p:par>
+                  <p:par>
+                    <p:cTn id="11" fill="hold">
+                      <p:stCondLst>
+                        <p:cond delay="indefinite"/>
+                      </p:stCondLst>
+                      <p:childTnLst>
+                        <p:par>
+                          <p:cTn id="12" fill="hold">
+                            <p:stCondLst>
+                              <p:cond delay="0"/>
+                            </p:stCondLst>
+                            <p:childTnLst>
+                              <p:par>
+                                <p:cTn id="13" presetID="1" presetClass="entr" presetSubtype="0" fill="hold" nodeType="clickEffect">
+                                  <p:stCondLst>
+                                    <p:cond delay="0"/>
+                                  </p:stCondLst>
+                                  <p:childTnLst>
+                                    <p:set>
+                                      <p:cBhvr>
+                                        <p:cTn id="14" dur="1" fill="hold">
+                                          <p:stCondLst>
+                                            <p:cond delay="0"/>
+                                          </p:stCondLst>
+                                        </p:cTn>
+                                        <p:tgtEl>
+                                          <p:spTgt spid="20"/>
+                                        </p:tgtEl>
+                                        <p:attrNameLst>
+                                          <p:attrName>style.visibility</p:attrName>
+                                        </p:attrNameLst>
+                                      </p:cBhvr>
+                                      <p:to>
+                                        <p:strVal val="visible"/>
+                                      </p:to>
+                                    </p:set>
+                                  </p:childTnLst>
+                                </p:cTn>
+                              </p:par>
+                            </p:childTnLst>
+                          </p:cTn>
+                        </p:par>
+                      </p:childTnLst>
+                    </p:cTn>
+                  </p:par>
+                  <p:par>
+                    <p:cTn id="15" fill="hold">
+                      <p:stCondLst>
+                        <p:cond delay="indefinite"/>
+                      </p:stCondLst>
+                      <p:childTnLst>
+                        <p:par>
+                          <p:cTn id="16" fill="hold">
+                            <p:stCondLst>
+                              <p:cond delay="0"/>
+                            </p:stCondLst>
+                            <p:childTnLst>
+                              <p:par>
+                                <p:cTn id="17" presetID="1" presetClass="entr" presetSubtype="0" fill="hold" nodeType="clickEffect">
+                                  <p:stCondLst>
+                                    <p:cond delay="0"/>
+                                  </p:stCondLst>
+                                  <p:childTnLst>
+                                    <p:set>
+                                      <p:cBhvr>
+                                        <p:cTn id="18" dur="1" fill="hold">
+                                          <p:stCondLst>
+                                            <p:cond delay="0"/>
+                                          </p:stCondLst>
+                                        </p:cTn>
+                                        <p:tgtEl>
+                                          <p:spTgt spid="23"/>
+                                        </p:tgtEl>
+                                        <p:attrNameLst>
+                                          <p:attrName>style.visibility</p:attrName>
+                                        </p:attrNameLst>
+                                      </p:cBhvr>
+                                      <p:to>
+                                        <p:strVal val="visible"/>
+                                      </p:to>
+                                    </p:set>
+                                  </p:childTnLst>
+                                </p:cTn>
+                              </p:par>
+                            </p:childTnLst>
+                          </p:cTn>
+                        </p:par>
+                      </p:childTnLst>
+                    </p:cTn>
+                  </p:par>
+                  <p:par>
+                    <p:cTn id="19" fill="hold">
+                      <p:stCondLst>
+                        <p:cond delay="indefinite"/>
+                      </p:stCondLst>
+                      <p:childTnLst>
+                        <p:par>
+                          <p:cTn id="20" fill="hold">
+                            <p:stCondLst>
+                              <p:cond delay="0"/>
+                            </p:stCondLst>
+                            <p:childTnLst>
+                              <p:par>
+                                <p:cTn id="21" presetID="1" presetClass="entr" presetSubtype="0" fill="hold" nodeType="clickEffect">
+                                  <p:stCondLst>
+                                    <p:cond delay="0"/>
+                                  </p:stCondLst>
+                                  <p:childTnLst>
+                                    <p:set>
+                                      <p:cBhvr>
+                                        <p:cTn id="22" dur="1" fill="hold">
+                                          <p:stCondLst>
+                                            <p:cond delay="0"/>
+                                          </p:stCondLst>
+                                        </p:cTn>
+                                        <p:tgtEl>
+                                          <p:spTgt spid="27"/>
+                                        </p:tgtEl>
+                                        <p:attrNameLst>
+                                          <p:attrName>style.visibility</p:attrName>
+                                        </p:attrNameLst>
+                                      </p:cBhvr>
+                                      <p:to>
+                                        <p:strVal val="visible"/>
+                                      </p:to>
+                                    </p:set>
+                                  </p:childTnLst>
+                                </p:cTn>
+                              </p:par>
+                            </p:childTnLst>
+                          </p:cTn>
+                        </p:par>
+                      </p:childTnLst>
+                    </p:cTn>
+                  </p:par>
+                  <p:par>
+                    <p:cTn id="23" fill="hold">
+                      <p:stCondLst>
+                        <p:cond delay="indefinite"/>
+                      </p:stCondLst>
+                      <p:childTnLst>
+                        <p:par>
+                          <p:cTn id="24" fill="hold">
+                            <p:stCondLst>
+                              <p:cond delay="0"/>
+                            </p:stCondLst>
+                            <p:childTnLst>
+                              <p:par>
+                                <p:cTn id="25" presetID="1" presetClass="entr" presetSubtype="0" fill="hold" nodeType="clickEffect">
+                                  <p:stCondLst>
+                                    <p:cond delay="0"/>
+                                  </p:stCondLst>
+                                  <p:childTnLst>
+                                    <p:set>
+                                      <p:cBhvr>
+                                        <p:cTn id="26" dur="1" fill="hold">
+                                          <p:stCondLst>
+                                            <p:cond delay="0"/>
+                                          </p:stCondLst>
+                                        </p:cTn>
+                                        <p:tgtEl>
+                                          <p:spTgt spid="37"/>
+                                        </p:tgtEl>
+                                        <p:attrNameLst>
+                                          <p:attrName>style.visibility</p:attrName>
+                                        </p:attrNameLst>
+                                      </p:cBhvr>
+                                      <p:to>
+                                        <p:strVal val="visible"/>
+                                      </p:to>
+                                    </p:set>
+                                  </p:childTnLst>
+                                </p:cTn>
+                              </p:par>
+                              <p:par>
+                                <p:cTn id="27" presetID="1" presetClass="entr" presetSubtype="0" fill="hold" nodeType="withEffect">
+                                  <p:stCondLst>
+                                    <p:cond delay="0"/>
+                                  </p:stCondLst>
+                                  <p:childTnLst>
+                                    <p:set>
+                                      <p:cBhvr>
+                                        <p:cTn id="28" dur="1" fill="hold">
+                                          <p:stCondLst>
+                                            <p:cond delay="0"/>
+                                          </p:stCondLst>
+                                        </p:cTn>
+                                        <p:tgtEl>
+                                          <p:spTgt spid="55"/>
+                                        </p:tgtEl>
+                                        <p:attrNameLst>
+                                          <p:attrName>style.visibility</p:attrName>
+                                        </p:attrNameLst>
+                                      </p:cBhvr>
+                                      <p:to>
+                                        <p:strVal val="visible"/>
+                                      </p:to>
+                                    </p:set>
+                                  </p:childTnLst>
+                                </p:cTn>
+                              </p:par>
+                            </p:childTnLst>
+                          </p:cTn>
+                        </p:par>
+                      </p:childTnLst>
+                    </p:cTn>
+                  </p:par>
+                  <p:par>
+                    <p:cTn id="29" fill="hold">
+                      <p:stCondLst>
+                        <p:cond delay="indefinite"/>
+                      </p:stCondLst>
+                      <p:childTnLst>
+                        <p:par>
+                          <p:cTn id="30" fill="hold">
+                            <p:stCondLst>
+                              <p:cond delay="0"/>
+                            </p:stCondLst>
+                            <p:childTnLst>
+                              <p:par>
+                                <p:cTn id="31" presetID="1" presetClass="entr" presetSubtype="0" fill="hold" grpId="0" nodeType="clickEffect">
+                                  <p:stCondLst>
+                                    <p:cond delay="0"/>
+                                  </p:stCondLst>
+                                  <p:childTnLst>
+                                    <p:set>
+                                      <p:cBhvr>
+                                        <p:cTn id="32" dur="1" fill="hold">
+                                          <p:stCondLst>
+                                            <p:cond delay="0"/>
+                                          </p:stCondLst>
+                                        </p:cTn>
+                                        <p:tgtEl>
+                                          <p:spTgt spid="81"/>
+                                        </p:tgtEl>
+                                        <p:attrNameLst>
+                                          <p:attrName>style.visibility</p:attrName>
+                                        </p:attrNameLst>
+                                      </p:cBhvr>
+                                      <p:to>
+                                        <p:strVal val="visible"/>
+                                      </p:to>
+                                    </p:set>
+                                  </p:childTnLst>
+                                </p:cTn>
+                              </p:par>
+                            </p:childTnLst>
+                          </p:cTn>
+                        </p:par>
+                      </p:childTnLst>
+                    </p:cTn>
+                  </p:par>
+                  <p:par>
+                    <p:cTn id="33" fill="hold">
+                      <p:stCondLst>
+                        <p:cond delay="indefinite"/>
+                      </p:stCondLst>
+                      <p:childTnLst>
+                        <p:par>
+                          <p:cTn id="34" fill="hold">
+                            <p:stCondLst>
+                              <p:cond delay="0"/>
+                            </p:stCondLst>
+                            <p:childTnLst>
+                              <p:par>
+                                <p:cTn id="35" presetID="1" presetClass="entr" presetSubtype="0" fill="hold" nodeType="clickEffect">
+                                  <p:stCondLst>
+                                    <p:cond delay="0"/>
+                                  </p:stCondLst>
+                                  <p:childTnLst>
+                                    <p:set>
+                                      <p:cBhvr>
+                                        <p:cTn id="36" dur="1" fill="hold">
+                                          <p:stCondLst>
+                                            <p:cond delay="0"/>
+                                          </p:stCondLst>
+                                        </p:cTn>
+                                        <p:tgtEl>
+                                          <p:spTgt spid="92"/>
+                                        </p:tgtEl>
+                                        <p:attrNameLst>
+                                          <p:attrName>style.visibility</p:attrName>
+                                        </p:attrNameLst>
+                                      </p:cBhvr>
+                                      <p:to>
+                                        <p:strVal val="visible"/>
+                                      </p:to>
+                                    </p:set>
+                                  </p:childTnLst>
+                                </p:cTn>
+                              </p:par>
+                            </p:childTnLst>
+                          </p:cTn>
+                        </p:par>
+                      </p:childTnLst>
+                    </p:cTn>
+                  </p:par>
+                  <p:par>
+                    <p:cTn id="37" fill="hold">
+                      <p:stCondLst>
+                        <p:cond delay="indefinite"/>
+                      </p:stCondLst>
+                      <p:childTnLst>
+                        <p:par>
+                          <p:cTn id="38" fill="hold">
+                            <p:stCondLst>
+                              <p:cond delay="0"/>
+                            </p:stCondLst>
+                            <p:childTnLst>
+                              <p:par>
+                                <p:cTn id="39" presetID="1" presetClass="entr" presetSubtype="0" fill="hold" nodeType="clickEffect">
+                                  <p:stCondLst>
+                                    <p:cond delay="0"/>
+                                  </p:stCondLst>
+                                  <p:childTnLst>
+                                    <p:set>
+                                      <p:cBhvr>
+                                        <p:cTn id="40" dur="1" fill="hold">
+                                          <p:stCondLst>
+                                            <p:cond delay="0"/>
+                                          </p:stCondLst>
+                                        </p:cTn>
+                                        <p:tgtEl>
+                                          <p:spTgt spid="97"/>
+                                        </p:tgtEl>
+                                        <p:attrNameLst>
+                                          <p:attrName>style.visibility</p:attrName>
+                                        </p:attrNameLst>
+                                      </p:cBhvr>
+                                      <p:to>
+                                        <p:strVal val="visible"/>
+                                      </p:to>
+                                    </p:set>
+                                  </p:childTnLst>
+                                </p:cTn>
+                              </p:par>
+                            </p:childTnLst>
+                          </p:cTn>
+                        </p:par>
+                      </p:childTnLst>
+                    </p:cTn>
+                  </p:par>
+                  <p:par>
+                    <p:cTn id="41" fill="hold">
+                      <p:stCondLst>
+                        <p:cond delay="indefinite"/>
+                      </p:stCondLst>
+                      <p:childTnLst>
+                        <p:par>
+                          <p:cTn id="42" fill="hold">
+                            <p:stCondLst>
+                              <p:cond delay="0"/>
+                            </p:stCondLst>
+                            <p:childTnLst>
+                              <p:par>
+                                <p:cTn id="43" presetID="1" presetClass="entr" presetSubtype="0" fill="hold" nodeType="clickEffect">
+                                  <p:stCondLst>
+                                    <p:cond delay="0"/>
+                                  </p:stCondLst>
+                                  <p:childTnLst>
+                                    <p:set>
+                                      <p:cBhvr>
+                                        <p:cTn id="44" dur="1" fill="hold">
+                                          <p:stCondLst>
+                                            <p:cond delay="0"/>
+                                          </p:stCondLst>
+                                        </p:cTn>
+                                        <p:tgtEl>
+                                          <p:spTgt spid="98"/>
+                                        </p:tgtEl>
+                                        <p:attrNameLst>
+                                          <p:attrName>style.visibility</p:attrName>
+                                        </p:attrNameLst>
+                                      </p:cBhvr>
+                                      <p:to>
+                                        <p:strVal val="visible"/>
+                                      </p:to>
+                                    </p:set>
+                                  </p:childTnLst>
+                                </p:cTn>
+                              </p:par>
+                            </p:childTnLst>
+                          </p:cTn>
+                        </p:par>
+                      </p:childTnLst>
+                    </p:cTn>
+                  </p:par>
+                  <p:par>
+                    <p:cTn id="45" fill="hold">
+                      <p:stCondLst>
+                        <p:cond delay="indefinite"/>
+                      </p:stCondLst>
+                      <p:childTnLst>
+                        <p:par>
+                          <p:cTn id="46" fill="hold">
+                            <p:stCondLst>
+                              <p:cond delay="0"/>
+                            </p:stCondLst>
+                            <p:childTnLst>
+                              <p:par>
+                                <p:cTn id="47" presetID="1" presetClass="entr" presetSubtype="0" fill="hold" nodeType="clickEffect">
+                                  <p:stCondLst>
+                                    <p:cond delay="0"/>
+                                  </p:stCondLst>
+                                  <p:childTnLst>
+                                    <p:set>
+                                      <p:cBhvr>
+                                        <p:cTn id="48" dur="1" fill="hold">
+                                          <p:stCondLst>
+                                            <p:cond delay="0"/>
+                                          </p:stCondLst>
+                                        </p:cTn>
+                                        <p:tgtEl>
+                                          <p:spTgt spid="102"/>
+                                        </p:tgtEl>
+                                        <p:attrNameLst>
+                                          <p:attrName>style.visibility</p:attrName>
+                                        </p:attrNameLst>
+                                      </p:cBhvr>
+                                      <p:to>
+                                        <p:strVal val="visible"/>
+                                      </p:to>
+                                    </p:set>
+                                  </p:childTnLst>
+                                </p:cTn>
+                              </p:par>
+                            </p:childTnLst>
+                          </p:cTn>
+                        </p:par>
+                      </p:childTnLst>
+                    </p:cTn>
+                  </p:par>
+                  <p:par>
+                    <p:cTn id="49" fill="hold">
+                      <p:stCondLst>
+                        <p:cond delay="indefinite"/>
+                      </p:stCondLst>
+                      <p:childTnLst>
+                        <p:par>
+                          <p:cTn id="50" fill="hold">
+                            <p:stCondLst>
+                              <p:cond delay="0"/>
+                            </p:stCondLst>
+                            <p:childTnLst>
+                              <p:par>
+                                <p:cTn id="51" presetID="1" presetClass="entr" presetSubtype="0" fill="hold" nodeType="clickEffect">
+                                  <p:stCondLst>
+                                    <p:cond delay="0"/>
+                                  </p:stCondLst>
+                                  <p:childTnLst>
+                                    <p:set>
+                                      <p:cBhvr>
+                                        <p:cTn id="52" dur="1" fill="hold">
+                                          <p:stCondLst>
+                                            <p:cond delay="0"/>
+                                          </p:stCondLst>
+                                        </p:cTn>
+                                        <p:tgtEl>
+                                          <p:spTgt spid="111"/>
+                                        </p:tgtEl>
+                                        <p:attrNameLst>
+                                          <p:attrName>style.visibility</p:attrName>
+                                        </p:attrNameLst>
+                                      </p:cBhvr>
+                                      <p:to>
+                                        <p:strVal val="visible"/>
+                                      </p:to>
+                                    </p:set>
+                                  </p:childTnLst>
+                                </p:cTn>
+                              </p:par>
+                            </p:childTnLst>
+                          </p:cTn>
+                        </p:par>
+                      </p:childTnLst>
+                    </p:cTn>
+                  </p:par>
+                </p:childTnLst>
+              </p:cTn>
+              <p:prevCondLst>
+                <p:cond evt="onPrev" delay="0">
+                  <p:tgtEl>
+                    <p:sldTgt/>
+                  </p:tgtEl>
+                </p:cond>
+              </p:prevCondLst>
+              <p:nextCondLst>
+                <p:cond evt="onNext" delay="0">
+                  <p:tgtEl>
+                    <p:sldTgt/>
+                  </p:tgtEl>
+                </p:cond>
+              </p:nextCondLst>
+            </p:seq>
+          </p:childTnLst>
+        </p:cTn>
+      </p:par>
+    </p:tnLst>
+    <p:bldLst>
+      <p:bldP spid="81" grpId="0" animBg="1"/>
+    </p:bldLst>
+  </p:timing>
 </p:sld>
 </file>
 
@@ -24386,7 +26524,7 @@
         </p:nvGrpSpPr>
         <p:grpSpPr>
           <a:xfrm>
-            <a:off x="3049067" y="4644727"/>
+            <a:off x="3168932" y="4729995"/>
             <a:ext cx="2736304" cy="2016224"/>
             <a:chOff x="3193083" y="4654463"/>
             <a:chExt cx="2736304" cy="2016224"/>
@@ -25322,8 +27460,8 @@
         </p:nvCxnSpPr>
         <p:spPr>
           <a:xfrm rot="10800000">
-            <a:off x="1428375" y="3564607"/>
-            <a:ext cx="1646523" cy="2088232"/>
+            <a:off x="1428374" y="3564607"/>
+            <a:ext cx="1766388" cy="2173500"/>
           </a:xfrm>
           <a:prstGeom prst="bentConnector2">
             <a:avLst/>
@@ -27298,6 +29436,12 @@
 </file>
 
 <file path=customXml/item2.xml><?xml version="1.0" encoding="utf-8"?>
+<p:properties xmlns:p="http://schemas.microsoft.com/office/2006/metadata/properties" xmlns:xsi="http://www.w3.org/2001/XMLSchema-instance" xmlns:pc="http://schemas.microsoft.com/office/infopath/2007/PartnerControls">
+  <documentManagement/>
+</p:properties>
+</file>
+
+<file path=customXml/item3.xml><?xml version="1.0" encoding="utf-8"?>
 <ct:contentTypeSchema xmlns:ct="http://schemas.microsoft.com/office/2006/metadata/contentType" xmlns:ma="http://schemas.microsoft.com/office/2006/metadata/properties/metaAttributes" ct:_="" ma:_="" ma:contentTypeName="Document" ma:contentTypeID="0x0101001132905C37EA9847A7207C4BBCCCD8F4" ma:contentTypeVersion="13" ma:contentTypeDescription="Create a new document." ma:contentTypeScope="" ma:versionID="0fa59793b99d27e1e0b856ab72ac2f0d">
   <xsd:schema xmlns:xsd="http://www.w3.org/2001/XMLSchema" xmlns:xs="http://www.w3.org/2001/XMLSchema" xmlns:p="http://schemas.microsoft.com/office/2006/metadata/properties" xmlns:ns3="4327b14a-fe89-488e-9f6d-9658cacf372b" xmlns:ns4="bbcd8c33-6940-4d4c-a587-bbc736ca1e4d" targetNamespace="http://schemas.microsoft.com/office/2006/metadata/properties" ma:root="true" ma:fieldsID="01494effa1b4414faf4d9851fe547c93" ns3:_="" ns4:_="">
     <xsd:import namespace="4327b14a-fe89-488e-9f6d-9658cacf372b"/>
@@ -27520,12 +29664,6 @@
 </ct:contentTypeSchema>
 </file>
 
-<file path=customXml/item3.xml><?xml version="1.0" encoding="utf-8"?>
-<p:properties xmlns:p="http://schemas.microsoft.com/office/2006/metadata/properties" xmlns:xsi="http://www.w3.org/2001/XMLSchema-instance" xmlns:pc="http://schemas.microsoft.com/office/infopath/2007/PartnerControls">
-  <documentManagement/>
-</p:properties>
-</file>
-
 <file path=customXml/itemProps1.xml><?xml version="1.0" encoding="utf-8"?>
 <ds:datastoreItem xmlns:ds="http://schemas.openxmlformats.org/officeDocument/2006/customXml" ds:itemID="{B2402960-8EF3-4234-B7C9-25E125FD4CA5}">
   <ds:schemaRefs>
@@ -27535,6 +29673,23 @@
 </file>
 
 <file path=customXml/itemProps2.xml><?xml version="1.0" encoding="utf-8"?>
+<ds:datastoreItem xmlns:ds="http://schemas.openxmlformats.org/officeDocument/2006/customXml" ds:itemID="{30D3F7B2-E865-49C4-B6C4-1C3489F322E5}">
+  <ds:schemaRefs>
+    <ds:schemaRef ds:uri="http://purl.org/dc/elements/1.1/"/>
+    <ds:schemaRef ds:uri="http://schemas.microsoft.com/office/2006/metadata/properties"/>
+    <ds:schemaRef ds:uri="4327b14a-fe89-488e-9f6d-9658cacf372b"/>
+    <ds:schemaRef ds:uri="bbcd8c33-6940-4d4c-a587-bbc736ca1e4d"/>
+    <ds:schemaRef ds:uri="http://purl.org/dc/terms/"/>
+    <ds:schemaRef ds:uri="http://schemas.openxmlformats.org/package/2006/metadata/core-properties"/>
+    <ds:schemaRef ds:uri="http://schemas.microsoft.com/office/2006/documentManagement/types"/>
+    <ds:schemaRef ds:uri="http://schemas.microsoft.com/office/infopath/2007/PartnerControls"/>
+    <ds:schemaRef ds:uri="http://www.w3.org/XML/1998/namespace"/>
+    <ds:schemaRef ds:uri="http://purl.org/dc/dcmitype/"/>
+  </ds:schemaRefs>
+</ds:datastoreItem>
+</file>
+
+<file path=customXml/itemProps3.xml><?xml version="1.0" encoding="utf-8"?>
 <ds:datastoreItem xmlns:ds="http://schemas.openxmlformats.org/officeDocument/2006/customXml" ds:itemID="{5B58B9C8-0155-43AB-B381-4C0241D252D3}">
   <ds:schemaRefs>
     <ds:schemaRef ds:uri="http://schemas.microsoft.com/office/2006/metadata/contentType"/>
@@ -27551,21 +29706,4 @@
     <ds:schemaRef ds:uri="http://schemas.microsoft.com/internal/obd"/>
   </ds:schemaRefs>
 </ds:datastoreItem>
-</file>
-
-<file path=customXml/itemProps3.xml><?xml version="1.0" encoding="utf-8"?>
-<ds:datastoreItem xmlns:ds="http://schemas.openxmlformats.org/officeDocument/2006/customXml" ds:itemID="{30D3F7B2-E865-49C4-B6C4-1C3489F322E5}">
-  <ds:schemaRefs>
-    <ds:schemaRef ds:uri="http://purl.org/dc/elements/1.1/"/>
-    <ds:schemaRef ds:uri="http://schemas.microsoft.com/office/2006/metadata/properties"/>
-    <ds:schemaRef ds:uri="4327b14a-fe89-488e-9f6d-9658cacf372b"/>
-    <ds:schemaRef ds:uri="bbcd8c33-6940-4d4c-a587-bbc736ca1e4d"/>
-    <ds:schemaRef ds:uri="http://purl.org/dc/terms/"/>
-    <ds:schemaRef ds:uri="http://schemas.openxmlformats.org/package/2006/metadata/core-properties"/>
-    <ds:schemaRef ds:uri="http://schemas.microsoft.com/office/2006/documentManagement/types"/>
-    <ds:schemaRef ds:uri="http://schemas.microsoft.com/office/infopath/2007/PartnerControls"/>
-    <ds:schemaRef ds:uri="http://www.w3.org/XML/1998/namespace"/>
-    <ds:schemaRef ds:uri="http://purl.org/dc/dcmitype/"/>
-  </ds:schemaRefs>
-</ds:datastoreItem>
 </file>
</xml_diff>

<commit_message>
Exercicio em grupo atualizado
</commit_message>
<xml_diff>
--- a/Documentação/EngenhariaDeSoftware/Engenharia de Sofware - Exercicio em Grupo v1.pptx
+++ b/Documentação/EngenhariaDeSoftware/Engenharia de Sofware - Exercicio em Grupo v1.pptx
@@ -655,7 +655,7 @@
             <a:fld id="{C3CD65D1-5C11-455D-9F9A-0E035F00A0DA}" type="datetimeFigureOut">
               <a:rPr lang="pt-BR" smtClean="0"/>
               <a:pPr/>
-              <a:t>23/09/2021</a:t>
+              <a:t>22/09/2021</a:t>
             </a:fld>
             <a:endParaRPr lang="pt-BR"/>
           </a:p>
@@ -823,7 +823,7 @@
             <a:fld id="{A05DA3EF-18EA-43DE-B1BB-402A3C558822}" type="datetimeFigureOut">
               <a:rPr lang="pt-BR" smtClean="0"/>
               <a:pPr/>
-              <a:t>23/09/2021</a:t>
+              <a:t>22/09/2021</a:t>
             </a:fld>
             <a:endParaRPr lang="pt-BR"/>
           </a:p>
@@ -23612,134 +23612,29 @@
             <p:ph type="body" sz="quarter" idx="13"/>
           </p:nvPr>
         </p:nvSpPr>
-        <p:spPr/>
+        <p:spPr>
+          <a:xfrm>
+            <a:off x="3153666" y="235399"/>
+            <a:ext cx="3391204" cy="511298"/>
+          </a:xfrm>
+        </p:spPr>
         <p:txBody>
           <a:bodyPr/>
           <a:lstStyle/>
           <a:p>
             <a:r>
-              <a:rPr lang="pt-BR" dirty="0"/>
+              <a:rPr lang="pt-BR" sz="3200" dirty="0"/>
               <a:t>Desenho da arquitetura</a:t>
             </a:r>
           </a:p>
         </p:txBody>
       </p:sp>
-      <p:sp>
-        <p:nvSpPr>
-          <p:cNvPr id="21" name="Fluxograma: Disco Magnético 5">
+      <p:grpSp>
+        <p:nvGrpSpPr>
+          <p:cNvPr id="7" name="Group 6">
             <a:extLst>
               <a:ext uri="{FF2B5EF4-FFF2-40B4-BE49-F238E27FC236}">
-                <a16:creationId xmlns:a16="http://schemas.microsoft.com/office/drawing/2014/main" id="{B75CD025-B973-468F-9746-E8247CF5C9B4}"/>
-              </a:ext>
-            </a:extLst>
-          </p:cNvPr>
-          <p:cNvSpPr/>
-          <p:nvPr/>
-        </p:nvSpPr>
-        <p:spPr>
-          <a:xfrm>
-            <a:off x="3015596" y="843901"/>
-            <a:ext cx="1720412" cy="1945912"/>
-          </a:xfrm>
-          <a:prstGeom prst="flowChartMagneticDisk">
-            <a:avLst/>
-          </a:prstGeom>
-          <a:solidFill>
-            <a:schemeClr val="bg1">
-              <a:lumMod val="50000"/>
-            </a:schemeClr>
-          </a:solidFill>
-          <a:ln>
-            <a:solidFill>
-              <a:srgbClr val="253746"/>
-            </a:solidFill>
-          </a:ln>
-        </p:spPr>
-        <p:style>
-          <a:lnRef idx="2">
-            <a:schemeClr val="accent1">
-              <a:shade val="50000"/>
-            </a:schemeClr>
-          </a:lnRef>
-          <a:fillRef idx="1">
-            <a:schemeClr val="accent1"/>
-          </a:fillRef>
-          <a:effectRef idx="0">
-            <a:schemeClr val="accent1"/>
-          </a:effectRef>
-          <a:fontRef idx="minor">
-            <a:schemeClr val="lt1"/>
-          </a:fontRef>
-        </p:style>
-        <p:txBody>
-          <a:bodyPr rtlCol="0" anchor="ctr"/>
-          <a:lstStyle/>
-          <a:p>
-            <a:pPr algn="ctr"/>
-            <a:endParaRPr lang="pt-BR" sz="1600" dirty="0">
-              <a:solidFill>
-                <a:prstClr val="white"/>
-              </a:solidFill>
-              <a:latin typeface="Calibri"/>
-            </a:endParaRPr>
-          </a:p>
-        </p:txBody>
-      </p:sp>
-      <p:cxnSp>
-        <p:nvCxnSpPr>
-          <p:cNvPr id="22" name="Conector de Seta Reta 107">
-            <a:extLst>
-              <a:ext uri="{FF2B5EF4-FFF2-40B4-BE49-F238E27FC236}">
-                <a16:creationId xmlns:a16="http://schemas.microsoft.com/office/drawing/2014/main" id="{B75600F3-FE06-4231-B82B-F6D5DFD6A4FE}"/>
-              </a:ext>
-            </a:extLst>
-          </p:cNvPr>
-          <p:cNvCxnSpPr>
-            <a:cxnSpLocks/>
-            <a:endCxn id="21" idx="4"/>
-          </p:cNvCxnSpPr>
-          <p:nvPr/>
-        </p:nvCxnSpPr>
-        <p:spPr>
-          <a:xfrm flipH="1">
-            <a:off x="4736008" y="1803265"/>
-            <a:ext cx="2186501" cy="13592"/>
-          </a:xfrm>
-          <a:prstGeom prst="straightConnector1">
-            <a:avLst/>
-          </a:prstGeom>
-          <a:ln w="19050">
-            <a:solidFill>
-              <a:schemeClr val="accent5">
-                <a:lumMod val="75000"/>
-              </a:schemeClr>
-            </a:solidFill>
-            <a:prstDash val="sysDash"/>
-            <a:headEnd type="none" w="lg" len="lg"/>
-            <a:tailEnd type="triangle" w="lg" len="lg"/>
-          </a:ln>
-        </p:spPr>
-        <p:style>
-          <a:lnRef idx="1">
-            <a:schemeClr val="accent1"/>
-          </a:lnRef>
-          <a:fillRef idx="0">
-            <a:schemeClr val="accent1"/>
-          </a:fillRef>
-          <a:effectRef idx="0">
-            <a:schemeClr val="accent1"/>
-          </a:effectRef>
-          <a:fontRef idx="minor">
-            <a:schemeClr val="tx1"/>
-          </a:fontRef>
-        </p:style>
-      </p:cxnSp>
-      <p:grpSp>
-        <p:nvGrpSpPr>
-          <p:cNvPr id="23" name="Group 22">
-            <a:extLst>
-              <a:ext uri="{FF2B5EF4-FFF2-40B4-BE49-F238E27FC236}">
-                <a16:creationId xmlns:a16="http://schemas.microsoft.com/office/drawing/2014/main" id="{2C42AF25-B8A7-4FF7-8A55-169A81DD9267}"/>
+                <a16:creationId xmlns:a16="http://schemas.microsoft.com/office/drawing/2014/main" id="{0646A321-80EF-485B-8F41-FA38949E9BD0}"/>
               </a:ext>
             </a:extLst>
           </p:cNvPr>
@@ -23748,18 +23643,18 @@
         </p:nvGrpSpPr>
         <p:grpSpPr>
           <a:xfrm>
-            <a:off x="7084229" y="909023"/>
-            <a:ext cx="1878532" cy="1945912"/>
+            <a:off x="5810239" y="1116722"/>
+            <a:ext cx="2222668" cy="1724042"/>
             <a:chOff x="8741678" y="1501253"/>
             <a:chExt cx="2566458" cy="2016224"/>
           </a:xfrm>
         </p:grpSpPr>
         <p:sp>
           <p:nvSpPr>
-            <p:cNvPr id="24" name="Retângulo 17">
+            <p:cNvPr id="8" name="Retângulo 17">
               <a:extLst>
                 <a:ext uri="{FF2B5EF4-FFF2-40B4-BE49-F238E27FC236}">
-                  <a16:creationId xmlns:a16="http://schemas.microsoft.com/office/drawing/2014/main" id="{8CDE05CE-B687-4B84-A273-8DD3970E8D81}"/>
+                  <a16:creationId xmlns:a16="http://schemas.microsoft.com/office/drawing/2014/main" id="{DE5A781B-0540-4C0D-8CBA-649E90A6C0D4}"/>
                 </a:ext>
               </a:extLst>
             </p:cNvPr>
@@ -23768,7 +23663,7 @@
           </p:nvSpPr>
           <p:spPr>
             <a:xfrm>
-              <a:off x="8843374" y="1501253"/>
+              <a:off x="8843373" y="1501253"/>
               <a:ext cx="2376264" cy="2016224"/>
             </a:xfrm>
             <a:prstGeom prst="rect">
@@ -23808,10 +23703,10 @@
         </p:sp>
         <p:sp>
           <p:nvSpPr>
-            <p:cNvPr id="25" name="Retângulo 20">
+            <p:cNvPr id="9" name="Retângulo 20">
               <a:extLst>
                 <a:ext uri="{FF2B5EF4-FFF2-40B4-BE49-F238E27FC236}">
-                  <a16:creationId xmlns:a16="http://schemas.microsoft.com/office/drawing/2014/main" id="{B52D2A6C-B830-4C14-ADA9-55739A7C178A}"/>
+                  <a16:creationId xmlns:a16="http://schemas.microsoft.com/office/drawing/2014/main" id="{00D906F0-F91F-4E7E-AE03-0C13D41EFFA5}"/>
                 </a:ext>
               </a:extLst>
             </p:cNvPr>
@@ -23820,8 +23715,8 @@
           </p:nvSpPr>
           <p:spPr>
             <a:xfrm>
-              <a:off x="8741678" y="1583056"/>
-              <a:ext cx="2566458" cy="542126"/>
+              <a:off x="8741678" y="1583055"/>
+              <a:ext cx="2566458" cy="611893"/>
             </a:xfrm>
             <a:prstGeom prst="rect">
               <a:avLst/>
@@ -23862,10 +23757,10 @@
         </p:sp>
         <p:sp>
           <p:nvSpPr>
-            <p:cNvPr id="26" name="Retângulo 20">
+            <p:cNvPr id="10" name="Retângulo 20">
               <a:extLst>
                 <a:ext uri="{FF2B5EF4-FFF2-40B4-BE49-F238E27FC236}">
-                  <a16:creationId xmlns:a16="http://schemas.microsoft.com/office/drawing/2014/main" id="{435540FC-CB74-43DB-9941-7B5E283231A7}"/>
+                  <a16:creationId xmlns:a16="http://schemas.microsoft.com/office/drawing/2014/main" id="{CF4B0FA5-BF87-4398-862F-4085630EA278}"/>
                 </a:ext>
               </a:extLst>
             </p:cNvPr>
@@ -23874,8 +23769,8 @@
           </p:nvSpPr>
           <p:spPr>
             <a:xfrm>
-              <a:off x="8924639" y="2439785"/>
-              <a:ext cx="2307051" cy="669685"/>
+              <a:off x="8924638" y="2439785"/>
+              <a:ext cx="2307052" cy="539906"/>
             </a:xfrm>
             <a:prstGeom prst="rect">
               <a:avLst/>
@@ -23896,7 +23791,7 @@
                     <a:prstClr val="white"/>
                   </a:solidFill>
                 </a:rPr>
-                <a:t>Aplicação de exportação de dados em csv</a:t>
+                <a:t>Aplicação de exportação de dados para csv</a:t>
               </a:r>
               <a:endParaRPr lang="pt-BR" sz="1050" dirty="0">
                 <a:solidFill>
@@ -23909,10 +23804,10 @@
       </p:grpSp>
       <p:sp>
         <p:nvSpPr>
-          <p:cNvPr id="27" name="Retângulo 20">
+          <p:cNvPr id="11" name="Retângulo 20">
             <a:extLst>
               <a:ext uri="{FF2B5EF4-FFF2-40B4-BE49-F238E27FC236}">
-                <a16:creationId xmlns:a16="http://schemas.microsoft.com/office/drawing/2014/main" id="{FD04EF60-839A-494A-B932-385F7C6BC46D}"/>
+                <a16:creationId xmlns:a16="http://schemas.microsoft.com/office/drawing/2014/main" id="{AF3F0847-15C5-44AF-801A-E2B601017697}"/>
               </a:ext>
             </a:extLst>
           </p:cNvPr>
@@ -23921,8 +23816,912 @@
         </p:nvSpPr>
         <p:spPr>
           <a:xfrm>
-            <a:off x="2896553" y="1396394"/>
-            <a:ext cx="1878532" cy="523220"/>
+            <a:off x="1878857" y="2032604"/>
+            <a:ext cx="1983070" cy="523220"/>
+          </a:xfrm>
+          <a:prstGeom prst="rect">
+            <a:avLst/>
+          </a:prstGeom>
+        </p:spPr>
+        <p:txBody>
+          <a:bodyPr wrap="square">
+            <a:spAutoFit/>
+          </a:bodyPr>
+          <a:lstStyle/>
+          <a:p>
+            <a:pPr lvl="0" algn="ctr">
+              <a:defRPr/>
+            </a:pPr>
+            <a:r>
+              <a:rPr lang="pt-BR" sz="1600" b="1" dirty="0">
+                <a:solidFill>
+                  <a:prstClr val="white"/>
+                </a:solidFill>
+              </a:rPr>
+              <a:t>Database</a:t>
+            </a:r>
+          </a:p>
+          <a:p>
+            <a:pPr lvl="0" algn="ctr">
+              <a:defRPr/>
+            </a:pPr>
+            <a:r>
+              <a:rPr lang="pt-BR" sz="1200" dirty="0">
+                <a:solidFill>
+                  <a:prstClr val="white"/>
+                </a:solidFill>
+              </a:rPr>
+              <a:t>[Container: SQL Server]</a:t>
+            </a:r>
+          </a:p>
+        </p:txBody>
+      </p:sp>
+      <p:grpSp>
+        <p:nvGrpSpPr>
+          <p:cNvPr id="13" name="Group 12">
+            <a:extLst>
+              <a:ext uri="{FF2B5EF4-FFF2-40B4-BE49-F238E27FC236}">
+                <a16:creationId xmlns:a16="http://schemas.microsoft.com/office/drawing/2014/main" id="{17D3C65D-DE31-4AF8-8441-4D47EFB3751D}"/>
+              </a:ext>
+            </a:extLst>
+          </p:cNvPr>
+          <p:cNvGrpSpPr/>
+          <p:nvPr/>
+        </p:nvGrpSpPr>
+        <p:grpSpPr>
+          <a:xfrm>
+            <a:off x="7821605" y="5723109"/>
+            <a:ext cx="2691508" cy="1362948"/>
+            <a:chOff x="8741678" y="1583056"/>
+            <a:chExt cx="2566458" cy="1821669"/>
+          </a:xfrm>
+        </p:grpSpPr>
+        <p:sp>
+          <p:nvSpPr>
+            <p:cNvPr id="14" name="Retângulo 17">
+              <a:extLst>
+                <a:ext uri="{FF2B5EF4-FFF2-40B4-BE49-F238E27FC236}">
+                  <a16:creationId xmlns:a16="http://schemas.microsoft.com/office/drawing/2014/main" id="{7F6B4504-2893-4A7D-81CB-3B218362D2FC}"/>
+                </a:ext>
+              </a:extLst>
+            </p:cNvPr>
+            <p:cNvSpPr/>
+            <p:nvPr/>
+          </p:nvSpPr>
+          <p:spPr>
+            <a:xfrm>
+              <a:off x="8931873" y="1659108"/>
+              <a:ext cx="2299818" cy="1745617"/>
+            </a:xfrm>
+            <a:prstGeom prst="rect">
+              <a:avLst/>
+            </a:prstGeom>
+            <a:ln/>
+          </p:spPr>
+          <p:style>
+            <a:lnRef idx="2">
+              <a:schemeClr val="accent5">
+                <a:shade val="50000"/>
+              </a:schemeClr>
+            </a:lnRef>
+            <a:fillRef idx="1">
+              <a:schemeClr val="accent5"/>
+            </a:fillRef>
+            <a:effectRef idx="0">
+              <a:schemeClr val="accent5"/>
+            </a:effectRef>
+            <a:fontRef idx="minor">
+              <a:schemeClr val="lt1"/>
+            </a:fontRef>
+          </p:style>
+          <p:txBody>
+            <a:bodyPr rtlCol="0" anchor="ctr"/>
+            <a:lstStyle/>
+            <a:p>
+              <a:pPr algn="ctr"/>
+              <a:endParaRPr lang="pt-BR" sz="1400" dirty="0">
+                <a:solidFill>
+                  <a:prstClr val="white"/>
+                </a:solidFill>
+                <a:latin typeface="Calibri"/>
+              </a:endParaRPr>
+            </a:p>
+            <a:p>
+              <a:pPr algn="ctr"/>
+              <a:endParaRPr lang="pt-BR" sz="1400" dirty="0">
+                <a:solidFill>
+                  <a:prstClr val="white"/>
+                </a:solidFill>
+                <a:latin typeface="Calibri"/>
+              </a:endParaRPr>
+            </a:p>
+            <a:p>
+              <a:pPr algn="ctr"/>
+              <a:r>
+                <a:rPr lang="pt-BR" sz="1400" dirty="0">
+                  <a:solidFill>
+                    <a:prstClr val="white"/>
+                  </a:solidFill>
+                  <a:latin typeface="Calibri"/>
+                </a:rPr>
+                <a:t>Exibição e impressão de</a:t>
+              </a:r>
+            </a:p>
+            <a:p>
+              <a:pPr algn="ctr"/>
+              <a:r>
+                <a:rPr lang="pt-BR" sz="1400" dirty="0">
+                  <a:solidFill>
+                    <a:prstClr val="white"/>
+                  </a:solidFill>
+                  <a:latin typeface="Calibri"/>
+                </a:rPr>
+                <a:t>relatorio</a:t>
+              </a:r>
+            </a:p>
+          </p:txBody>
+        </p:sp>
+        <p:sp>
+          <p:nvSpPr>
+            <p:cNvPr id="15" name="Retângulo 20">
+              <a:extLst>
+                <a:ext uri="{FF2B5EF4-FFF2-40B4-BE49-F238E27FC236}">
+                  <a16:creationId xmlns:a16="http://schemas.microsoft.com/office/drawing/2014/main" id="{4527D8F8-7558-45B8-9D16-8CC4AC4E9924}"/>
+                </a:ext>
+              </a:extLst>
+            </p:cNvPr>
+            <p:cNvSpPr/>
+            <p:nvPr/>
+          </p:nvSpPr>
+          <p:spPr>
+            <a:xfrm>
+              <a:off x="8741678" y="1583056"/>
+              <a:ext cx="2566458" cy="699318"/>
+            </a:xfrm>
+            <a:prstGeom prst="rect">
+              <a:avLst/>
+            </a:prstGeom>
+          </p:spPr>
+          <p:txBody>
+            <a:bodyPr wrap="square">
+              <a:spAutoFit/>
+            </a:bodyPr>
+            <a:lstStyle/>
+            <a:p>
+              <a:pPr lvl="0" algn="ctr">
+                <a:defRPr/>
+              </a:pPr>
+              <a:r>
+                <a:rPr lang="pt-BR" sz="1600" b="1" dirty="0">
+                  <a:solidFill>
+                    <a:prstClr val="white"/>
+                  </a:solidFill>
+                </a:rPr>
+                <a:t>ClientSide web</a:t>
+              </a:r>
+            </a:p>
+            <a:p>
+              <a:pPr lvl="0" algn="ctr">
+                <a:defRPr/>
+              </a:pPr>
+              <a:r>
+                <a:rPr lang="pt-BR" sz="1200" dirty="0">
+                  <a:solidFill>
+                    <a:prstClr val="white"/>
+                  </a:solidFill>
+                </a:rPr>
+                <a:t>[Container: JavaScript ]</a:t>
+              </a:r>
+            </a:p>
+          </p:txBody>
+        </p:sp>
+        <p:sp>
+          <p:nvSpPr>
+            <p:cNvPr id="16" name="Retângulo 20">
+              <a:extLst>
+                <a:ext uri="{FF2B5EF4-FFF2-40B4-BE49-F238E27FC236}">
+                  <a16:creationId xmlns:a16="http://schemas.microsoft.com/office/drawing/2014/main" id="{3E250266-E8CD-4FB9-BCEE-9A2701965FB9}"/>
+                </a:ext>
+              </a:extLst>
+            </p:cNvPr>
+            <p:cNvSpPr/>
+            <p:nvPr/>
+          </p:nvSpPr>
+          <p:spPr>
+            <a:xfrm>
+              <a:off x="8924638" y="2439786"/>
+              <a:ext cx="2307052" cy="339375"/>
+            </a:xfrm>
+            <a:prstGeom prst="rect">
+              <a:avLst/>
+            </a:prstGeom>
+          </p:spPr>
+          <p:txBody>
+            <a:bodyPr wrap="square">
+              <a:spAutoFit/>
+            </a:bodyPr>
+            <a:lstStyle/>
+            <a:p>
+              <a:pPr lvl="0" algn="ctr">
+                <a:defRPr/>
+              </a:pPr>
+              <a:endParaRPr lang="pt-BR" sz="1050" dirty="0">
+                <a:solidFill>
+                  <a:prstClr val="white"/>
+                </a:solidFill>
+              </a:endParaRPr>
+            </a:p>
+          </p:txBody>
+        </p:sp>
+      </p:grpSp>
+      <p:cxnSp>
+        <p:nvCxnSpPr>
+          <p:cNvPr id="20" name="Conector de Seta Reta 107">
+            <a:extLst>
+              <a:ext uri="{FF2B5EF4-FFF2-40B4-BE49-F238E27FC236}">
+                <a16:creationId xmlns:a16="http://schemas.microsoft.com/office/drawing/2014/main" id="{11FA67AD-5EC8-4963-A4D0-8C7E1B43C9CD}"/>
+              </a:ext>
+            </a:extLst>
+          </p:cNvPr>
+          <p:cNvCxnSpPr>
+            <a:cxnSpLocks/>
+            <a:stCxn id="8" idx="1"/>
+          </p:cNvCxnSpPr>
+          <p:nvPr/>
+        </p:nvCxnSpPr>
+        <p:spPr>
+          <a:xfrm flipH="1">
+            <a:off x="3310851" y="1978743"/>
+            <a:ext cx="2587460" cy="16431"/>
+          </a:xfrm>
+          <a:prstGeom prst="straightConnector1">
+            <a:avLst/>
+          </a:prstGeom>
+          <a:ln w="19050">
+            <a:solidFill>
+              <a:schemeClr val="accent5">
+                <a:lumMod val="75000"/>
+              </a:schemeClr>
+            </a:solidFill>
+            <a:prstDash val="sysDash"/>
+            <a:headEnd type="none" w="lg" len="lg"/>
+            <a:tailEnd type="triangle" w="lg" len="lg"/>
+          </a:ln>
+        </p:spPr>
+        <p:style>
+          <a:lnRef idx="1">
+            <a:schemeClr val="accent1"/>
+          </a:lnRef>
+          <a:fillRef idx="0">
+            <a:schemeClr val="accent1"/>
+          </a:fillRef>
+          <a:effectRef idx="0">
+            <a:schemeClr val="accent1"/>
+          </a:effectRef>
+          <a:fontRef idx="minor">
+            <a:schemeClr val="tx1"/>
+          </a:fontRef>
+        </p:style>
+      </p:cxnSp>
+      <p:grpSp>
+        <p:nvGrpSpPr>
+          <p:cNvPr id="23" name="Group 22">
+            <a:extLst>
+              <a:ext uri="{FF2B5EF4-FFF2-40B4-BE49-F238E27FC236}">
+                <a16:creationId xmlns:a16="http://schemas.microsoft.com/office/drawing/2014/main" id="{20804ABF-935A-416C-BB92-18669CDAE6AB}"/>
+              </a:ext>
+            </a:extLst>
+          </p:cNvPr>
+          <p:cNvGrpSpPr/>
+          <p:nvPr/>
+        </p:nvGrpSpPr>
+        <p:grpSpPr>
+          <a:xfrm>
+            <a:off x="1561724" y="5832157"/>
+            <a:ext cx="2596344" cy="1619148"/>
+            <a:chOff x="4755662" y="1781271"/>
+            <a:chExt cx="4257938" cy="2374099"/>
+          </a:xfrm>
+        </p:grpSpPr>
+        <p:sp>
+          <p:nvSpPr>
+            <p:cNvPr id="24" name="Retângulo 17">
+              <a:extLst>
+                <a:ext uri="{FF2B5EF4-FFF2-40B4-BE49-F238E27FC236}">
+                  <a16:creationId xmlns:a16="http://schemas.microsoft.com/office/drawing/2014/main" id="{74314502-ABDF-4187-8AC9-249EB93731AB}"/>
+                </a:ext>
+              </a:extLst>
+            </p:cNvPr>
+            <p:cNvSpPr/>
+            <p:nvPr/>
+          </p:nvSpPr>
+          <p:spPr>
+            <a:xfrm>
+              <a:off x="4755662" y="1875188"/>
+              <a:ext cx="4257938" cy="2280182"/>
+            </a:xfrm>
+            <a:prstGeom prst="rect">
+              <a:avLst/>
+            </a:prstGeom>
+            <a:ln/>
+          </p:spPr>
+          <p:style>
+            <a:lnRef idx="2">
+              <a:schemeClr val="accent5">
+                <a:shade val="50000"/>
+              </a:schemeClr>
+            </a:lnRef>
+            <a:fillRef idx="1">
+              <a:schemeClr val="accent5"/>
+            </a:fillRef>
+            <a:effectRef idx="0">
+              <a:schemeClr val="accent5"/>
+            </a:effectRef>
+            <a:fontRef idx="minor">
+              <a:schemeClr val="lt1"/>
+            </a:fontRef>
+          </p:style>
+          <p:txBody>
+            <a:bodyPr rtlCol="0" anchor="ctr"/>
+            <a:lstStyle/>
+            <a:p>
+              <a:pPr algn="ctr"/>
+              <a:endParaRPr lang="pt-BR" sz="1200" dirty="0">
+                <a:solidFill>
+                  <a:prstClr val="white"/>
+                </a:solidFill>
+                <a:latin typeface="Calibri"/>
+              </a:endParaRPr>
+            </a:p>
+            <a:p>
+              <a:pPr algn="ctr"/>
+              <a:r>
+                <a:rPr lang="pt-BR" sz="1200" dirty="0">
+                  <a:solidFill>
+                    <a:prstClr val="white"/>
+                  </a:solidFill>
+                  <a:latin typeface="Calibri"/>
+                </a:rPr>
+                <a:t>Aplicação que envia dados das máquinas e  do caixa para o banco</a:t>
+              </a:r>
+            </a:p>
+          </p:txBody>
+        </p:sp>
+        <p:sp>
+          <p:nvSpPr>
+            <p:cNvPr id="25" name="Retângulo 20">
+              <a:extLst>
+                <a:ext uri="{FF2B5EF4-FFF2-40B4-BE49-F238E27FC236}">
+                  <a16:creationId xmlns:a16="http://schemas.microsoft.com/office/drawing/2014/main" id="{51220C5F-6D0A-4433-81BF-3D9125576F22}"/>
+                </a:ext>
+              </a:extLst>
+            </p:cNvPr>
+            <p:cNvSpPr/>
+            <p:nvPr/>
+          </p:nvSpPr>
+          <p:spPr>
+            <a:xfrm>
+              <a:off x="4825026" y="1781271"/>
+              <a:ext cx="3868588" cy="1227614"/>
+            </a:xfrm>
+            <a:prstGeom prst="rect">
+              <a:avLst/>
+            </a:prstGeom>
+          </p:spPr>
+          <p:txBody>
+            <a:bodyPr wrap="square">
+              <a:spAutoFit/>
+            </a:bodyPr>
+            <a:lstStyle/>
+            <a:p>
+              <a:pPr lvl="0" algn="ctr">
+                <a:defRPr/>
+              </a:pPr>
+              <a:r>
+                <a:rPr lang="pt-BR" sz="1400" b="1" dirty="0">
+                  <a:solidFill>
+                    <a:prstClr val="white"/>
+                  </a:solidFill>
+                </a:rPr>
+                <a:t>DesktopClient</a:t>
+              </a:r>
+            </a:p>
+            <a:p>
+              <a:pPr lvl="0" algn="ctr">
+                <a:defRPr/>
+              </a:pPr>
+              <a:r>
+                <a:rPr lang="pt-BR" sz="1100" dirty="0">
+                  <a:solidFill>
+                    <a:prstClr val="white"/>
+                  </a:solidFill>
+                </a:rPr>
+                <a:t>[Container: JPA]</a:t>
+              </a:r>
+            </a:p>
+            <a:p>
+              <a:pPr lvl="0" algn="ctr">
+                <a:defRPr/>
+              </a:pPr>
+              <a:endParaRPr lang="pt-BR" sz="1100" dirty="0">
+                <a:solidFill>
+                  <a:prstClr val="white"/>
+                </a:solidFill>
+              </a:endParaRPr>
+            </a:p>
+          </p:txBody>
+        </p:sp>
+      </p:grpSp>
+      <p:cxnSp>
+        <p:nvCxnSpPr>
+          <p:cNvPr id="27" name="Conector de Seta Reta 107">
+            <a:extLst>
+              <a:ext uri="{FF2B5EF4-FFF2-40B4-BE49-F238E27FC236}">
+                <a16:creationId xmlns:a16="http://schemas.microsoft.com/office/drawing/2014/main" id="{CF690BC5-8619-48BC-86E8-CB01AD495EF4}"/>
+              </a:ext>
+            </a:extLst>
+          </p:cNvPr>
+          <p:cNvCxnSpPr>
+            <a:cxnSpLocks/>
+            <a:stCxn id="104" idx="0"/>
+          </p:cNvCxnSpPr>
+          <p:nvPr/>
+        </p:nvCxnSpPr>
+        <p:spPr>
+          <a:xfrm flipH="1" flipV="1">
+            <a:off x="2781939" y="2972453"/>
+            <a:ext cx="16698" cy="620204"/>
+          </a:xfrm>
+          <a:prstGeom prst="straightConnector1">
+            <a:avLst/>
+          </a:prstGeom>
+          <a:ln w="19050">
+            <a:solidFill>
+              <a:schemeClr val="accent5">
+                <a:lumMod val="75000"/>
+              </a:schemeClr>
+            </a:solidFill>
+            <a:prstDash val="sysDash"/>
+            <a:headEnd type="none" w="lg" len="lg"/>
+            <a:tailEnd type="triangle" w="lg" len="lg"/>
+          </a:ln>
+        </p:spPr>
+        <p:style>
+          <a:lnRef idx="1">
+            <a:schemeClr val="accent1"/>
+          </a:lnRef>
+          <a:fillRef idx="0">
+            <a:schemeClr val="accent1"/>
+          </a:fillRef>
+          <a:effectRef idx="0">
+            <a:schemeClr val="accent1"/>
+          </a:effectRef>
+          <a:fontRef idx="minor">
+            <a:schemeClr val="tx1"/>
+          </a:fontRef>
+        </p:style>
+      </p:cxnSp>
+      <p:grpSp>
+        <p:nvGrpSpPr>
+          <p:cNvPr id="37" name="Group 36">
+            <a:extLst>
+              <a:ext uri="{FF2B5EF4-FFF2-40B4-BE49-F238E27FC236}">
+                <a16:creationId xmlns:a16="http://schemas.microsoft.com/office/drawing/2014/main" id="{E0C9C0A6-6B42-436A-A23B-98D5E09863A0}"/>
+              </a:ext>
+            </a:extLst>
+          </p:cNvPr>
+          <p:cNvGrpSpPr/>
+          <p:nvPr/>
+        </p:nvGrpSpPr>
+        <p:grpSpPr>
+          <a:xfrm>
+            <a:off x="4605325" y="5887285"/>
+            <a:ext cx="2032042" cy="1355310"/>
+            <a:chOff x="8741678" y="1583056"/>
+            <a:chExt cx="2566458" cy="2092276"/>
+          </a:xfrm>
+        </p:grpSpPr>
+        <p:sp>
+          <p:nvSpPr>
+            <p:cNvPr id="38" name="Retângulo 17">
+              <a:extLst>
+                <a:ext uri="{FF2B5EF4-FFF2-40B4-BE49-F238E27FC236}">
+                  <a16:creationId xmlns:a16="http://schemas.microsoft.com/office/drawing/2014/main" id="{79859D20-FFD4-4BF1-A341-BDB3442E43F3}"/>
+                </a:ext>
+              </a:extLst>
+            </p:cNvPr>
+            <p:cNvSpPr/>
+            <p:nvPr/>
+          </p:nvSpPr>
+          <p:spPr>
+            <a:xfrm>
+              <a:off x="8931871" y="1659108"/>
+              <a:ext cx="2376264" cy="2016224"/>
+            </a:xfrm>
+            <a:prstGeom prst="rect">
+              <a:avLst/>
+            </a:prstGeom>
+            <a:ln/>
+          </p:spPr>
+          <p:style>
+            <a:lnRef idx="2">
+              <a:schemeClr val="accent5">
+                <a:shade val="50000"/>
+              </a:schemeClr>
+            </a:lnRef>
+            <a:fillRef idx="1">
+              <a:schemeClr val="accent5"/>
+            </a:fillRef>
+            <a:effectRef idx="0">
+              <a:schemeClr val="accent5"/>
+            </a:effectRef>
+            <a:fontRef idx="minor">
+              <a:schemeClr val="lt1"/>
+            </a:fontRef>
+          </p:style>
+          <p:txBody>
+            <a:bodyPr rtlCol="0" anchor="ctr"/>
+            <a:lstStyle/>
+            <a:p>
+              <a:pPr algn="ctr"/>
+              <a:endParaRPr lang="pt-BR" sz="1400" dirty="0">
+                <a:solidFill>
+                  <a:prstClr val="white"/>
+                </a:solidFill>
+                <a:latin typeface="Calibri"/>
+              </a:endParaRPr>
+            </a:p>
+            <a:p>
+              <a:pPr algn="ctr"/>
+              <a:r>
+                <a:rPr lang="pt-BR" sz="1400" dirty="0">
+                  <a:solidFill>
+                    <a:prstClr val="white"/>
+                  </a:solidFill>
+                  <a:latin typeface="Calibri"/>
+                </a:rPr>
+                <a:t>Exibição de relatorio</a:t>
+              </a:r>
+            </a:p>
+          </p:txBody>
+        </p:sp>
+        <p:sp>
+          <p:nvSpPr>
+            <p:cNvPr id="39" name="Retângulo 20">
+              <a:extLst>
+                <a:ext uri="{FF2B5EF4-FFF2-40B4-BE49-F238E27FC236}">
+                  <a16:creationId xmlns:a16="http://schemas.microsoft.com/office/drawing/2014/main" id="{29AE57D3-5AB3-4DDD-91AA-F8FE99F98CDD}"/>
+                </a:ext>
+              </a:extLst>
+            </p:cNvPr>
+            <p:cNvSpPr/>
+            <p:nvPr/>
+          </p:nvSpPr>
+          <p:spPr>
+            <a:xfrm>
+              <a:off x="8741678" y="1583056"/>
+              <a:ext cx="2566458" cy="807727"/>
+            </a:xfrm>
+            <a:prstGeom prst="rect">
+              <a:avLst/>
+            </a:prstGeom>
+          </p:spPr>
+          <p:txBody>
+            <a:bodyPr wrap="square">
+              <a:spAutoFit/>
+            </a:bodyPr>
+            <a:lstStyle/>
+            <a:p>
+              <a:pPr lvl="0" algn="ctr">
+                <a:defRPr/>
+              </a:pPr>
+              <a:r>
+                <a:rPr lang="pt-BR" sz="1600" b="1" dirty="0">
+                  <a:solidFill>
+                    <a:prstClr val="white"/>
+                  </a:solidFill>
+                </a:rPr>
+                <a:t>Mobile App</a:t>
+              </a:r>
+            </a:p>
+            <a:p>
+              <a:pPr lvl="0" algn="ctr">
+                <a:defRPr/>
+              </a:pPr>
+              <a:r>
+                <a:rPr lang="pt-BR" sz="1200" dirty="0">
+                  <a:solidFill>
+                    <a:prstClr val="white"/>
+                  </a:solidFill>
+                </a:rPr>
+                <a:t>[Container: Kotlin]</a:t>
+              </a:r>
+            </a:p>
+          </p:txBody>
+        </p:sp>
+        <p:sp>
+          <p:nvSpPr>
+            <p:cNvPr id="40" name="Retângulo 20">
+              <a:extLst>
+                <a:ext uri="{FF2B5EF4-FFF2-40B4-BE49-F238E27FC236}">
+                  <a16:creationId xmlns:a16="http://schemas.microsoft.com/office/drawing/2014/main" id="{605122BF-592E-4130-B8A3-0C0E38A1C590}"/>
+                </a:ext>
+              </a:extLst>
+            </p:cNvPr>
+            <p:cNvSpPr/>
+            <p:nvPr/>
+          </p:nvSpPr>
+          <p:spPr>
+            <a:xfrm>
+              <a:off x="8924638" y="2439787"/>
+              <a:ext cx="2307052" cy="391986"/>
+            </a:xfrm>
+            <a:prstGeom prst="rect">
+              <a:avLst/>
+            </a:prstGeom>
+          </p:spPr>
+          <p:txBody>
+            <a:bodyPr wrap="square">
+              <a:spAutoFit/>
+            </a:bodyPr>
+            <a:lstStyle/>
+            <a:p>
+              <a:pPr lvl="0" algn="ctr">
+                <a:defRPr/>
+              </a:pPr>
+              <a:endParaRPr lang="pt-BR" sz="1050" dirty="0">
+                <a:solidFill>
+                  <a:prstClr val="white"/>
+                </a:solidFill>
+              </a:endParaRPr>
+            </a:p>
+          </p:txBody>
+        </p:sp>
+      </p:grpSp>
+      <p:grpSp>
+        <p:nvGrpSpPr>
+          <p:cNvPr id="55" name="Agrupar 11">
+            <a:extLst>
+              <a:ext uri="{FF2B5EF4-FFF2-40B4-BE49-F238E27FC236}">
+                <a16:creationId xmlns:a16="http://schemas.microsoft.com/office/drawing/2014/main" id="{4A81563F-FD72-4335-A966-00671EEF9BA6}"/>
+              </a:ext>
+            </a:extLst>
+          </p:cNvPr>
+          <p:cNvGrpSpPr/>
+          <p:nvPr/>
+        </p:nvGrpSpPr>
+        <p:grpSpPr>
+          <a:xfrm>
+            <a:off x="5575819" y="3298805"/>
+            <a:ext cx="2691508" cy="2185474"/>
+            <a:chOff x="85840" y="1548384"/>
+            <a:chExt cx="2638466" cy="2016223"/>
+          </a:xfrm>
+        </p:grpSpPr>
+        <p:sp>
+          <p:nvSpPr>
+            <p:cNvPr id="56" name="Retângulo 29">
+              <a:extLst>
+                <a:ext uri="{FF2B5EF4-FFF2-40B4-BE49-F238E27FC236}">
+                  <a16:creationId xmlns:a16="http://schemas.microsoft.com/office/drawing/2014/main" id="{80630F33-FC00-47F8-B599-25833565EC6A}"/>
+                </a:ext>
+              </a:extLst>
+            </p:cNvPr>
+            <p:cNvSpPr/>
+            <p:nvPr/>
+          </p:nvSpPr>
+          <p:spPr>
+            <a:xfrm>
+              <a:off x="239729" y="1548384"/>
+              <a:ext cx="2377291" cy="2016223"/>
+            </a:xfrm>
+            <a:prstGeom prst="rect">
+              <a:avLst/>
+            </a:prstGeom>
+            <a:solidFill>
+              <a:schemeClr val="bg1">
+                <a:lumMod val="85000"/>
+              </a:schemeClr>
+            </a:solidFill>
+            <a:ln>
+              <a:solidFill>
+                <a:srgbClr val="253746"/>
+              </a:solidFill>
+              <a:prstDash val="dash"/>
+            </a:ln>
+          </p:spPr>
+          <p:style>
+            <a:lnRef idx="2">
+              <a:schemeClr val="accent1">
+                <a:shade val="50000"/>
+              </a:schemeClr>
+            </a:lnRef>
+            <a:fillRef idx="1">
+              <a:schemeClr val="accent1"/>
+            </a:fillRef>
+            <a:effectRef idx="0">
+              <a:schemeClr val="accent1"/>
+            </a:effectRef>
+            <a:fontRef idx="minor">
+              <a:schemeClr val="lt1"/>
+            </a:fontRef>
+          </p:style>
+          <p:txBody>
+            <a:bodyPr rtlCol="0" anchor="ctr"/>
+            <a:lstStyle/>
+            <a:p>
+              <a:pPr algn="ctr"/>
+              <a:endParaRPr lang="pt-BR" sz="1400" dirty="0">
+                <a:solidFill>
+                  <a:prstClr val="white"/>
+                </a:solidFill>
+                <a:latin typeface="Calibri"/>
+              </a:endParaRPr>
+            </a:p>
+          </p:txBody>
+        </p:sp>
+        <p:sp>
+          <p:nvSpPr>
+            <p:cNvPr id="57" name="Retângulo 20">
+              <a:extLst>
+                <a:ext uri="{FF2B5EF4-FFF2-40B4-BE49-F238E27FC236}">
+                  <a16:creationId xmlns:a16="http://schemas.microsoft.com/office/drawing/2014/main" id="{13E87E20-64A3-4C42-8E2A-1A381175F0AF}"/>
+                </a:ext>
+              </a:extLst>
+            </p:cNvPr>
+            <p:cNvSpPr/>
+            <p:nvPr/>
+          </p:nvSpPr>
+          <p:spPr>
+            <a:xfrm>
+              <a:off x="85840" y="1686174"/>
+              <a:ext cx="2566458" cy="482700"/>
+            </a:xfrm>
+            <a:prstGeom prst="rect">
+              <a:avLst/>
+            </a:prstGeom>
+          </p:spPr>
+          <p:txBody>
+            <a:bodyPr wrap="square">
+              <a:spAutoFit/>
+            </a:bodyPr>
+            <a:lstStyle/>
+            <a:p>
+              <a:pPr lvl="0" algn="ctr">
+                <a:defRPr/>
+              </a:pPr>
+              <a:r>
+                <a:rPr lang="pt-BR" sz="1600" b="1" dirty="0"/>
+                <a:t>MFA Application</a:t>
+              </a:r>
+            </a:p>
+            <a:p>
+              <a:pPr lvl="0" algn="ctr">
+                <a:defRPr/>
+              </a:pPr>
+              <a:r>
+                <a:rPr lang="pt-BR" sz="1200" dirty="0"/>
+                <a:t>[Container: SecurID]</a:t>
+              </a:r>
+            </a:p>
+          </p:txBody>
+        </p:sp>
+        <p:sp>
+          <p:nvSpPr>
+            <p:cNvPr id="58" name="Retângulo 20">
+              <a:extLst>
+                <a:ext uri="{FF2B5EF4-FFF2-40B4-BE49-F238E27FC236}">
+                  <a16:creationId xmlns:a16="http://schemas.microsoft.com/office/drawing/2014/main" id="{B4B8AB54-8E24-4F0C-AF50-9BB2FA8BC070}"/>
+                </a:ext>
+              </a:extLst>
+            </p:cNvPr>
+            <p:cNvSpPr/>
+            <p:nvPr/>
+          </p:nvSpPr>
+          <p:spPr>
+            <a:xfrm>
+              <a:off x="157848" y="2542903"/>
+              <a:ext cx="2566458" cy="255547"/>
+            </a:xfrm>
+            <a:prstGeom prst="rect">
+              <a:avLst/>
+            </a:prstGeom>
+          </p:spPr>
+          <p:txBody>
+            <a:bodyPr wrap="square">
+              <a:spAutoFit/>
+            </a:bodyPr>
+            <a:lstStyle/>
+            <a:p>
+              <a:pPr lvl="0" algn="ctr">
+                <a:defRPr/>
+              </a:pPr>
+              <a:r>
+                <a:rPr lang="pt-BR" sz="1200" dirty="0"/>
+                <a:t>Autenticação de usuario </a:t>
+              </a:r>
+              <a:endParaRPr lang="pt-BR" sz="1050" dirty="0"/>
+            </a:p>
+          </p:txBody>
+        </p:sp>
+      </p:grpSp>
+      <p:sp>
+        <p:nvSpPr>
+          <p:cNvPr id="81" name="Fluxograma: Disco Magnético 5">
+            <a:extLst>
+              <a:ext uri="{FF2B5EF4-FFF2-40B4-BE49-F238E27FC236}">
+                <a16:creationId xmlns:a16="http://schemas.microsoft.com/office/drawing/2014/main" id="{61BE9E55-B573-4199-8FB8-126EA7BBCAC2}"/>
+              </a:ext>
+            </a:extLst>
+          </p:cNvPr>
+          <p:cNvSpPr/>
+          <p:nvPr/>
+        </p:nvSpPr>
+        <p:spPr>
+          <a:xfrm>
+            <a:off x="1724770" y="955307"/>
+            <a:ext cx="1890292" cy="2107162"/>
+          </a:xfrm>
+          <a:prstGeom prst="flowChartMagneticDisk">
+            <a:avLst/>
+          </a:prstGeom>
+          <a:solidFill>
+            <a:schemeClr val="bg1">
+              <a:lumMod val="50000"/>
+            </a:schemeClr>
+          </a:solidFill>
+          <a:ln>
+            <a:solidFill>
+              <a:srgbClr val="253746"/>
+            </a:solidFill>
+          </a:ln>
+        </p:spPr>
+        <p:style>
+          <a:lnRef idx="2">
+            <a:schemeClr val="accent1">
+              <a:shade val="50000"/>
+            </a:schemeClr>
+          </a:lnRef>
+          <a:fillRef idx="1">
+            <a:schemeClr val="accent1"/>
+          </a:fillRef>
+          <a:effectRef idx="0">
+            <a:schemeClr val="accent1"/>
+          </a:effectRef>
+          <a:fontRef idx="minor">
+            <a:schemeClr val="lt1"/>
+          </a:fontRef>
+        </p:style>
+        <p:txBody>
+          <a:bodyPr rtlCol="0" anchor="ctr"/>
+          <a:lstStyle/>
+          <a:p>
+            <a:pPr algn="ctr"/>
+            <a:endParaRPr lang="pt-BR" sz="1400" dirty="0">
+              <a:solidFill>
+                <a:prstClr val="white"/>
+              </a:solidFill>
+              <a:latin typeface="Calibri"/>
+            </a:endParaRPr>
+          </a:p>
+        </p:txBody>
+      </p:sp>
+      <p:sp>
+        <p:nvSpPr>
+          <p:cNvPr id="82" name="Retângulo 20">
+            <a:extLst>
+              <a:ext uri="{FF2B5EF4-FFF2-40B4-BE49-F238E27FC236}">
+                <a16:creationId xmlns:a16="http://schemas.microsoft.com/office/drawing/2014/main" id="{65AE5428-52D5-4525-A1BF-92AC40AB339C}"/>
+              </a:ext>
+            </a:extLst>
+          </p:cNvPr>
+          <p:cNvSpPr/>
+          <p:nvPr/>
+        </p:nvSpPr>
+        <p:spPr>
+          <a:xfrm>
+            <a:off x="1559576" y="1567922"/>
+            <a:ext cx="2220680" cy="523220"/>
           </a:xfrm>
           <a:prstGeom prst="rect">
             <a:avLst/>
@@ -23963,10 +24762,10 @@
       </p:sp>
       <p:sp>
         <p:nvSpPr>
-          <p:cNvPr id="28" name="Retângulo 20">
+          <p:cNvPr id="83" name="Retângulo 20">
             <a:extLst>
               <a:ext uri="{FF2B5EF4-FFF2-40B4-BE49-F238E27FC236}">
-                <a16:creationId xmlns:a16="http://schemas.microsoft.com/office/drawing/2014/main" id="{B306B118-BFF8-40EC-9CE5-421734007212}"/>
+                <a16:creationId xmlns:a16="http://schemas.microsoft.com/office/drawing/2014/main" id="{108FBBEF-6E64-49DF-89B3-C7F7C73FB728}"/>
               </a:ext>
             </a:extLst>
           </p:cNvPr>
@@ -23975,8 +24774,8 @@
         </p:nvSpPr>
         <p:spPr>
           <a:xfrm>
-            <a:off x="2946709" y="2115464"/>
-            <a:ext cx="1878532" cy="461665"/>
+            <a:off x="1878857" y="1902089"/>
+            <a:ext cx="1579989" cy="646331"/>
           </a:xfrm>
           <a:prstGeom prst="rect">
             <a:avLst/>
@@ -23991,13 +24790,23 @@
             <a:pPr lvl="0" algn="ctr">
               <a:defRPr/>
             </a:pPr>
+            <a:endParaRPr lang="pt-BR" sz="1200" dirty="0">
+              <a:solidFill>
+                <a:prstClr val="white"/>
+              </a:solidFill>
+            </a:endParaRPr>
+          </a:p>
+          <a:p>
+            <a:pPr lvl="0" algn="ctr">
+              <a:defRPr/>
+            </a:pPr>
             <a:r>
               <a:rPr lang="pt-BR" sz="1200" dirty="0">
                 <a:solidFill>
                   <a:prstClr val="white"/>
                 </a:solidFill>
               </a:rPr>
-              <a:t>Armazena os dados das máquinas e dos cadastros.</a:t>
+              <a:t>Armazena os dados das máquinas.</a:t>
             </a:r>
             <a:endParaRPr lang="pt-BR" sz="1050" dirty="0">
               <a:solidFill>
@@ -24007,193 +24816,124 @@
           </a:p>
         </p:txBody>
       </p:sp>
-      <p:grpSp>
-        <p:nvGrpSpPr>
-          <p:cNvPr id="29" name="Agrupar 11">
+      <p:cxnSp>
+        <p:nvCxnSpPr>
+          <p:cNvPr id="92" name="Conector de Seta Reta 107">
             <a:extLst>
               <a:ext uri="{FF2B5EF4-FFF2-40B4-BE49-F238E27FC236}">
-                <a16:creationId xmlns:a16="http://schemas.microsoft.com/office/drawing/2014/main" id="{FA4591D4-5D2B-47D9-A934-D3450801B831}"/>
-              </a:ext>
-            </a:extLst>
-          </p:cNvPr>
-          <p:cNvGrpSpPr/>
-          <p:nvPr/>
-        </p:nvGrpSpPr>
-        <p:grpSpPr>
-          <a:xfrm>
-            <a:off x="7006349" y="3248385"/>
-            <a:ext cx="2112255" cy="1614111"/>
-            <a:chOff x="85840" y="1548384"/>
-            <a:chExt cx="2638466" cy="2016223"/>
-          </a:xfrm>
-        </p:grpSpPr>
-        <p:sp>
-          <p:nvSpPr>
-            <p:cNvPr id="30" name="Retângulo 29">
-              <a:extLst>
-                <a:ext uri="{FF2B5EF4-FFF2-40B4-BE49-F238E27FC236}">
-                  <a16:creationId xmlns:a16="http://schemas.microsoft.com/office/drawing/2014/main" id="{078085F9-5F7F-4042-AB85-FEDDC6A7B539}"/>
-                </a:ext>
-              </a:extLst>
-            </p:cNvPr>
-            <p:cNvSpPr/>
-            <p:nvPr/>
-          </p:nvSpPr>
-          <p:spPr>
-            <a:xfrm>
-              <a:off x="239729" y="1548384"/>
-              <a:ext cx="2377290" cy="2016223"/>
-            </a:xfrm>
-            <a:prstGeom prst="rect">
-              <a:avLst/>
-            </a:prstGeom>
-            <a:solidFill>
-              <a:schemeClr val="bg1">
-                <a:lumMod val="85000"/>
-              </a:schemeClr>
-            </a:solidFill>
-            <a:ln>
-              <a:solidFill>
-                <a:srgbClr val="253746"/>
-              </a:solidFill>
-              <a:prstDash val="dash"/>
-            </a:ln>
-          </p:spPr>
-          <p:style>
-            <a:lnRef idx="2">
-              <a:schemeClr val="accent1">
-                <a:shade val="50000"/>
-              </a:schemeClr>
-            </a:lnRef>
-            <a:fillRef idx="1">
-              <a:schemeClr val="accent1"/>
-            </a:fillRef>
-            <a:effectRef idx="0">
-              <a:schemeClr val="accent1"/>
-            </a:effectRef>
-            <a:fontRef idx="minor">
-              <a:schemeClr val="lt1"/>
-            </a:fontRef>
-          </p:style>
-          <p:txBody>
-            <a:bodyPr rtlCol="0" anchor="ctr"/>
-            <a:lstStyle/>
-            <a:p>
-              <a:pPr algn="ctr"/>
-              <a:endParaRPr lang="pt-BR" sz="1600" dirty="0">
-                <a:solidFill>
-                  <a:prstClr val="white"/>
-                </a:solidFill>
-                <a:latin typeface="Calibri"/>
-              </a:endParaRPr>
-            </a:p>
-          </p:txBody>
-        </p:sp>
-        <p:sp>
-          <p:nvSpPr>
-            <p:cNvPr id="31" name="Retângulo 20">
-              <a:extLst>
-                <a:ext uri="{FF2B5EF4-FFF2-40B4-BE49-F238E27FC236}">
-                  <a16:creationId xmlns:a16="http://schemas.microsoft.com/office/drawing/2014/main" id="{E3696353-0670-44EC-BFDE-E530BCB7872C}"/>
-                </a:ext>
-              </a:extLst>
-            </p:cNvPr>
-            <p:cNvSpPr/>
-            <p:nvPr/>
-          </p:nvSpPr>
-          <p:spPr>
-            <a:xfrm>
-              <a:off x="85840" y="1686173"/>
-              <a:ext cx="2566458" cy="730456"/>
-            </a:xfrm>
-            <a:prstGeom prst="rect">
-              <a:avLst/>
-            </a:prstGeom>
-          </p:spPr>
-          <p:txBody>
-            <a:bodyPr wrap="square">
-              <a:spAutoFit/>
-            </a:bodyPr>
-            <a:lstStyle/>
-            <a:p>
-              <a:pPr lvl="0" algn="ctr">
-                <a:defRPr/>
-              </a:pPr>
-              <a:r>
-                <a:rPr lang="pt-BR" sz="1800" b="1" dirty="0"/>
-                <a:t>MFA Application</a:t>
-              </a:r>
-            </a:p>
-            <a:p>
-              <a:pPr lvl="0" algn="ctr">
-                <a:defRPr/>
-              </a:pPr>
-              <a:r>
-                <a:rPr lang="pt-BR" sz="1400" dirty="0"/>
-                <a:t>[Container: SecurID]</a:t>
-              </a:r>
-            </a:p>
-          </p:txBody>
-        </p:sp>
-        <p:sp>
-          <p:nvSpPr>
-            <p:cNvPr id="32" name="Retângulo 20">
-              <a:extLst>
-                <a:ext uri="{FF2B5EF4-FFF2-40B4-BE49-F238E27FC236}">
-                  <a16:creationId xmlns:a16="http://schemas.microsoft.com/office/drawing/2014/main" id="{7F7C288A-2BDF-465E-BCFE-D05D7F5B2F20}"/>
-                </a:ext>
-              </a:extLst>
-            </p:cNvPr>
-            <p:cNvSpPr/>
-            <p:nvPr/>
-          </p:nvSpPr>
-          <p:spPr>
-            <a:xfrm>
-              <a:off x="157848" y="2542903"/>
-              <a:ext cx="2566458" cy="653566"/>
-            </a:xfrm>
-            <a:prstGeom prst="rect">
-              <a:avLst/>
-            </a:prstGeom>
-          </p:spPr>
-          <p:txBody>
-            <a:bodyPr wrap="square">
-              <a:spAutoFit/>
-            </a:bodyPr>
-            <a:lstStyle/>
-            <a:p>
-              <a:pPr lvl="0" algn="ctr">
-                <a:defRPr/>
-              </a:pPr>
-              <a:r>
-                <a:rPr lang="pt-BR" sz="1400" dirty="0"/>
-                <a:t>Software de autenticação multifator</a:t>
-              </a:r>
-              <a:endParaRPr lang="pt-BR" sz="1100" dirty="0"/>
-            </a:p>
-          </p:txBody>
-        </p:sp>
-      </p:grpSp>
-      <p:cxnSp>
-        <p:nvCxnSpPr>
-          <p:cNvPr id="33" name="Conector de Seta Reta 107">
-            <a:extLst>
-              <a:ext uri="{FF2B5EF4-FFF2-40B4-BE49-F238E27FC236}">
-                <a16:creationId xmlns:a16="http://schemas.microsoft.com/office/drawing/2014/main" id="{BD74A078-025C-46C9-A183-FA596CDE1416}"/>
+                <a16:creationId xmlns:a16="http://schemas.microsoft.com/office/drawing/2014/main" id="{A0C56A28-639D-43F4-A126-D49387944AC3}"/>
               </a:ext>
             </a:extLst>
           </p:cNvPr>
           <p:cNvCxnSpPr>
             <a:cxnSpLocks/>
-            <a:stCxn id="30" idx="0"/>
-            <a:endCxn id="24" idx="2"/>
+            <a:stCxn id="56" idx="0"/>
+            <a:endCxn id="8" idx="2"/>
           </p:cNvCxnSpPr>
           <p:nvPr/>
         </p:nvCxnSpPr>
         <p:spPr>
           <a:xfrm flipH="1" flipV="1">
-            <a:off x="8028326" y="2854935"/>
-            <a:ext cx="52805" cy="393450"/>
+            <a:off x="6927287" y="2840764"/>
+            <a:ext cx="18057" cy="458041"/>
+          </a:xfrm>
+          <a:prstGeom prst="straightConnector1">
+            <a:avLst/>
+          </a:prstGeom>
+          <a:ln w="19050">
+            <a:solidFill>
+              <a:schemeClr val="accent5">
+                <a:lumMod val="75000"/>
+              </a:schemeClr>
+            </a:solidFill>
+            <a:prstDash val="sysDash"/>
+            <a:headEnd type="none" w="lg" len="lg"/>
+            <a:tailEnd type="triangle" w="lg" len="lg"/>
+          </a:ln>
+        </p:spPr>
+        <p:style>
+          <a:lnRef idx="1">
+            <a:schemeClr val="accent1"/>
+          </a:lnRef>
+          <a:fillRef idx="0">
+            <a:schemeClr val="accent1"/>
+          </a:fillRef>
+          <a:effectRef idx="0">
+            <a:schemeClr val="accent1"/>
+          </a:effectRef>
+          <a:fontRef idx="minor">
+            <a:schemeClr val="tx1"/>
+          </a:fontRef>
+        </p:style>
+      </p:cxnSp>
+      <p:cxnSp>
+        <p:nvCxnSpPr>
+          <p:cNvPr id="97" name="Conector de Seta Reta 107">
+            <a:extLst>
+              <a:ext uri="{FF2B5EF4-FFF2-40B4-BE49-F238E27FC236}">
+                <a16:creationId xmlns:a16="http://schemas.microsoft.com/office/drawing/2014/main" id="{A61D196A-475F-4343-9A12-B727DB3DAB4F}"/>
+              </a:ext>
+            </a:extLst>
+          </p:cNvPr>
+          <p:cNvCxnSpPr>
+            <a:cxnSpLocks/>
+            <a:stCxn id="39" idx="0"/>
+          </p:cNvCxnSpPr>
+          <p:nvPr/>
+        </p:nvCxnSpPr>
+        <p:spPr>
+          <a:xfrm flipV="1">
+            <a:off x="5621346" y="5520863"/>
+            <a:ext cx="147534" cy="366422"/>
+          </a:xfrm>
+          <a:prstGeom prst="straightConnector1">
+            <a:avLst/>
+          </a:prstGeom>
+          <a:ln w="19050">
+            <a:solidFill>
+              <a:schemeClr val="accent5">
+                <a:lumMod val="75000"/>
+              </a:schemeClr>
+            </a:solidFill>
+            <a:prstDash val="sysDash"/>
+            <a:headEnd type="none" w="lg" len="lg"/>
+            <a:tailEnd type="triangle" w="lg" len="lg"/>
+          </a:ln>
+        </p:spPr>
+        <p:style>
+          <a:lnRef idx="1">
+            <a:schemeClr val="accent1"/>
+          </a:lnRef>
+          <a:fillRef idx="0">
+            <a:schemeClr val="accent1"/>
+          </a:fillRef>
+          <a:effectRef idx="0">
+            <a:schemeClr val="accent1"/>
+          </a:effectRef>
+          <a:fontRef idx="minor">
+            <a:schemeClr val="tx1"/>
+          </a:fontRef>
+        </p:style>
+      </p:cxnSp>
+      <p:cxnSp>
+        <p:nvCxnSpPr>
+          <p:cNvPr id="98" name="Conector de Seta Reta 107">
+            <a:extLst>
+              <a:ext uri="{FF2B5EF4-FFF2-40B4-BE49-F238E27FC236}">
+                <a16:creationId xmlns:a16="http://schemas.microsoft.com/office/drawing/2014/main" id="{61148779-3708-4B79-BA5C-EB8679A5279E}"/>
+              </a:ext>
+            </a:extLst>
+          </p:cNvPr>
+          <p:cNvCxnSpPr>
+            <a:cxnSpLocks/>
+            <a:stCxn id="15" idx="0"/>
+          </p:cNvCxnSpPr>
+          <p:nvPr/>
+        </p:nvCxnSpPr>
+        <p:spPr>
+          <a:xfrm flipH="1" flipV="1">
+            <a:off x="8157885" y="5479701"/>
+            <a:ext cx="1009474" cy="243408"/>
           </a:xfrm>
           <a:prstGeom prst="straightConnector1">
             <a:avLst/>
@@ -24226,10 +24966,10 @@
       </p:cxnSp>
       <p:grpSp>
         <p:nvGrpSpPr>
-          <p:cNvPr id="39" name="Group 38">
+          <p:cNvPr id="102" name="Group 101">
             <a:extLst>
               <a:ext uri="{FF2B5EF4-FFF2-40B4-BE49-F238E27FC236}">
-                <a16:creationId xmlns:a16="http://schemas.microsoft.com/office/drawing/2014/main" id="{8F8B787C-D4E1-4F27-BCF7-93494F139F21}"/>
+                <a16:creationId xmlns:a16="http://schemas.microsoft.com/office/drawing/2014/main" id="{1619B22E-BAE2-4D8C-B7F6-99AED5A0DA86}"/>
               </a:ext>
             </a:extLst>
           </p:cNvPr>
@@ -24238,271 +24978,18 @@
         </p:nvGrpSpPr>
         <p:grpSpPr>
           <a:xfrm>
-            <a:off x="8299665" y="5434790"/>
-            <a:ext cx="2238234" cy="1587936"/>
-            <a:chOff x="7014179" y="4654462"/>
-            <a:chExt cx="2675302" cy="2016225"/>
+            <a:off x="1574703" y="3592657"/>
+            <a:ext cx="2414472" cy="1825058"/>
+            <a:chOff x="4755662" y="1781271"/>
+            <a:chExt cx="5014828" cy="2355721"/>
           </a:xfrm>
         </p:grpSpPr>
-        <p:grpSp>
-          <p:nvGrpSpPr>
-            <p:cNvPr id="40" name="Group 39">
+        <p:sp>
+          <p:nvSpPr>
+            <p:cNvPr id="103" name="Retângulo 17">
               <a:extLst>
                 <a:ext uri="{FF2B5EF4-FFF2-40B4-BE49-F238E27FC236}">
-                  <a16:creationId xmlns:a16="http://schemas.microsoft.com/office/drawing/2014/main" id="{0D3780FC-B28E-4C23-8AAD-F468309B980A}"/>
-                </a:ext>
-              </a:extLst>
-            </p:cNvPr>
-            <p:cNvGrpSpPr/>
-            <p:nvPr/>
-          </p:nvGrpSpPr>
-          <p:grpSpPr>
-            <a:xfrm>
-              <a:off x="7149338" y="4654462"/>
-              <a:ext cx="2463283" cy="2016225"/>
-              <a:chOff x="8392958" y="3891083"/>
-              <a:chExt cx="3276202" cy="2212133"/>
-            </a:xfrm>
-          </p:grpSpPr>
-          <p:sp>
-            <p:nvSpPr>
-              <p:cNvPr id="43" name="Retângulo 6">
-                <a:extLst>
-                  <a:ext uri="{FF2B5EF4-FFF2-40B4-BE49-F238E27FC236}">
-                    <a16:creationId xmlns:a16="http://schemas.microsoft.com/office/drawing/2014/main" id="{20D16C42-4290-44A0-A2CF-780CCFDE6DAE}"/>
-                  </a:ext>
-                </a:extLst>
-              </p:cNvPr>
-              <p:cNvSpPr/>
-              <p:nvPr/>
-            </p:nvSpPr>
-            <p:spPr>
-              <a:xfrm>
-                <a:off x="8392958" y="3891083"/>
-                <a:ext cx="3276202" cy="2212133"/>
-              </a:xfrm>
-              <a:prstGeom prst="rect">
-                <a:avLst/>
-              </a:prstGeom>
-              <a:solidFill>
-                <a:srgbClr val="32B9CD"/>
-              </a:solidFill>
-              <a:ln>
-                <a:solidFill>
-                  <a:schemeClr val="accent5">
-                    <a:lumMod val="75000"/>
-                  </a:schemeClr>
-                </a:solidFill>
-              </a:ln>
-            </p:spPr>
-            <p:style>
-              <a:lnRef idx="2">
-                <a:schemeClr val="accent1">
-                  <a:shade val="50000"/>
-                </a:schemeClr>
-              </a:lnRef>
-              <a:fillRef idx="1">
-                <a:schemeClr val="accent1"/>
-              </a:fillRef>
-              <a:effectRef idx="0">
-                <a:schemeClr val="accent1"/>
-              </a:effectRef>
-              <a:fontRef idx="minor">
-                <a:schemeClr val="lt1"/>
-              </a:fontRef>
-            </p:style>
-            <p:txBody>
-              <a:bodyPr rtlCol="0" anchor="ctr"/>
-              <a:lstStyle/>
-              <a:p>
-                <a:pPr algn="ctr"/>
-                <a:endParaRPr lang="pt-BR" sz="1800" dirty="0">
-                  <a:solidFill>
-                    <a:prstClr val="white"/>
-                  </a:solidFill>
-                  <a:latin typeface="Calibri"/>
-                </a:endParaRPr>
-              </a:p>
-            </p:txBody>
-          </p:sp>
-          <p:sp>
-            <p:nvSpPr>
-              <p:cNvPr id="44" name="Retângulo 6">
-                <a:extLst>
-                  <a:ext uri="{FF2B5EF4-FFF2-40B4-BE49-F238E27FC236}">
-                    <a16:creationId xmlns:a16="http://schemas.microsoft.com/office/drawing/2014/main" id="{83CCF371-6597-47AD-A15B-0940E2BA0ABD}"/>
-                  </a:ext>
-                </a:extLst>
-              </p:cNvPr>
-              <p:cNvSpPr/>
-              <p:nvPr/>
-            </p:nvSpPr>
-            <p:spPr>
-              <a:xfrm>
-                <a:off x="8464949" y="3959113"/>
-                <a:ext cx="2577005" cy="226901"/>
-              </a:xfrm>
-              <a:prstGeom prst="rect">
-                <a:avLst/>
-              </a:prstGeom>
-              <a:noFill/>
-              <a:ln>
-                <a:solidFill>
-                  <a:schemeClr val="accent5">
-                    <a:lumMod val="75000"/>
-                  </a:schemeClr>
-                </a:solidFill>
-              </a:ln>
-            </p:spPr>
-            <p:style>
-              <a:lnRef idx="2">
-                <a:schemeClr val="accent1">
-                  <a:shade val="50000"/>
-                </a:schemeClr>
-              </a:lnRef>
-              <a:fillRef idx="1">
-                <a:schemeClr val="accent1"/>
-              </a:fillRef>
-              <a:effectRef idx="0">
-                <a:schemeClr val="accent1"/>
-              </a:effectRef>
-              <a:fontRef idx="minor">
-                <a:schemeClr val="lt1"/>
-              </a:fontRef>
-            </p:style>
-            <p:txBody>
-              <a:bodyPr rtlCol="0" anchor="ctr"/>
-              <a:lstStyle/>
-              <a:p>
-                <a:pPr algn="ctr"/>
-                <a:endParaRPr lang="pt-BR" sz="1800" dirty="0">
-                  <a:solidFill>
-                    <a:prstClr val="white"/>
-                  </a:solidFill>
-                  <a:latin typeface="Calibri"/>
-                </a:endParaRPr>
-              </a:p>
-            </p:txBody>
-          </p:sp>
-          <p:sp>
-            <p:nvSpPr>
-              <p:cNvPr id="45" name="Multiply 18">
-                <a:extLst>
-                  <a:ext uri="{FF2B5EF4-FFF2-40B4-BE49-F238E27FC236}">
-                    <a16:creationId xmlns:a16="http://schemas.microsoft.com/office/drawing/2014/main" id="{B580BDA3-CBCF-4CD0-B374-09078412CFD6}"/>
-                  </a:ext>
-                </a:extLst>
-              </p:cNvPr>
-              <p:cNvSpPr/>
-              <p:nvPr/>
-            </p:nvSpPr>
-            <p:spPr>
-              <a:xfrm>
-                <a:off x="11309204" y="3924647"/>
-                <a:ext cx="288032" cy="295831"/>
-              </a:xfrm>
-              <a:prstGeom prst="mathMultiply">
-                <a:avLst/>
-              </a:prstGeom>
-              <a:noFill/>
-              <a:ln>
-                <a:solidFill>
-                  <a:schemeClr val="accent5">
-                    <a:lumMod val="75000"/>
-                  </a:schemeClr>
-                </a:solidFill>
-              </a:ln>
-            </p:spPr>
-            <p:style>
-              <a:lnRef idx="2">
-                <a:schemeClr val="accent1">
-                  <a:shade val="50000"/>
-                </a:schemeClr>
-              </a:lnRef>
-              <a:fillRef idx="1">
-                <a:schemeClr val="accent1"/>
-              </a:fillRef>
-              <a:effectRef idx="0">
-                <a:schemeClr val="accent1"/>
-              </a:effectRef>
-              <a:fontRef idx="minor">
-                <a:schemeClr val="lt1"/>
-              </a:fontRef>
-            </p:style>
-            <p:txBody>
-              <a:bodyPr rtlCol="0" anchor="ctr"/>
-              <a:lstStyle/>
-              <a:p>
-                <a:pPr algn="ctr"/>
-                <a:endParaRPr lang="pt-BR" sz="1800"/>
-              </a:p>
-            </p:txBody>
-          </p:sp>
-          <p:sp>
-            <p:nvSpPr>
-              <p:cNvPr id="46" name="Circular Arrow 19">
-                <a:extLst>
-                  <a:ext uri="{FF2B5EF4-FFF2-40B4-BE49-F238E27FC236}">
-                    <a16:creationId xmlns:a16="http://schemas.microsoft.com/office/drawing/2014/main" id="{88832FFA-ABC5-489F-82D8-9711598FEACE}"/>
-                  </a:ext>
-                </a:extLst>
-              </p:cNvPr>
-              <p:cNvSpPr/>
-              <p:nvPr/>
-            </p:nvSpPr>
-            <p:spPr>
-              <a:xfrm rot="16500000">
-                <a:off x="11158829" y="3927941"/>
-                <a:ext cx="216000" cy="288000"/>
-              </a:xfrm>
-              <a:prstGeom prst="circularArrow">
-                <a:avLst/>
-              </a:prstGeom>
-              <a:noFill/>
-              <a:ln>
-                <a:solidFill>
-                  <a:schemeClr val="accent5">
-                    <a:lumMod val="75000"/>
-                  </a:schemeClr>
-                </a:solidFill>
-              </a:ln>
-            </p:spPr>
-            <p:style>
-              <a:lnRef idx="2">
-                <a:schemeClr val="accent1">
-                  <a:shade val="50000"/>
-                </a:schemeClr>
-              </a:lnRef>
-              <a:fillRef idx="1">
-                <a:schemeClr val="accent1"/>
-              </a:fillRef>
-              <a:effectRef idx="0">
-                <a:schemeClr val="accent1"/>
-              </a:effectRef>
-              <a:fontRef idx="minor">
-                <a:schemeClr val="lt1"/>
-              </a:fontRef>
-            </p:style>
-            <p:txBody>
-              <a:bodyPr rtlCol="0" anchor="ctr"/>
-              <a:lstStyle/>
-              <a:p>
-                <a:pPr algn="ctr"/>
-                <a:endParaRPr lang="pt-BR" sz="1800">
-                  <a:solidFill>
-                    <a:schemeClr val="tx1"/>
-                  </a:solidFill>
-                </a:endParaRPr>
-              </a:p>
-            </p:txBody>
-          </p:sp>
-        </p:grpSp>
-        <p:sp>
-          <p:nvSpPr>
-            <p:cNvPr id="41" name="Retângulo 20">
-              <a:extLst>
-                <a:ext uri="{FF2B5EF4-FFF2-40B4-BE49-F238E27FC236}">
-                  <a16:creationId xmlns:a16="http://schemas.microsoft.com/office/drawing/2014/main" id="{3A0D0C5B-6FC0-487B-B9F6-A03288E5BD09}"/>
+                  <a16:creationId xmlns:a16="http://schemas.microsoft.com/office/drawing/2014/main" id="{DE5369CF-77FC-4CD0-924B-014401339DDF}"/>
                 </a:ext>
               </a:extLst>
             </p:cNvPr>
@@ -24511,8 +24998,72 @@
           </p:nvSpPr>
           <p:spPr>
             <a:xfrm>
-              <a:off x="7014179" y="4995848"/>
-              <a:ext cx="2566458" cy="898813"/>
+              <a:off x="4755662" y="1875189"/>
+              <a:ext cx="5014828" cy="2261803"/>
+            </a:xfrm>
+            <a:prstGeom prst="rect">
+              <a:avLst/>
+            </a:prstGeom>
+            <a:ln/>
+          </p:spPr>
+          <p:style>
+            <a:lnRef idx="2">
+              <a:schemeClr val="accent5">
+                <a:shade val="50000"/>
+              </a:schemeClr>
+            </a:lnRef>
+            <a:fillRef idx="1">
+              <a:schemeClr val="accent5"/>
+            </a:fillRef>
+            <a:effectRef idx="0">
+              <a:schemeClr val="accent5"/>
+            </a:effectRef>
+            <a:fontRef idx="minor">
+              <a:schemeClr val="lt1"/>
+            </a:fontRef>
+          </p:style>
+          <p:txBody>
+            <a:bodyPr rtlCol="0" anchor="ctr"/>
+            <a:lstStyle/>
+            <a:p>
+              <a:pPr algn="ctr"/>
+              <a:endParaRPr lang="pt-BR" sz="1400" dirty="0">
+                <a:solidFill>
+                  <a:prstClr val="white"/>
+                </a:solidFill>
+                <a:latin typeface="Calibri"/>
+              </a:endParaRPr>
+            </a:p>
+            <a:p>
+              <a:pPr algn="ctr"/>
+              <a:r>
+                <a:rPr lang="pt-BR" sz="1400" dirty="0">
+                  <a:solidFill>
+                    <a:prstClr val="white"/>
+                  </a:solidFill>
+                  <a:latin typeface="Calibri"/>
+                </a:rPr>
+                <a:t>Aplicação que controla o numero de requisições e envia para o banco</a:t>
+              </a:r>
+            </a:p>
+          </p:txBody>
+        </p:sp>
+        <p:sp>
+          <p:nvSpPr>
+            <p:cNvPr id="104" name="Retângulo 20">
+              <a:extLst>
+                <a:ext uri="{FF2B5EF4-FFF2-40B4-BE49-F238E27FC236}">
+                  <a16:creationId xmlns:a16="http://schemas.microsoft.com/office/drawing/2014/main" id="{DE97A06A-A774-4EEC-B2EA-0796595F692E}"/>
+                </a:ext>
+              </a:extLst>
+            </p:cNvPr>
+            <p:cNvSpPr/>
+            <p:nvPr/>
+          </p:nvSpPr>
+          <p:spPr>
+            <a:xfrm>
+              <a:off x="4825025" y="1781271"/>
+              <a:ext cx="4945463" cy="913714"/>
             </a:xfrm>
             <a:prstGeom prst="rect">
               <a:avLst/>
@@ -24533,7 +25084,7 @@
                     <a:prstClr val="white"/>
                   </a:solidFill>
                 </a:rPr>
-                <a:t>ClientSide Web</a:t>
+                <a:t>WebApplication</a:t>
               </a:r>
             </a:p>
             <a:p>
@@ -24546,432 +25097,14 @@
                     <a:prstClr val="white"/>
                   </a:solidFill>
                 </a:rPr>
-                <a:t>[Container: Javascript + Html+CSS]</a:t>
-              </a:r>
-            </a:p>
-          </p:txBody>
-        </p:sp>
-        <p:sp>
-          <p:nvSpPr>
-            <p:cNvPr id="42" name="Retângulo 20">
-              <a:extLst>
-                <a:ext uri="{FF2B5EF4-FFF2-40B4-BE49-F238E27FC236}">
-                  <a16:creationId xmlns:a16="http://schemas.microsoft.com/office/drawing/2014/main" id="{7D6C54A3-E317-4A82-A20C-DA891B041B1C}"/>
-                </a:ext>
-              </a:extLst>
-            </p:cNvPr>
-            <p:cNvSpPr/>
-            <p:nvPr/>
-          </p:nvSpPr>
-          <p:spPr>
-            <a:xfrm>
-              <a:off x="7123023" y="5819930"/>
-              <a:ext cx="2566458" cy="351710"/>
-            </a:xfrm>
-            <a:prstGeom prst="rect">
-              <a:avLst/>
-            </a:prstGeom>
-          </p:spPr>
-          <p:txBody>
-            <a:bodyPr wrap="square">
-              <a:spAutoFit/>
-            </a:bodyPr>
-            <a:lstStyle/>
-            <a:p>
-              <a:pPr lvl="0" algn="ctr">
-                <a:defRPr/>
-              </a:pPr>
-              <a:r>
-                <a:rPr lang="pt-BR" sz="1200" dirty="0">
-                  <a:solidFill>
-                    <a:prstClr val="white"/>
-                  </a:solidFill>
-                </a:rPr>
-                <a:t>Visualiza e imprime Dados</a:t>
-              </a:r>
-              <a:endParaRPr lang="pt-BR" sz="1050" dirty="0">
-                <a:solidFill>
-                  <a:prstClr val="white"/>
-                </a:solidFill>
-              </a:endParaRPr>
-            </a:p>
-          </p:txBody>
-        </p:sp>
-      </p:grpSp>
-      <p:grpSp>
-        <p:nvGrpSpPr>
-          <p:cNvPr id="47" name="Group 46">
-            <a:extLst>
-              <a:ext uri="{FF2B5EF4-FFF2-40B4-BE49-F238E27FC236}">
-                <a16:creationId xmlns:a16="http://schemas.microsoft.com/office/drawing/2014/main" id="{0804E4FC-C839-4FC5-8D46-E6C6194448BE}"/>
-              </a:ext>
-            </a:extLst>
-          </p:cNvPr>
-          <p:cNvGrpSpPr/>
-          <p:nvPr/>
-        </p:nvGrpSpPr>
-        <p:grpSpPr>
-          <a:xfrm>
-            <a:off x="5306008" y="5413896"/>
-            <a:ext cx="2147172" cy="1645710"/>
-            <a:chOff x="9889827" y="4597388"/>
-            <a:chExt cx="2566458" cy="2089582"/>
-          </a:xfrm>
-        </p:grpSpPr>
-        <p:grpSp>
-          <p:nvGrpSpPr>
-            <p:cNvPr id="48" name="Group 47">
-              <a:extLst>
-                <a:ext uri="{FF2B5EF4-FFF2-40B4-BE49-F238E27FC236}">
-                  <a16:creationId xmlns:a16="http://schemas.microsoft.com/office/drawing/2014/main" id="{4579F38C-E37A-4B88-A7FD-2368A01EF7EE}"/>
-                </a:ext>
-              </a:extLst>
-            </p:cNvPr>
-            <p:cNvGrpSpPr/>
-            <p:nvPr/>
-          </p:nvGrpSpPr>
-          <p:grpSpPr>
-            <a:xfrm>
-              <a:off x="10024908" y="4597388"/>
-              <a:ext cx="2307052" cy="2089582"/>
-              <a:chOff x="7252020" y="3571513"/>
-              <a:chExt cx="2376264" cy="2178569"/>
-            </a:xfrm>
-          </p:grpSpPr>
-          <p:sp>
-            <p:nvSpPr>
-              <p:cNvPr id="51" name="Retângulo 48">
-                <a:extLst>
-                  <a:ext uri="{FF2B5EF4-FFF2-40B4-BE49-F238E27FC236}">
-                    <a16:creationId xmlns:a16="http://schemas.microsoft.com/office/drawing/2014/main" id="{3556C28D-18E6-49F0-B1E8-ED14E2B1D649}"/>
-                  </a:ext>
-                </a:extLst>
-              </p:cNvPr>
-              <p:cNvSpPr/>
-              <p:nvPr/>
-            </p:nvSpPr>
-            <p:spPr>
-              <a:xfrm>
-                <a:off x="7683409" y="4788743"/>
-                <a:ext cx="1198306" cy="366688"/>
-              </a:xfrm>
-              <a:prstGeom prst="rect">
-                <a:avLst/>
-              </a:prstGeom>
-            </p:spPr>
-            <p:txBody>
-              <a:bodyPr wrap="square">
-                <a:spAutoFit/>
-              </a:bodyPr>
-              <a:lstStyle/>
-              <a:p>
-                <a:pPr lvl="0">
-                  <a:defRPr/>
-                </a:pPr>
-                <a:r>
-                  <a:rPr lang="pt-BR" sz="1200" dirty="0">
-                    <a:solidFill>
-                      <a:prstClr val="white"/>
-                    </a:solidFill>
-                  </a:rPr>
-                  <a:t>Dashboard</a:t>
-                </a:r>
-              </a:p>
-            </p:txBody>
-          </p:sp>
-          <p:sp>
-            <p:nvSpPr>
-              <p:cNvPr id="52" name="Rounded Rectangle 30">
-                <a:extLst>
-                  <a:ext uri="{FF2B5EF4-FFF2-40B4-BE49-F238E27FC236}">
-                    <a16:creationId xmlns:a16="http://schemas.microsoft.com/office/drawing/2014/main" id="{BE040818-83C4-4B7D-BCAF-18F1CD12E092}"/>
-                  </a:ext>
-                </a:extLst>
-              </p:cNvPr>
-              <p:cNvSpPr/>
-              <p:nvPr/>
-            </p:nvSpPr>
-            <p:spPr>
-              <a:xfrm>
-                <a:off x="7252020" y="3571513"/>
-                <a:ext cx="2376264" cy="2178569"/>
-              </a:xfrm>
-              <a:prstGeom prst="roundRect">
-                <a:avLst/>
-              </a:prstGeom>
-              <a:solidFill>
-                <a:srgbClr val="32B9CD"/>
-              </a:solidFill>
-              <a:ln>
-                <a:solidFill>
-                  <a:schemeClr val="accent5">
-                    <a:lumMod val="75000"/>
-                  </a:schemeClr>
-                </a:solidFill>
-              </a:ln>
-            </p:spPr>
-            <p:style>
-              <a:lnRef idx="2">
-                <a:schemeClr val="accent1">
-                  <a:shade val="50000"/>
-                </a:schemeClr>
-              </a:lnRef>
-              <a:fillRef idx="1">
-                <a:schemeClr val="accent1"/>
-              </a:fillRef>
-              <a:effectRef idx="0">
-                <a:schemeClr val="accent1"/>
-              </a:effectRef>
-              <a:fontRef idx="minor">
-                <a:schemeClr val="lt1"/>
-              </a:fontRef>
-            </p:style>
-            <p:txBody>
-              <a:bodyPr rtlCol="0" anchor="ctr"/>
-              <a:lstStyle/>
-              <a:p>
-                <a:pPr algn="ctr"/>
-                <a:endParaRPr lang="pt-BR" sz="1800" dirty="0">
-                  <a:solidFill>
-                    <a:prstClr val="white"/>
-                  </a:solidFill>
-                  <a:latin typeface="Calibri"/>
-                </a:endParaRPr>
-              </a:p>
-            </p:txBody>
-          </p:sp>
-          <p:cxnSp>
-            <p:nvCxnSpPr>
-              <p:cNvPr id="53" name="Straight Connector 52">
-                <a:extLst>
-                  <a:ext uri="{FF2B5EF4-FFF2-40B4-BE49-F238E27FC236}">
-                    <a16:creationId xmlns:a16="http://schemas.microsoft.com/office/drawing/2014/main" id="{15E0AEEA-E6D6-4C3E-AB7B-5383538F4602}"/>
-                  </a:ext>
-                </a:extLst>
-              </p:cNvPr>
-              <p:cNvCxnSpPr/>
-              <p:nvPr/>
-            </p:nvCxnSpPr>
-            <p:spPr>
-              <a:xfrm>
-                <a:off x="9097739" y="3708623"/>
-                <a:ext cx="275406" cy="0"/>
-              </a:xfrm>
-              <a:prstGeom prst="line">
-                <a:avLst/>
-              </a:prstGeom>
-              <a:noFill/>
-              <a:ln>
-                <a:solidFill>
-                  <a:schemeClr val="accent5">
-                    <a:lumMod val="75000"/>
-                  </a:schemeClr>
-                </a:solidFill>
-              </a:ln>
-            </p:spPr>
-            <p:style>
-              <a:lnRef idx="2">
-                <a:schemeClr val="accent1">
-                  <a:shade val="50000"/>
-                </a:schemeClr>
-              </a:lnRef>
-              <a:fillRef idx="1">
-                <a:schemeClr val="accent1"/>
-              </a:fillRef>
-              <a:effectRef idx="0">
-                <a:schemeClr val="accent1"/>
-              </a:effectRef>
-              <a:fontRef idx="minor">
-                <a:schemeClr val="lt1"/>
-              </a:fontRef>
-            </p:style>
-          </p:cxnSp>
-          <p:cxnSp>
-            <p:nvCxnSpPr>
-              <p:cNvPr id="54" name="Straight Connector 53">
-                <a:extLst>
-                  <a:ext uri="{FF2B5EF4-FFF2-40B4-BE49-F238E27FC236}">
-                    <a16:creationId xmlns:a16="http://schemas.microsoft.com/office/drawing/2014/main" id="{3729BCA6-AB4D-41AA-BE97-11EABE23E6C0}"/>
-                  </a:ext>
-                </a:extLst>
-              </p:cNvPr>
-              <p:cNvCxnSpPr/>
-              <p:nvPr/>
-            </p:nvCxnSpPr>
-            <p:spPr>
-              <a:xfrm>
-                <a:off x="9097739" y="3792372"/>
-                <a:ext cx="275406" cy="0"/>
-              </a:xfrm>
-              <a:prstGeom prst="line">
-                <a:avLst/>
-              </a:prstGeom>
-              <a:noFill/>
-              <a:ln>
-                <a:solidFill>
-                  <a:schemeClr val="accent5">
-                    <a:lumMod val="75000"/>
-                  </a:schemeClr>
-                </a:solidFill>
-              </a:ln>
-            </p:spPr>
-            <p:style>
-              <a:lnRef idx="2">
-                <a:schemeClr val="accent1">
-                  <a:shade val="50000"/>
-                </a:schemeClr>
-              </a:lnRef>
-              <a:fillRef idx="1">
-                <a:schemeClr val="accent1"/>
-              </a:fillRef>
-              <a:effectRef idx="0">
-                <a:schemeClr val="accent1"/>
-              </a:effectRef>
-              <a:fontRef idx="minor">
-                <a:schemeClr val="lt1"/>
-              </a:fontRef>
-            </p:style>
-          </p:cxnSp>
-          <p:cxnSp>
-            <p:nvCxnSpPr>
-              <p:cNvPr id="55" name="Straight Connector 54">
-                <a:extLst>
-                  <a:ext uri="{FF2B5EF4-FFF2-40B4-BE49-F238E27FC236}">
-                    <a16:creationId xmlns:a16="http://schemas.microsoft.com/office/drawing/2014/main" id="{E75D23C6-B9A9-453D-85B6-6288BEE083B7}"/>
-                  </a:ext>
-                </a:extLst>
-              </p:cNvPr>
-              <p:cNvCxnSpPr/>
-              <p:nvPr/>
-            </p:nvCxnSpPr>
-            <p:spPr>
-              <a:xfrm>
-                <a:off x="9097739" y="3879370"/>
-                <a:ext cx="275406" cy="0"/>
-              </a:xfrm>
-              <a:prstGeom prst="line">
-                <a:avLst/>
-              </a:prstGeom>
-              <a:noFill/>
-              <a:ln>
-                <a:solidFill>
-                  <a:schemeClr val="accent5">
-                    <a:lumMod val="75000"/>
-                  </a:schemeClr>
-                </a:solidFill>
-              </a:ln>
-            </p:spPr>
-            <p:style>
-              <a:lnRef idx="2">
-                <a:schemeClr val="accent1">
-                  <a:shade val="50000"/>
-                </a:schemeClr>
-              </a:lnRef>
-              <a:fillRef idx="1">
-                <a:schemeClr val="accent1"/>
-              </a:fillRef>
-              <a:effectRef idx="0">
-                <a:schemeClr val="accent1"/>
-              </a:effectRef>
-              <a:fontRef idx="minor">
-                <a:schemeClr val="lt1"/>
-              </a:fontRef>
-            </p:style>
-          </p:cxnSp>
-        </p:grpSp>
-        <p:sp>
-          <p:nvSpPr>
-            <p:cNvPr id="49" name="Retângulo 20">
-              <a:extLst>
-                <a:ext uri="{FF2B5EF4-FFF2-40B4-BE49-F238E27FC236}">
-                  <a16:creationId xmlns:a16="http://schemas.microsoft.com/office/drawing/2014/main" id="{54D3E35A-D025-4655-880E-B8F6C9B0FA9C}"/>
-                </a:ext>
-              </a:extLst>
-            </p:cNvPr>
-            <p:cNvSpPr/>
-            <p:nvPr/>
-          </p:nvSpPr>
-          <p:spPr>
-            <a:xfrm>
-              <a:off x="9889827" y="4967599"/>
-              <a:ext cx="2566458" cy="664340"/>
-            </a:xfrm>
-            <a:prstGeom prst="rect">
-              <a:avLst/>
-            </a:prstGeom>
-          </p:spPr>
-          <p:txBody>
-            <a:bodyPr wrap="square">
-              <a:spAutoFit/>
-            </a:bodyPr>
-            <a:lstStyle/>
-            <a:p>
-              <a:pPr lvl="0" algn="ctr">
-                <a:defRPr/>
-              </a:pPr>
-              <a:r>
-                <a:rPr lang="pt-BR" sz="1600" b="1" dirty="0">
-                  <a:solidFill>
-                    <a:prstClr val="white"/>
-                  </a:solidFill>
-                </a:rPr>
-                <a:t>MobileApp</a:t>
+                <a:t>[Container: SpringBoot]</a:t>
               </a:r>
             </a:p>
             <a:p>
               <a:pPr lvl="0" algn="ctr">
                 <a:defRPr/>
               </a:pPr>
-              <a:r>
-                <a:rPr lang="pt-BR" sz="1200" dirty="0">
-                  <a:solidFill>
-                    <a:prstClr val="white"/>
-                  </a:solidFill>
-                </a:rPr>
-                <a:t>[Container: Kotlin]</a:t>
-              </a:r>
-            </a:p>
-          </p:txBody>
-        </p:sp>
-        <p:sp>
-          <p:nvSpPr>
-            <p:cNvPr id="50" name="Retângulo 20">
-              <a:extLst>
-                <a:ext uri="{FF2B5EF4-FFF2-40B4-BE49-F238E27FC236}">
-                  <a16:creationId xmlns:a16="http://schemas.microsoft.com/office/drawing/2014/main" id="{B40AF5F8-B943-4432-9223-2248F86D88B1}"/>
-                </a:ext>
-              </a:extLst>
-            </p:cNvPr>
-            <p:cNvSpPr/>
-            <p:nvPr/>
-          </p:nvSpPr>
-          <p:spPr>
-            <a:xfrm>
-              <a:off x="9998671" y="5868862"/>
-              <a:ext cx="2307053" cy="351710"/>
-            </a:xfrm>
-            <a:prstGeom prst="rect">
-              <a:avLst/>
-            </a:prstGeom>
-          </p:spPr>
-          <p:txBody>
-            <a:bodyPr wrap="square">
-              <a:spAutoFit/>
-            </a:bodyPr>
-            <a:lstStyle/>
-            <a:p>
-              <a:pPr lvl="0" algn="ctr">
-                <a:defRPr/>
-              </a:pPr>
-              <a:r>
-                <a:rPr lang="pt-BR" sz="1200" dirty="0">
-                  <a:solidFill>
-                    <a:prstClr val="white"/>
-                  </a:solidFill>
-                </a:rPr>
-                <a:t>Visualiza os dados</a:t>
-              </a:r>
-              <a:endParaRPr lang="pt-BR" sz="1050" dirty="0">
+              <a:endParaRPr lang="pt-BR" sz="1200" dirty="0">
                 <a:solidFill>
                   <a:prstClr val="white"/>
                 </a:solidFill>
@@ -24982,303 +25115,23 @@
       </p:grpSp>
       <p:cxnSp>
         <p:nvCxnSpPr>
-          <p:cNvPr id="56" name="Conector de Seta Reta 107">
+          <p:cNvPr id="111" name="Conector de Seta Reta 107">
             <a:extLst>
               <a:ext uri="{FF2B5EF4-FFF2-40B4-BE49-F238E27FC236}">
-                <a16:creationId xmlns:a16="http://schemas.microsoft.com/office/drawing/2014/main" id="{EBA33FC6-3D99-40A3-9DBD-52CCD43621CA}"/>
+                <a16:creationId xmlns:a16="http://schemas.microsoft.com/office/drawing/2014/main" id="{CC30A1EC-92CA-4DE8-9C35-E45C9852BA5E}"/>
               </a:ext>
             </a:extLst>
           </p:cNvPr>
           <p:cNvCxnSpPr>
             <a:cxnSpLocks/>
+            <a:endCxn id="103" idx="2"/>
           </p:cNvCxnSpPr>
           <p:nvPr/>
         </p:nvCxnSpPr>
         <p:spPr>
           <a:xfrm flipV="1">
-            <a:off x="7082544" y="4903231"/>
-            <a:ext cx="292913" cy="576717"/>
-          </a:xfrm>
-          <a:prstGeom prst="straightConnector1">
-            <a:avLst/>
-          </a:prstGeom>
-          <a:ln w="19050">
-            <a:solidFill>
-              <a:schemeClr val="accent5">
-                <a:lumMod val="75000"/>
-              </a:schemeClr>
-            </a:solidFill>
-            <a:prstDash val="sysDash"/>
-            <a:headEnd type="none" w="lg" len="lg"/>
-            <a:tailEnd type="triangle" w="lg" len="lg"/>
-          </a:ln>
-        </p:spPr>
-        <p:style>
-          <a:lnRef idx="1">
-            <a:schemeClr val="accent1"/>
-          </a:lnRef>
-          <a:fillRef idx="0">
-            <a:schemeClr val="accent1"/>
-          </a:fillRef>
-          <a:effectRef idx="0">
-            <a:schemeClr val="accent1"/>
-          </a:effectRef>
-          <a:fontRef idx="minor">
-            <a:schemeClr val="tx1"/>
-          </a:fontRef>
-        </p:style>
-      </p:cxnSp>
-      <p:cxnSp>
-        <p:nvCxnSpPr>
-          <p:cNvPr id="58" name="Conector de Seta Reta 107">
-            <a:extLst>
-              <a:ext uri="{FF2B5EF4-FFF2-40B4-BE49-F238E27FC236}">
-                <a16:creationId xmlns:a16="http://schemas.microsoft.com/office/drawing/2014/main" id="{E5CEF8FA-B4E6-4CF9-B892-0282051650A0}"/>
-              </a:ext>
-            </a:extLst>
-          </p:cNvPr>
-          <p:cNvCxnSpPr>
-            <a:cxnSpLocks/>
-          </p:cNvCxnSpPr>
-          <p:nvPr/>
-        </p:nvCxnSpPr>
-        <p:spPr>
-          <a:xfrm flipH="1" flipV="1">
-            <a:off x="8740262" y="4894915"/>
-            <a:ext cx="376441" cy="616611"/>
-          </a:xfrm>
-          <a:prstGeom prst="straightConnector1">
-            <a:avLst/>
-          </a:prstGeom>
-          <a:ln w="19050">
-            <a:solidFill>
-              <a:schemeClr val="accent5">
-                <a:lumMod val="75000"/>
-              </a:schemeClr>
-            </a:solidFill>
-            <a:prstDash val="sysDash"/>
-            <a:headEnd type="none" w="lg" len="lg"/>
-            <a:tailEnd type="triangle" w="lg" len="lg"/>
-          </a:ln>
-        </p:spPr>
-        <p:style>
-          <a:lnRef idx="1">
-            <a:schemeClr val="accent1"/>
-          </a:lnRef>
-          <a:fillRef idx="0">
-            <a:schemeClr val="accent1"/>
-          </a:fillRef>
-          <a:effectRef idx="0">
-            <a:schemeClr val="accent1"/>
-          </a:effectRef>
-          <a:fontRef idx="minor">
-            <a:schemeClr val="tx1"/>
-          </a:fontRef>
-        </p:style>
-      </p:cxnSp>
-      <p:grpSp>
-        <p:nvGrpSpPr>
-          <p:cNvPr id="61" name="Group 60">
-            <a:extLst>
-              <a:ext uri="{FF2B5EF4-FFF2-40B4-BE49-F238E27FC236}">
-                <a16:creationId xmlns:a16="http://schemas.microsoft.com/office/drawing/2014/main" id="{B035A97D-6DA6-4FD6-87B1-386AB960BCF1}"/>
-              </a:ext>
-            </a:extLst>
-          </p:cNvPr>
-          <p:cNvGrpSpPr/>
-          <p:nvPr/>
-        </p:nvGrpSpPr>
-        <p:grpSpPr>
-          <a:xfrm>
-            <a:off x="2664137" y="3780631"/>
-            <a:ext cx="2161104" cy="1375784"/>
-            <a:chOff x="3193083" y="4654463"/>
-            <a:chExt cx="2736304" cy="2016224"/>
-          </a:xfrm>
-        </p:grpSpPr>
-        <p:sp>
-          <p:nvSpPr>
-            <p:cNvPr id="62" name="Retângulo 6">
-              <a:extLst>
-                <a:ext uri="{FF2B5EF4-FFF2-40B4-BE49-F238E27FC236}">
-                  <a16:creationId xmlns:a16="http://schemas.microsoft.com/office/drawing/2014/main" id="{321F37F8-20FD-4BFA-AC56-2D8EA0BDB86A}"/>
-                </a:ext>
-              </a:extLst>
-            </p:cNvPr>
-            <p:cNvSpPr/>
-            <p:nvPr/>
-          </p:nvSpPr>
-          <p:spPr>
-            <a:xfrm>
-              <a:off x="3218913" y="4654463"/>
-              <a:ext cx="2710474" cy="2016224"/>
-            </a:xfrm>
-            <a:prstGeom prst="rect">
-              <a:avLst/>
-            </a:prstGeom>
-            <a:solidFill>
-              <a:srgbClr val="32B9CD"/>
-            </a:solidFill>
-            <a:ln>
-              <a:solidFill>
-                <a:schemeClr val="accent5">
-                  <a:lumMod val="75000"/>
-                </a:schemeClr>
-              </a:solidFill>
-            </a:ln>
-          </p:spPr>
-          <p:style>
-            <a:lnRef idx="2">
-              <a:schemeClr val="accent1">
-                <a:shade val="50000"/>
-              </a:schemeClr>
-            </a:lnRef>
-            <a:fillRef idx="1">
-              <a:schemeClr val="accent1"/>
-            </a:fillRef>
-            <a:effectRef idx="0">
-              <a:schemeClr val="accent1"/>
-            </a:effectRef>
-            <a:fontRef idx="minor">
-              <a:schemeClr val="lt1"/>
-            </a:fontRef>
-          </p:style>
-          <p:txBody>
-            <a:bodyPr rtlCol="0" anchor="ctr"/>
-            <a:lstStyle/>
-            <a:p>
-              <a:pPr algn="ctr"/>
-              <a:endParaRPr lang="pt-BR" sz="1800" dirty="0">
-                <a:solidFill>
-                  <a:prstClr val="white"/>
-                </a:solidFill>
-                <a:latin typeface="Calibri"/>
-              </a:endParaRPr>
-            </a:p>
-          </p:txBody>
-        </p:sp>
-        <p:sp>
-          <p:nvSpPr>
-            <p:cNvPr id="63" name="Retângulo 7">
-              <a:extLst>
-                <a:ext uri="{FF2B5EF4-FFF2-40B4-BE49-F238E27FC236}">
-                  <a16:creationId xmlns:a16="http://schemas.microsoft.com/office/drawing/2014/main" id="{0F6A3FE0-8E39-47A6-B1BA-7F3CD16F10A4}"/>
-                </a:ext>
-              </a:extLst>
-            </p:cNvPr>
-            <p:cNvSpPr/>
-            <p:nvPr/>
-          </p:nvSpPr>
-          <p:spPr>
-            <a:xfrm>
-              <a:off x="3362931" y="5446551"/>
-              <a:ext cx="2278426" cy="1200251"/>
-            </a:xfrm>
-            <a:prstGeom prst="rect">
-              <a:avLst/>
-            </a:prstGeom>
-          </p:spPr>
-          <p:txBody>
-            <a:bodyPr wrap="square">
-              <a:spAutoFit/>
-            </a:bodyPr>
-            <a:lstStyle/>
-            <a:p>
-              <a:pPr lvl="0" algn="ctr">
-                <a:defRPr/>
-              </a:pPr>
-              <a:r>
-                <a:rPr lang="pt-BR" sz="1200" b="1" dirty="0">
-                  <a:solidFill>
-                    <a:prstClr val="white"/>
-                  </a:solidFill>
-                </a:rPr>
-                <a:t>Coletor</a:t>
-              </a:r>
-              <a:r>
-                <a:rPr lang="pt-BR" sz="1200" dirty="0">
-                  <a:solidFill>
-                    <a:prstClr val="white"/>
-                  </a:solidFill>
-                </a:rPr>
-                <a:t>  que captura dos dados das maquinas e do caixa</a:t>
-              </a:r>
-            </a:p>
-          </p:txBody>
-        </p:sp>
-        <p:sp>
-          <p:nvSpPr>
-            <p:cNvPr id="64" name="Retângulo 20">
-              <a:extLst>
-                <a:ext uri="{FF2B5EF4-FFF2-40B4-BE49-F238E27FC236}">
-                  <a16:creationId xmlns:a16="http://schemas.microsoft.com/office/drawing/2014/main" id="{6A460065-DFC2-4662-8371-E5D8C66CF277}"/>
-                </a:ext>
-              </a:extLst>
-            </p:cNvPr>
-            <p:cNvSpPr/>
-            <p:nvPr/>
-          </p:nvSpPr>
-          <p:spPr>
-            <a:xfrm>
-              <a:off x="3193083" y="4711163"/>
-              <a:ext cx="2710474" cy="971631"/>
-            </a:xfrm>
-            <a:prstGeom prst="rect">
-              <a:avLst/>
-            </a:prstGeom>
-          </p:spPr>
-          <p:txBody>
-            <a:bodyPr wrap="square">
-              <a:spAutoFit/>
-            </a:bodyPr>
-            <a:lstStyle/>
-            <a:p>
-              <a:pPr lvl="0" algn="ctr">
-                <a:defRPr/>
-              </a:pPr>
-              <a:r>
-                <a:rPr lang="pt-BR" sz="1600" b="1" dirty="0">
-                  <a:solidFill>
-                    <a:prstClr val="white"/>
-                  </a:solidFill>
-                </a:rPr>
-                <a:t>Client Side Desktop </a:t>
-              </a:r>
-            </a:p>
-            <a:p>
-              <a:pPr lvl="0" algn="ctr">
-                <a:defRPr/>
-              </a:pPr>
-              <a:r>
-                <a:rPr lang="pt-BR" sz="1200" dirty="0">
-                  <a:solidFill>
-                    <a:prstClr val="white"/>
-                  </a:solidFill>
-                </a:rPr>
-                <a:t>[Container: Java JAR - Local]</a:t>
-              </a:r>
-            </a:p>
-          </p:txBody>
-        </p:sp>
-      </p:grpSp>
-      <p:cxnSp>
-        <p:nvCxnSpPr>
-          <p:cNvPr id="73" name="Conector de Seta Reta 107">
-            <a:extLst>
-              <a:ext uri="{FF2B5EF4-FFF2-40B4-BE49-F238E27FC236}">
-                <a16:creationId xmlns:a16="http://schemas.microsoft.com/office/drawing/2014/main" id="{BC1444D4-B13A-46B4-B8D7-29D8667ED16F}"/>
-              </a:ext>
-            </a:extLst>
-          </p:cNvPr>
-          <p:cNvCxnSpPr>
-            <a:cxnSpLocks/>
-          </p:cNvCxnSpPr>
-          <p:nvPr/>
-        </p:nvCxnSpPr>
-        <p:spPr>
-          <a:xfrm flipH="1" flipV="1">
-            <a:off x="3809417" y="2735702"/>
-            <a:ext cx="26402" cy="1137793"/>
+            <a:off x="2781939" y="5417715"/>
+            <a:ext cx="0" cy="520285"/>
           </a:xfrm>
           <a:prstGeom prst="straightConnector1">
             <a:avLst/>
@@ -25340,7 +25193,7 @@
                             </p:stCondLst>
                             <p:childTnLst>
                               <p:par>
-                                <p:cTn id="5" presetID="1" presetClass="entr" presetSubtype="0" fill="hold" grpId="0" nodeType="clickEffect">
+                                <p:cTn id="5" presetID="1" presetClass="entr" presetSubtype="0" fill="hold" nodeType="clickEffect">
                                   <p:stCondLst>
                                     <p:cond delay="0"/>
                                   </p:stCondLst>
@@ -25353,7 +25206,7 @@
                                           </p:stCondLst>
                                         </p:cTn>
                                         <p:tgtEl>
-                                          <p:spTgt spid="21"/>
+                                          <p:spTgt spid="7"/>
                                         </p:tgtEl>
                                         <p:attrNameLst>
                                           <p:attrName>style.visibility</p:attrName>
@@ -25398,7 +25251,7 @@
                                           </p:stCondLst>
                                         </p:cTn>
                                         <p:tgtEl>
-                                          <p:spTgt spid="23"/>
+                                          <p:spTgt spid="13"/>
                                         </p:tgtEl>
                                         <p:attrNameLst>
                                           <p:attrName>style.visibility</p:attrName>
@@ -25443,34 +25296,7 @@
                                           </p:stCondLst>
                                         </p:cTn>
                                         <p:tgtEl>
-                                          <p:spTgt spid="22"/>
-                                        </p:tgtEl>
-                                        <p:attrNameLst>
-                                          <p:attrName>style.visibility</p:attrName>
-                                        </p:attrNameLst>
-                                      </p:cBhvr>
-                                      <p:to>
-                                        <p:strVal val="visible"/>
-                                      </p:to>
-                                    </p:set>
-                                  </p:childTnLst>
-                                </p:cTn>
-                              </p:par>
-                              <p:par>
-                                <p:cTn id="15" presetID="1" presetClass="entr" presetSubtype="0" fill="hold" nodeType="withEffect">
-                                  <p:stCondLst>
-                                    <p:cond delay="0"/>
-                                  </p:stCondLst>
-                                  <p:childTnLst>
-                                    <p:set>
-                                      <p:cBhvr>
-                                        <p:cTn id="16" dur="1" fill="hold">
-                                          <p:stCondLst>
-                                            <p:cond delay="0"/>
-                                          </p:stCondLst>
-                                        </p:cTn>
-                                        <p:tgtEl>
-                                          <p:spTgt spid="29"/>
+                                          <p:spTgt spid="20"/>
                                         </p:tgtEl>
                                         <p:attrNameLst>
                                           <p:attrName>style.visibility</p:attrName>
@@ -25490,32 +25316,32 @@
                     </p:cTn>
                   </p:par>
                   <p:par>
-                    <p:cTn id="17" fill="hold">
+                    <p:cTn id="15" fill="hold">
                       <p:stCondLst>
                         <p:cond delay="indefinite"/>
                       </p:stCondLst>
                       <p:childTnLst>
                         <p:par>
-                          <p:cTn id="18" fill="hold">
+                          <p:cTn id="16" fill="hold">
                             <p:stCondLst>
                               <p:cond delay="0"/>
                             </p:stCondLst>
                             <p:childTnLst>
                               <p:par>
-                                <p:cTn id="19" presetID="1" presetClass="entr" presetSubtype="0" fill="hold" nodeType="clickEffect">
+                                <p:cTn id="17" presetID="1" presetClass="entr" presetSubtype="0" fill="hold" nodeType="clickEffect">
                                   <p:stCondLst>
                                     <p:cond delay="0"/>
                                   </p:stCondLst>
                                   <p:childTnLst>
                                     <p:set>
                                       <p:cBhvr>
-                                        <p:cTn id="20" dur="1" fill="hold">
+                                        <p:cTn id="18" dur="1" fill="hold">
                                           <p:stCondLst>
                                             <p:cond delay="0"/>
                                           </p:stCondLst>
                                         </p:cTn>
                                         <p:tgtEl>
-                                          <p:spTgt spid="33"/>
+                                          <p:spTgt spid="23"/>
                                         </p:tgtEl>
                                         <p:attrNameLst>
                                           <p:attrName>style.visibility</p:attrName>
@@ -25535,59 +25361,32 @@
                     </p:cTn>
                   </p:par>
                   <p:par>
-                    <p:cTn id="21" fill="hold">
+                    <p:cTn id="19" fill="hold">
                       <p:stCondLst>
                         <p:cond delay="indefinite"/>
                       </p:stCondLst>
                       <p:childTnLst>
                         <p:par>
-                          <p:cTn id="22" fill="hold">
+                          <p:cTn id="20" fill="hold">
                             <p:stCondLst>
                               <p:cond delay="0"/>
                             </p:stCondLst>
                             <p:childTnLst>
                               <p:par>
-                                <p:cTn id="23" presetID="1" presetClass="entr" presetSubtype="0" fill="hold" nodeType="clickEffect">
+                                <p:cTn id="21" presetID="1" presetClass="entr" presetSubtype="0" fill="hold" nodeType="clickEffect">
                                   <p:stCondLst>
                                     <p:cond delay="0"/>
                                   </p:stCondLst>
                                   <p:childTnLst>
                                     <p:set>
                                       <p:cBhvr>
-                                        <p:cTn id="24" dur="1" fill="hold">
+                                        <p:cTn id="22" dur="1" fill="hold">
                                           <p:stCondLst>
                                             <p:cond delay="0"/>
                                           </p:stCondLst>
                                         </p:cTn>
                                         <p:tgtEl>
-                                          <p:spTgt spid="47"/>
-                                        </p:tgtEl>
-                                        <p:attrNameLst>
-                                          <p:attrName>style.visibility</p:attrName>
-                                        </p:attrNameLst>
-                                      </p:cBhvr>
-                                      <p:to>
-                                        <p:strVal val="visible"/>
-                                      </p:to>
-                                    </p:set>
-                                  </p:childTnLst>
-                                </p:cTn>
-                              </p:par>
-                              <p:par>
-                                <p:cTn id="25" presetID="1" presetClass="entr" presetSubtype="0" fill="hold" nodeType="withEffect">
-                                  <p:stCondLst>
-                                    <p:cond delay="0"/>
-                                  </p:stCondLst>
-                                  <p:childTnLst>
-                                    <p:set>
-                                      <p:cBhvr>
-                                        <p:cTn id="26" dur="1" fill="hold">
-                                          <p:stCondLst>
-                                            <p:cond delay="0"/>
-                                          </p:stCondLst>
-                                        </p:cTn>
-                                        <p:tgtEl>
-                                          <p:spTgt spid="39"/>
+                                          <p:spTgt spid="27"/>
                                         </p:tgtEl>
                                         <p:attrNameLst>
                                           <p:attrName>style.visibility</p:attrName>
@@ -25607,32 +25406,59 @@
                     </p:cTn>
                   </p:par>
                   <p:par>
-                    <p:cTn id="27" fill="hold">
+                    <p:cTn id="23" fill="hold">
                       <p:stCondLst>
                         <p:cond delay="indefinite"/>
                       </p:stCondLst>
                       <p:childTnLst>
                         <p:par>
-                          <p:cTn id="28" fill="hold">
+                          <p:cTn id="24" fill="hold">
                             <p:stCondLst>
                               <p:cond delay="0"/>
                             </p:stCondLst>
                             <p:childTnLst>
                               <p:par>
-                                <p:cTn id="29" presetID="1" presetClass="entr" presetSubtype="0" fill="hold" nodeType="clickEffect">
+                                <p:cTn id="25" presetID="1" presetClass="entr" presetSubtype="0" fill="hold" nodeType="clickEffect">
                                   <p:stCondLst>
                                     <p:cond delay="0"/>
                                   </p:stCondLst>
                                   <p:childTnLst>
                                     <p:set>
                                       <p:cBhvr>
-                                        <p:cTn id="30" dur="1" fill="hold">
+                                        <p:cTn id="26" dur="1" fill="hold">
                                           <p:stCondLst>
                                             <p:cond delay="0"/>
                                           </p:stCondLst>
                                         </p:cTn>
                                         <p:tgtEl>
-                                          <p:spTgt spid="56"/>
+                                          <p:spTgt spid="37"/>
+                                        </p:tgtEl>
+                                        <p:attrNameLst>
+                                          <p:attrName>style.visibility</p:attrName>
+                                        </p:attrNameLst>
+                                      </p:cBhvr>
+                                      <p:to>
+                                        <p:strVal val="visible"/>
+                                      </p:to>
+                                    </p:set>
+                                  </p:childTnLst>
+                                </p:cTn>
+                              </p:par>
+                              <p:par>
+                                <p:cTn id="27" presetID="1" presetClass="entr" presetSubtype="0" fill="hold" nodeType="withEffect">
+                                  <p:stCondLst>
+                                    <p:cond delay="0"/>
+                                  </p:stCondLst>
+                                  <p:childTnLst>
+                                    <p:set>
+                                      <p:cBhvr>
+                                        <p:cTn id="28" dur="1" fill="hold">
+                                          <p:stCondLst>
+                                            <p:cond delay="0"/>
+                                          </p:stCondLst>
+                                        </p:cTn>
+                                        <p:tgtEl>
+                                          <p:spTgt spid="55"/>
                                         </p:tgtEl>
                                         <p:attrNameLst>
                                           <p:attrName>style.visibility</p:attrName>
@@ -25652,32 +25478,32 @@
                     </p:cTn>
                   </p:par>
                   <p:par>
-                    <p:cTn id="31" fill="hold">
+                    <p:cTn id="29" fill="hold">
                       <p:stCondLst>
                         <p:cond delay="indefinite"/>
                       </p:stCondLst>
                       <p:childTnLst>
                         <p:par>
-                          <p:cTn id="32" fill="hold">
+                          <p:cTn id="30" fill="hold">
                             <p:stCondLst>
                               <p:cond delay="0"/>
                             </p:stCondLst>
                             <p:childTnLst>
                               <p:par>
-                                <p:cTn id="33" presetID="1" presetClass="entr" presetSubtype="0" fill="hold" nodeType="clickEffect">
+                                <p:cTn id="31" presetID="1" presetClass="entr" presetSubtype="0" fill="hold" grpId="0" nodeType="clickEffect">
                                   <p:stCondLst>
                                     <p:cond delay="0"/>
                                   </p:stCondLst>
                                   <p:childTnLst>
                                     <p:set>
                                       <p:cBhvr>
-                                        <p:cTn id="34" dur="1" fill="hold">
+                                        <p:cTn id="32" dur="1" fill="hold">
                                           <p:stCondLst>
                                             <p:cond delay="0"/>
                                           </p:stCondLst>
                                         </p:cTn>
                                         <p:tgtEl>
-                                          <p:spTgt spid="58"/>
+                                          <p:spTgt spid="81"/>
                                         </p:tgtEl>
                                         <p:attrNameLst>
                                           <p:attrName>style.visibility</p:attrName>
@@ -25697,32 +25523,32 @@
                     </p:cTn>
                   </p:par>
                   <p:par>
-                    <p:cTn id="35" fill="hold">
+                    <p:cTn id="33" fill="hold">
                       <p:stCondLst>
                         <p:cond delay="indefinite"/>
                       </p:stCondLst>
                       <p:childTnLst>
                         <p:par>
-                          <p:cTn id="36" fill="hold">
+                          <p:cTn id="34" fill="hold">
                             <p:stCondLst>
                               <p:cond delay="0"/>
                             </p:stCondLst>
                             <p:childTnLst>
                               <p:par>
-                                <p:cTn id="37" presetID="1" presetClass="entr" presetSubtype="0" fill="hold" nodeType="clickEffect">
+                                <p:cTn id="35" presetID="1" presetClass="entr" presetSubtype="0" fill="hold" nodeType="clickEffect">
                                   <p:stCondLst>
                                     <p:cond delay="0"/>
                                   </p:stCondLst>
                                   <p:childTnLst>
                                     <p:set>
                                       <p:cBhvr>
-                                        <p:cTn id="38" dur="1" fill="hold">
+                                        <p:cTn id="36" dur="1" fill="hold">
                                           <p:stCondLst>
                                             <p:cond delay="0"/>
                                           </p:stCondLst>
                                         </p:cTn>
                                         <p:tgtEl>
-                                          <p:spTgt spid="61"/>
+                                          <p:spTgt spid="92"/>
                                         </p:tgtEl>
                                         <p:attrNameLst>
                                           <p:attrName>style.visibility</p:attrName>
@@ -25742,32 +25568,167 @@
                     </p:cTn>
                   </p:par>
                   <p:par>
-                    <p:cTn id="39" fill="hold">
+                    <p:cTn id="37" fill="hold">
                       <p:stCondLst>
                         <p:cond delay="indefinite"/>
                       </p:stCondLst>
                       <p:childTnLst>
                         <p:par>
-                          <p:cTn id="40" fill="hold">
+                          <p:cTn id="38" fill="hold">
                             <p:stCondLst>
                               <p:cond delay="0"/>
                             </p:stCondLst>
                             <p:childTnLst>
                               <p:par>
-                                <p:cTn id="41" presetID="1" presetClass="entr" presetSubtype="0" fill="hold" nodeType="clickEffect">
+                                <p:cTn id="39" presetID="1" presetClass="entr" presetSubtype="0" fill="hold" nodeType="clickEffect">
                                   <p:stCondLst>
                                     <p:cond delay="0"/>
                                   </p:stCondLst>
                                   <p:childTnLst>
                                     <p:set>
                                       <p:cBhvr>
-                                        <p:cTn id="42" dur="1" fill="hold">
+                                        <p:cTn id="40" dur="1" fill="hold">
                                           <p:stCondLst>
                                             <p:cond delay="0"/>
                                           </p:stCondLst>
                                         </p:cTn>
                                         <p:tgtEl>
-                                          <p:spTgt spid="73"/>
+                                          <p:spTgt spid="97"/>
+                                        </p:tgtEl>
+                                        <p:attrNameLst>
+                                          <p:attrName>style.visibility</p:attrName>
+                                        </p:attrNameLst>
+                                      </p:cBhvr>
+                                      <p:to>
+                                        <p:strVal val="visible"/>
+                                      </p:to>
+                                    </p:set>
+                                  </p:childTnLst>
+                                </p:cTn>
+                              </p:par>
+                            </p:childTnLst>
+                          </p:cTn>
+                        </p:par>
+                      </p:childTnLst>
+                    </p:cTn>
+                  </p:par>
+                  <p:par>
+                    <p:cTn id="41" fill="hold">
+                      <p:stCondLst>
+                        <p:cond delay="indefinite"/>
+                      </p:stCondLst>
+                      <p:childTnLst>
+                        <p:par>
+                          <p:cTn id="42" fill="hold">
+                            <p:stCondLst>
+                              <p:cond delay="0"/>
+                            </p:stCondLst>
+                            <p:childTnLst>
+                              <p:par>
+                                <p:cTn id="43" presetID="1" presetClass="entr" presetSubtype="0" fill="hold" nodeType="clickEffect">
+                                  <p:stCondLst>
+                                    <p:cond delay="0"/>
+                                  </p:stCondLst>
+                                  <p:childTnLst>
+                                    <p:set>
+                                      <p:cBhvr>
+                                        <p:cTn id="44" dur="1" fill="hold">
+                                          <p:stCondLst>
+                                            <p:cond delay="0"/>
+                                          </p:stCondLst>
+                                        </p:cTn>
+                                        <p:tgtEl>
+                                          <p:spTgt spid="98"/>
+                                        </p:tgtEl>
+                                        <p:attrNameLst>
+                                          <p:attrName>style.visibility</p:attrName>
+                                        </p:attrNameLst>
+                                      </p:cBhvr>
+                                      <p:to>
+                                        <p:strVal val="visible"/>
+                                      </p:to>
+                                    </p:set>
+                                  </p:childTnLst>
+                                </p:cTn>
+                              </p:par>
+                            </p:childTnLst>
+                          </p:cTn>
+                        </p:par>
+                      </p:childTnLst>
+                    </p:cTn>
+                  </p:par>
+                  <p:par>
+                    <p:cTn id="45" fill="hold">
+                      <p:stCondLst>
+                        <p:cond delay="indefinite"/>
+                      </p:stCondLst>
+                      <p:childTnLst>
+                        <p:par>
+                          <p:cTn id="46" fill="hold">
+                            <p:stCondLst>
+                              <p:cond delay="0"/>
+                            </p:stCondLst>
+                            <p:childTnLst>
+                              <p:par>
+                                <p:cTn id="47" presetID="1" presetClass="entr" presetSubtype="0" fill="hold" nodeType="clickEffect">
+                                  <p:stCondLst>
+                                    <p:cond delay="0"/>
+                                  </p:stCondLst>
+                                  <p:childTnLst>
+                                    <p:set>
+                                      <p:cBhvr>
+                                        <p:cTn id="48" dur="1" fill="hold">
+                                          <p:stCondLst>
+                                            <p:cond delay="0"/>
+                                          </p:stCondLst>
+                                        </p:cTn>
+                                        <p:tgtEl>
+                                          <p:spTgt spid="102"/>
+                                        </p:tgtEl>
+                                        <p:attrNameLst>
+                                          <p:attrName>style.visibility</p:attrName>
+                                        </p:attrNameLst>
+                                      </p:cBhvr>
+                                      <p:to>
+                                        <p:strVal val="visible"/>
+                                      </p:to>
+                                    </p:set>
+                                  </p:childTnLst>
+                                </p:cTn>
+                              </p:par>
+                            </p:childTnLst>
+                          </p:cTn>
+                        </p:par>
+                      </p:childTnLst>
+                    </p:cTn>
+                  </p:par>
+                  <p:par>
+                    <p:cTn id="49" fill="hold">
+                      <p:stCondLst>
+                        <p:cond delay="indefinite"/>
+                      </p:stCondLst>
+                      <p:childTnLst>
+                        <p:par>
+                          <p:cTn id="50" fill="hold">
+                            <p:stCondLst>
+                              <p:cond delay="0"/>
+                            </p:stCondLst>
+                            <p:childTnLst>
+                              <p:par>
+                                <p:cTn id="51" presetID="1" presetClass="entr" presetSubtype="0" fill="hold" nodeType="clickEffect">
+                                  <p:stCondLst>
+                                    <p:cond delay="0"/>
+                                  </p:stCondLst>
+                                  <p:childTnLst>
+                                    <p:set>
+                                      <p:cBhvr>
+                                        <p:cTn id="52" dur="1" fill="hold">
+                                          <p:stCondLst>
+                                            <p:cond delay="0"/>
+                                          </p:stCondLst>
+                                        </p:cTn>
+                                        <p:tgtEl>
+                                          <p:spTgt spid="111"/>
                                         </p:tgtEl>
                                         <p:attrNameLst>
                                           <p:attrName>style.visibility</p:attrName>
@@ -25808,7 +25769,7 @@
       </p:par>
     </p:tnLst>
     <p:bldLst>
-      <p:bldP spid="21" grpId="0" animBg="1"/>
+      <p:bldP spid="81" grpId="0" animBg="1"/>
     </p:bldLst>
   </p:timing>
 </p:sld>
@@ -26563,7 +26524,7 @@
         </p:nvGrpSpPr>
         <p:grpSpPr>
           <a:xfrm>
-            <a:off x="3049067" y="4644727"/>
+            <a:off x="3168932" y="4729995"/>
             <a:ext cx="2736304" cy="2016224"/>
             <a:chOff x="3193083" y="4654463"/>
             <a:chExt cx="2736304" cy="2016224"/>
@@ -27499,8 +27460,8 @@
         </p:nvCxnSpPr>
         <p:spPr>
           <a:xfrm rot="10800000">
-            <a:off x="1428375" y="3564607"/>
-            <a:ext cx="1646523" cy="2088232"/>
+            <a:off x="1428374" y="3564607"/>
+            <a:ext cx="1766388" cy="2173500"/>
           </a:xfrm>
           <a:prstGeom prst="bentConnector2">
             <a:avLst/>

</xml_diff>